<commit_message>
added slides for requirement 3 and bonus
</commit_message>
<xml_diff>
--- a/SLIDES.pptx
+++ b/SLIDES.pptx
@@ -5,7 +5,7 @@
     <p:sldMasterId id="2147483696" r:id="rId1"/>
   </p:sldMasterIdLst>
   <p:notesMasterIdLst>
-    <p:notesMasterId r:id="rId10"/>
+    <p:notesMasterId r:id="rId19"/>
   </p:notesMasterIdLst>
   <p:sldIdLst>
     <p:sldId id="260" r:id="rId2"/>
@@ -16,6 +16,15 @@
     <p:sldId id="265" r:id="rId7"/>
     <p:sldId id="266" r:id="rId8"/>
     <p:sldId id="267" r:id="rId9"/>
+    <p:sldId id="269" r:id="rId10"/>
+    <p:sldId id="270" r:id="rId11"/>
+    <p:sldId id="271" r:id="rId12"/>
+    <p:sldId id="272" r:id="rId13"/>
+    <p:sldId id="273" r:id="rId14"/>
+    <p:sldId id="274" r:id="rId15"/>
+    <p:sldId id="275" r:id="rId16"/>
+    <p:sldId id="276" r:id="rId17"/>
+    <p:sldId id="277" r:id="rId18"/>
   </p:sldIdLst>
   <p:sldSz cx="12192000" cy="6858000"/>
   <p:notesSz cx="6858000" cy="9144000"/>
@@ -114,6 +123,11 @@
       </a:defRPr>
     </a:lvl9pPr>
   </p:defaultTextStyle>
+  <p:extLst>
+    <p:ext uri="{EFAFB233-063F-42B5-8137-9DF3F51BA10A}">
+      <p15:sldGuideLst xmlns:p15="http://schemas.microsoft.com/office/powerpoint/2012/main"/>
+    </p:ext>
+  </p:extLst>
 </p:presentation>
 </file>
 
@@ -199,7 +213,7 @@
           <a:p>
             <a:fld id="{C655A3F9-72E7-9A49-86BD-FB37A5575CC8}" type="datetimeFigureOut">
               <a:rPr lang="it-IT" smtClean="0"/>
-              <a:t>06/07/24</a:t>
+              <a:t>10/07/2024</a:t>
             </a:fld>
             <a:endParaRPr lang="it-IT"/>
           </a:p>
@@ -357,7 +371,7 @@
           <a:p>
             <a:fld id="{439E4B1C-0B36-B34E-B5D3-9687301EE318}" type="slidenum">
               <a:rPr lang="it-IT" smtClean="0"/>
-              <a:t>‹N›</a:t>
+              <a:t>‹#›</a:t>
             </a:fld>
             <a:endParaRPr lang="it-IT"/>
           </a:p>
@@ -550,6 +564,1158 @@
 </p:notes>
 </file>
 
+<file path=ppt/notesSlides/notesSlide10.xml><?xml version="1.0" encoding="utf-8"?>
+<p:notes xmlns:a="http://schemas.openxmlformats.org/drawingml/2006/main" xmlns:r="http://schemas.openxmlformats.org/officeDocument/2006/relationships" xmlns:p="http://schemas.openxmlformats.org/presentationml/2006/main">
+  <p:cSld>
+    <p:spTree>
+      <p:nvGrpSpPr>
+        <p:cNvPr id="1" name=""/>
+        <p:cNvGrpSpPr/>
+        <p:nvPr/>
+      </p:nvGrpSpPr>
+      <p:grpSpPr>
+        <a:xfrm>
+          <a:off x="0" y="0"/>
+          <a:ext cx="0" cy="0"/>
+          <a:chOff x="0" y="0"/>
+          <a:chExt cx="0" cy="0"/>
+        </a:xfrm>
+      </p:grpSpPr>
+      <p:sp>
+        <p:nvSpPr>
+          <p:cNvPr id="2" name="Segnaposto immagine diapositiva 1"/>
+          <p:cNvSpPr>
+            <a:spLocks noGrp="1" noRot="1" noChangeAspect="1"/>
+          </p:cNvSpPr>
+          <p:nvPr>
+            <p:ph type="sldImg"/>
+          </p:nvPr>
+        </p:nvSpPr>
+        <p:spPr/>
+      </p:sp>
+      <p:sp>
+        <p:nvSpPr>
+          <p:cNvPr id="3" name="Segnaposto note 2"/>
+          <p:cNvSpPr>
+            <a:spLocks noGrp="1"/>
+          </p:cNvSpPr>
+          <p:nvPr>
+            <p:ph type="body" idx="1"/>
+          </p:nvPr>
+        </p:nvSpPr>
+        <p:spPr/>
+        <p:txBody>
+          <a:bodyPr/>
+          <a:lstStyle/>
+          <a:p>
+            <a:endParaRPr lang="it-IT"/>
+          </a:p>
+        </p:txBody>
+      </p:sp>
+      <p:sp>
+        <p:nvSpPr>
+          <p:cNvPr id="4" name="Segnaposto numero diapositiva 3"/>
+          <p:cNvSpPr>
+            <a:spLocks noGrp="1"/>
+          </p:cNvSpPr>
+          <p:nvPr>
+            <p:ph type="sldNum" sz="quarter" idx="5"/>
+          </p:nvPr>
+        </p:nvSpPr>
+        <p:spPr/>
+        <p:txBody>
+          <a:bodyPr/>
+          <a:lstStyle/>
+          <a:p>
+            <a:pPr marL="0" marR="0" lvl="0" indent="0" algn="r" defTabSz="457200" rtl="0" eaLnBrk="1" fontAlgn="auto" latinLnBrk="0" hangingPunct="1">
+              <a:lnSpc>
+                <a:spcPct val="100000"/>
+              </a:lnSpc>
+              <a:spcBef>
+                <a:spcPts val="0"/>
+              </a:spcBef>
+              <a:spcAft>
+                <a:spcPts val="0"/>
+              </a:spcAft>
+              <a:buClrTx/>
+              <a:buSzTx/>
+              <a:buFontTx/>
+              <a:buNone/>
+              <a:tabLst/>
+              <a:defRPr/>
+            </a:pPr>
+            <a:fld id="{439E4B1C-0B36-B34E-B5D3-9687301EE318}" type="slidenum">
+              <a:rPr kumimoji="0" lang="it-IT" sz="1200" b="0" i="0" u="none" strike="noStrike" kern="1200" cap="none" spc="0" normalizeH="0" baseline="0" noProof="0" smtClean="0">
+                <a:ln>
+                  <a:noFill/>
+                </a:ln>
+                <a:solidFill>
+                  <a:prstClr val="black"/>
+                </a:solidFill>
+                <a:effectLst/>
+                <a:uLnTx/>
+                <a:uFillTx/>
+                <a:latin typeface="Aptos" panose="02110004020202020204"/>
+                <a:ea typeface="+mn-ea"/>
+                <a:cs typeface="+mn-cs"/>
+              </a:rPr>
+              <a:pPr marL="0" marR="0" lvl="0" indent="0" algn="r" defTabSz="457200" rtl="0" eaLnBrk="1" fontAlgn="auto" latinLnBrk="0" hangingPunct="1">
+                <a:lnSpc>
+                  <a:spcPct val="100000"/>
+                </a:lnSpc>
+                <a:spcBef>
+                  <a:spcPts val="0"/>
+                </a:spcBef>
+                <a:spcAft>
+                  <a:spcPts val="0"/>
+                </a:spcAft>
+                <a:buClrTx/>
+                <a:buSzTx/>
+                <a:buFontTx/>
+                <a:buNone/>
+                <a:tabLst/>
+                <a:defRPr/>
+              </a:pPr>
+              <a:t>10</a:t>
+            </a:fld>
+            <a:endParaRPr kumimoji="0" lang="it-IT" sz="1200" b="0" i="0" u="none" strike="noStrike" kern="1200" cap="none" spc="0" normalizeH="0" baseline="0" noProof="0">
+              <a:ln>
+                <a:noFill/>
+              </a:ln>
+              <a:solidFill>
+                <a:prstClr val="black"/>
+              </a:solidFill>
+              <a:effectLst/>
+              <a:uLnTx/>
+              <a:uFillTx/>
+              <a:latin typeface="Aptos" panose="02110004020202020204"/>
+              <a:ea typeface="+mn-ea"/>
+              <a:cs typeface="+mn-cs"/>
+            </a:endParaRPr>
+          </a:p>
+        </p:txBody>
+      </p:sp>
+    </p:spTree>
+    <p:extLst>
+      <p:ext uri="{BB962C8B-B14F-4D97-AF65-F5344CB8AC3E}">
+        <p14:creationId xmlns:p14="http://schemas.microsoft.com/office/powerpoint/2010/main" val="1203404656"/>
+      </p:ext>
+    </p:extLst>
+  </p:cSld>
+  <p:clrMapOvr>
+    <a:masterClrMapping/>
+  </p:clrMapOvr>
+</p:notes>
+</file>
+
+<file path=ppt/notesSlides/notesSlide11.xml><?xml version="1.0" encoding="utf-8"?>
+<p:notes xmlns:a="http://schemas.openxmlformats.org/drawingml/2006/main" xmlns:r="http://schemas.openxmlformats.org/officeDocument/2006/relationships" xmlns:p="http://schemas.openxmlformats.org/presentationml/2006/main">
+  <p:cSld>
+    <p:spTree>
+      <p:nvGrpSpPr>
+        <p:cNvPr id="1" name=""/>
+        <p:cNvGrpSpPr/>
+        <p:nvPr/>
+      </p:nvGrpSpPr>
+      <p:grpSpPr>
+        <a:xfrm>
+          <a:off x="0" y="0"/>
+          <a:ext cx="0" cy="0"/>
+          <a:chOff x="0" y="0"/>
+          <a:chExt cx="0" cy="0"/>
+        </a:xfrm>
+      </p:grpSpPr>
+      <p:sp>
+        <p:nvSpPr>
+          <p:cNvPr id="2" name="Segnaposto immagine diapositiva 1"/>
+          <p:cNvSpPr>
+            <a:spLocks noGrp="1" noRot="1" noChangeAspect="1"/>
+          </p:cNvSpPr>
+          <p:nvPr>
+            <p:ph type="sldImg"/>
+          </p:nvPr>
+        </p:nvSpPr>
+        <p:spPr/>
+      </p:sp>
+      <p:sp>
+        <p:nvSpPr>
+          <p:cNvPr id="3" name="Segnaposto note 2"/>
+          <p:cNvSpPr>
+            <a:spLocks noGrp="1"/>
+          </p:cNvSpPr>
+          <p:nvPr>
+            <p:ph type="body" idx="1"/>
+          </p:nvPr>
+        </p:nvSpPr>
+        <p:spPr/>
+        <p:txBody>
+          <a:bodyPr/>
+          <a:lstStyle/>
+          <a:p>
+            <a:endParaRPr lang="it-IT"/>
+          </a:p>
+        </p:txBody>
+      </p:sp>
+      <p:sp>
+        <p:nvSpPr>
+          <p:cNvPr id="4" name="Segnaposto numero diapositiva 3"/>
+          <p:cNvSpPr>
+            <a:spLocks noGrp="1"/>
+          </p:cNvSpPr>
+          <p:nvPr>
+            <p:ph type="sldNum" sz="quarter" idx="5"/>
+          </p:nvPr>
+        </p:nvSpPr>
+        <p:spPr/>
+        <p:txBody>
+          <a:bodyPr/>
+          <a:lstStyle/>
+          <a:p>
+            <a:pPr marL="0" marR="0" lvl="0" indent="0" algn="r" defTabSz="457200" rtl="0" eaLnBrk="1" fontAlgn="auto" latinLnBrk="0" hangingPunct="1">
+              <a:lnSpc>
+                <a:spcPct val="100000"/>
+              </a:lnSpc>
+              <a:spcBef>
+                <a:spcPts val="0"/>
+              </a:spcBef>
+              <a:spcAft>
+                <a:spcPts val="0"/>
+              </a:spcAft>
+              <a:buClrTx/>
+              <a:buSzTx/>
+              <a:buFontTx/>
+              <a:buNone/>
+              <a:tabLst/>
+              <a:defRPr/>
+            </a:pPr>
+            <a:fld id="{439E4B1C-0B36-B34E-B5D3-9687301EE318}" type="slidenum">
+              <a:rPr kumimoji="0" lang="it-IT" sz="1200" b="0" i="0" u="none" strike="noStrike" kern="1200" cap="none" spc="0" normalizeH="0" baseline="0" noProof="0" smtClean="0">
+                <a:ln>
+                  <a:noFill/>
+                </a:ln>
+                <a:solidFill>
+                  <a:prstClr val="black"/>
+                </a:solidFill>
+                <a:effectLst/>
+                <a:uLnTx/>
+                <a:uFillTx/>
+                <a:latin typeface="Aptos" panose="02110004020202020204"/>
+                <a:ea typeface="+mn-ea"/>
+                <a:cs typeface="+mn-cs"/>
+              </a:rPr>
+              <a:pPr marL="0" marR="0" lvl="0" indent="0" algn="r" defTabSz="457200" rtl="0" eaLnBrk="1" fontAlgn="auto" latinLnBrk="0" hangingPunct="1">
+                <a:lnSpc>
+                  <a:spcPct val="100000"/>
+                </a:lnSpc>
+                <a:spcBef>
+                  <a:spcPts val="0"/>
+                </a:spcBef>
+                <a:spcAft>
+                  <a:spcPts val="0"/>
+                </a:spcAft>
+                <a:buClrTx/>
+                <a:buSzTx/>
+                <a:buFontTx/>
+                <a:buNone/>
+                <a:tabLst/>
+                <a:defRPr/>
+              </a:pPr>
+              <a:t>11</a:t>
+            </a:fld>
+            <a:endParaRPr kumimoji="0" lang="it-IT" sz="1200" b="0" i="0" u="none" strike="noStrike" kern="1200" cap="none" spc="0" normalizeH="0" baseline="0" noProof="0">
+              <a:ln>
+                <a:noFill/>
+              </a:ln>
+              <a:solidFill>
+                <a:prstClr val="black"/>
+              </a:solidFill>
+              <a:effectLst/>
+              <a:uLnTx/>
+              <a:uFillTx/>
+              <a:latin typeface="Aptos" panose="02110004020202020204"/>
+              <a:ea typeface="+mn-ea"/>
+              <a:cs typeface="+mn-cs"/>
+            </a:endParaRPr>
+          </a:p>
+        </p:txBody>
+      </p:sp>
+    </p:spTree>
+    <p:extLst>
+      <p:ext uri="{BB962C8B-B14F-4D97-AF65-F5344CB8AC3E}">
+        <p14:creationId xmlns:p14="http://schemas.microsoft.com/office/powerpoint/2010/main" val="1811541609"/>
+      </p:ext>
+    </p:extLst>
+  </p:cSld>
+  <p:clrMapOvr>
+    <a:masterClrMapping/>
+  </p:clrMapOvr>
+</p:notes>
+</file>
+
+<file path=ppt/notesSlides/notesSlide12.xml><?xml version="1.0" encoding="utf-8"?>
+<p:notes xmlns:a="http://schemas.openxmlformats.org/drawingml/2006/main" xmlns:r="http://schemas.openxmlformats.org/officeDocument/2006/relationships" xmlns:p="http://schemas.openxmlformats.org/presentationml/2006/main">
+  <p:cSld>
+    <p:spTree>
+      <p:nvGrpSpPr>
+        <p:cNvPr id="1" name=""/>
+        <p:cNvGrpSpPr/>
+        <p:nvPr/>
+      </p:nvGrpSpPr>
+      <p:grpSpPr>
+        <a:xfrm>
+          <a:off x="0" y="0"/>
+          <a:ext cx="0" cy="0"/>
+          <a:chOff x="0" y="0"/>
+          <a:chExt cx="0" cy="0"/>
+        </a:xfrm>
+      </p:grpSpPr>
+      <p:sp>
+        <p:nvSpPr>
+          <p:cNvPr id="2" name="Segnaposto immagine diapositiva 1"/>
+          <p:cNvSpPr>
+            <a:spLocks noGrp="1" noRot="1" noChangeAspect="1"/>
+          </p:cNvSpPr>
+          <p:nvPr>
+            <p:ph type="sldImg"/>
+          </p:nvPr>
+        </p:nvSpPr>
+        <p:spPr/>
+      </p:sp>
+      <p:sp>
+        <p:nvSpPr>
+          <p:cNvPr id="3" name="Segnaposto note 2"/>
+          <p:cNvSpPr>
+            <a:spLocks noGrp="1"/>
+          </p:cNvSpPr>
+          <p:nvPr>
+            <p:ph type="body" idx="1"/>
+          </p:nvPr>
+        </p:nvSpPr>
+        <p:spPr/>
+        <p:txBody>
+          <a:bodyPr/>
+          <a:lstStyle/>
+          <a:p>
+            <a:endParaRPr lang="it-IT"/>
+          </a:p>
+        </p:txBody>
+      </p:sp>
+      <p:sp>
+        <p:nvSpPr>
+          <p:cNvPr id="4" name="Segnaposto numero diapositiva 3"/>
+          <p:cNvSpPr>
+            <a:spLocks noGrp="1"/>
+          </p:cNvSpPr>
+          <p:nvPr>
+            <p:ph type="sldNum" sz="quarter" idx="5"/>
+          </p:nvPr>
+        </p:nvSpPr>
+        <p:spPr/>
+        <p:txBody>
+          <a:bodyPr/>
+          <a:lstStyle/>
+          <a:p>
+            <a:pPr marL="0" marR="0" lvl="0" indent="0" algn="r" defTabSz="457200" rtl="0" eaLnBrk="1" fontAlgn="auto" latinLnBrk="0" hangingPunct="1">
+              <a:lnSpc>
+                <a:spcPct val="100000"/>
+              </a:lnSpc>
+              <a:spcBef>
+                <a:spcPts val="0"/>
+              </a:spcBef>
+              <a:spcAft>
+                <a:spcPts val="0"/>
+              </a:spcAft>
+              <a:buClrTx/>
+              <a:buSzTx/>
+              <a:buFontTx/>
+              <a:buNone/>
+              <a:tabLst/>
+              <a:defRPr/>
+            </a:pPr>
+            <a:fld id="{439E4B1C-0B36-B34E-B5D3-9687301EE318}" type="slidenum">
+              <a:rPr kumimoji="0" lang="it-IT" sz="1200" b="0" i="0" u="none" strike="noStrike" kern="1200" cap="none" spc="0" normalizeH="0" baseline="0" noProof="0" smtClean="0">
+                <a:ln>
+                  <a:noFill/>
+                </a:ln>
+                <a:solidFill>
+                  <a:prstClr val="black"/>
+                </a:solidFill>
+                <a:effectLst/>
+                <a:uLnTx/>
+                <a:uFillTx/>
+                <a:latin typeface="Aptos" panose="02110004020202020204"/>
+                <a:ea typeface="+mn-ea"/>
+                <a:cs typeface="+mn-cs"/>
+              </a:rPr>
+              <a:pPr marL="0" marR="0" lvl="0" indent="0" algn="r" defTabSz="457200" rtl="0" eaLnBrk="1" fontAlgn="auto" latinLnBrk="0" hangingPunct="1">
+                <a:lnSpc>
+                  <a:spcPct val="100000"/>
+                </a:lnSpc>
+                <a:spcBef>
+                  <a:spcPts val="0"/>
+                </a:spcBef>
+                <a:spcAft>
+                  <a:spcPts val="0"/>
+                </a:spcAft>
+                <a:buClrTx/>
+                <a:buSzTx/>
+                <a:buFontTx/>
+                <a:buNone/>
+                <a:tabLst/>
+                <a:defRPr/>
+              </a:pPr>
+              <a:t>12</a:t>
+            </a:fld>
+            <a:endParaRPr kumimoji="0" lang="it-IT" sz="1200" b="0" i="0" u="none" strike="noStrike" kern="1200" cap="none" spc="0" normalizeH="0" baseline="0" noProof="0">
+              <a:ln>
+                <a:noFill/>
+              </a:ln>
+              <a:solidFill>
+                <a:prstClr val="black"/>
+              </a:solidFill>
+              <a:effectLst/>
+              <a:uLnTx/>
+              <a:uFillTx/>
+              <a:latin typeface="Aptos" panose="02110004020202020204"/>
+              <a:ea typeface="+mn-ea"/>
+              <a:cs typeface="+mn-cs"/>
+            </a:endParaRPr>
+          </a:p>
+        </p:txBody>
+      </p:sp>
+    </p:spTree>
+    <p:extLst>
+      <p:ext uri="{BB962C8B-B14F-4D97-AF65-F5344CB8AC3E}">
+        <p14:creationId xmlns:p14="http://schemas.microsoft.com/office/powerpoint/2010/main" val="3039083169"/>
+      </p:ext>
+    </p:extLst>
+  </p:cSld>
+  <p:clrMapOvr>
+    <a:masterClrMapping/>
+  </p:clrMapOvr>
+</p:notes>
+</file>
+
+<file path=ppt/notesSlides/notesSlide13.xml><?xml version="1.0" encoding="utf-8"?>
+<p:notes xmlns:a="http://schemas.openxmlformats.org/drawingml/2006/main" xmlns:r="http://schemas.openxmlformats.org/officeDocument/2006/relationships" xmlns:p="http://schemas.openxmlformats.org/presentationml/2006/main">
+  <p:cSld>
+    <p:spTree>
+      <p:nvGrpSpPr>
+        <p:cNvPr id="1" name=""/>
+        <p:cNvGrpSpPr/>
+        <p:nvPr/>
+      </p:nvGrpSpPr>
+      <p:grpSpPr>
+        <a:xfrm>
+          <a:off x="0" y="0"/>
+          <a:ext cx="0" cy="0"/>
+          <a:chOff x="0" y="0"/>
+          <a:chExt cx="0" cy="0"/>
+        </a:xfrm>
+      </p:grpSpPr>
+      <p:sp>
+        <p:nvSpPr>
+          <p:cNvPr id="2" name="Segnaposto immagine diapositiva 1"/>
+          <p:cNvSpPr>
+            <a:spLocks noGrp="1" noRot="1" noChangeAspect="1"/>
+          </p:cNvSpPr>
+          <p:nvPr>
+            <p:ph type="sldImg"/>
+          </p:nvPr>
+        </p:nvSpPr>
+        <p:spPr/>
+      </p:sp>
+      <p:sp>
+        <p:nvSpPr>
+          <p:cNvPr id="3" name="Segnaposto note 2"/>
+          <p:cNvSpPr>
+            <a:spLocks noGrp="1"/>
+          </p:cNvSpPr>
+          <p:nvPr>
+            <p:ph type="body" idx="1"/>
+          </p:nvPr>
+        </p:nvSpPr>
+        <p:spPr/>
+        <p:txBody>
+          <a:bodyPr/>
+          <a:lstStyle/>
+          <a:p>
+            <a:endParaRPr lang="it-IT"/>
+          </a:p>
+        </p:txBody>
+      </p:sp>
+      <p:sp>
+        <p:nvSpPr>
+          <p:cNvPr id="4" name="Segnaposto numero diapositiva 3"/>
+          <p:cNvSpPr>
+            <a:spLocks noGrp="1"/>
+          </p:cNvSpPr>
+          <p:nvPr>
+            <p:ph type="sldNum" sz="quarter" idx="5"/>
+          </p:nvPr>
+        </p:nvSpPr>
+        <p:spPr/>
+        <p:txBody>
+          <a:bodyPr/>
+          <a:lstStyle/>
+          <a:p>
+            <a:pPr marL="0" marR="0" lvl="0" indent="0" algn="r" defTabSz="457200" rtl="0" eaLnBrk="1" fontAlgn="auto" latinLnBrk="0" hangingPunct="1">
+              <a:lnSpc>
+                <a:spcPct val="100000"/>
+              </a:lnSpc>
+              <a:spcBef>
+                <a:spcPts val="0"/>
+              </a:spcBef>
+              <a:spcAft>
+                <a:spcPts val="0"/>
+              </a:spcAft>
+              <a:buClrTx/>
+              <a:buSzTx/>
+              <a:buFontTx/>
+              <a:buNone/>
+              <a:tabLst/>
+              <a:defRPr/>
+            </a:pPr>
+            <a:fld id="{439E4B1C-0B36-B34E-B5D3-9687301EE318}" type="slidenum">
+              <a:rPr kumimoji="0" lang="it-IT" sz="1200" b="0" i="0" u="none" strike="noStrike" kern="1200" cap="none" spc="0" normalizeH="0" baseline="0" noProof="0" smtClean="0">
+                <a:ln>
+                  <a:noFill/>
+                </a:ln>
+                <a:solidFill>
+                  <a:prstClr val="black"/>
+                </a:solidFill>
+                <a:effectLst/>
+                <a:uLnTx/>
+                <a:uFillTx/>
+                <a:latin typeface="Aptos" panose="02110004020202020204"/>
+                <a:ea typeface="+mn-ea"/>
+                <a:cs typeface="+mn-cs"/>
+              </a:rPr>
+              <a:pPr marL="0" marR="0" lvl="0" indent="0" algn="r" defTabSz="457200" rtl="0" eaLnBrk="1" fontAlgn="auto" latinLnBrk="0" hangingPunct="1">
+                <a:lnSpc>
+                  <a:spcPct val="100000"/>
+                </a:lnSpc>
+                <a:spcBef>
+                  <a:spcPts val="0"/>
+                </a:spcBef>
+                <a:spcAft>
+                  <a:spcPts val="0"/>
+                </a:spcAft>
+                <a:buClrTx/>
+                <a:buSzTx/>
+                <a:buFontTx/>
+                <a:buNone/>
+                <a:tabLst/>
+                <a:defRPr/>
+              </a:pPr>
+              <a:t>13</a:t>
+            </a:fld>
+            <a:endParaRPr kumimoji="0" lang="it-IT" sz="1200" b="0" i="0" u="none" strike="noStrike" kern="1200" cap="none" spc="0" normalizeH="0" baseline="0" noProof="0">
+              <a:ln>
+                <a:noFill/>
+              </a:ln>
+              <a:solidFill>
+                <a:prstClr val="black"/>
+              </a:solidFill>
+              <a:effectLst/>
+              <a:uLnTx/>
+              <a:uFillTx/>
+              <a:latin typeface="Aptos" panose="02110004020202020204"/>
+              <a:ea typeface="+mn-ea"/>
+              <a:cs typeface="+mn-cs"/>
+            </a:endParaRPr>
+          </a:p>
+        </p:txBody>
+      </p:sp>
+    </p:spTree>
+    <p:extLst>
+      <p:ext uri="{BB962C8B-B14F-4D97-AF65-F5344CB8AC3E}">
+        <p14:creationId xmlns:p14="http://schemas.microsoft.com/office/powerpoint/2010/main" val="3328153749"/>
+      </p:ext>
+    </p:extLst>
+  </p:cSld>
+  <p:clrMapOvr>
+    <a:masterClrMapping/>
+  </p:clrMapOvr>
+</p:notes>
+</file>
+
+<file path=ppt/notesSlides/notesSlide14.xml><?xml version="1.0" encoding="utf-8"?>
+<p:notes xmlns:a="http://schemas.openxmlformats.org/drawingml/2006/main" xmlns:r="http://schemas.openxmlformats.org/officeDocument/2006/relationships" xmlns:p="http://schemas.openxmlformats.org/presentationml/2006/main">
+  <p:cSld>
+    <p:spTree>
+      <p:nvGrpSpPr>
+        <p:cNvPr id="1" name=""/>
+        <p:cNvGrpSpPr/>
+        <p:nvPr/>
+      </p:nvGrpSpPr>
+      <p:grpSpPr>
+        <a:xfrm>
+          <a:off x="0" y="0"/>
+          <a:ext cx="0" cy="0"/>
+          <a:chOff x="0" y="0"/>
+          <a:chExt cx="0" cy="0"/>
+        </a:xfrm>
+      </p:grpSpPr>
+      <p:sp>
+        <p:nvSpPr>
+          <p:cNvPr id="2" name="Segnaposto immagine diapositiva 1"/>
+          <p:cNvSpPr>
+            <a:spLocks noGrp="1" noRot="1" noChangeAspect="1"/>
+          </p:cNvSpPr>
+          <p:nvPr>
+            <p:ph type="sldImg"/>
+          </p:nvPr>
+        </p:nvSpPr>
+        <p:spPr/>
+      </p:sp>
+      <p:sp>
+        <p:nvSpPr>
+          <p:cNvPr id="3" name="Segnaposto note 2"/>
+          <p:cNvSpPr>
+            <a:spLocks noGrp="1"/>
+          </p:cNvSpPr>
+          <p:nvPr>
+            <p:ph type="body" idx="1"/>
+          </p:nvPr>
+        </p:nvSpPr>
+        <p:spPr/>
+        <p:txBody>
+          <a:bodyPr/>
+          <a:lstStyle/>
+          <a:p>
+            <a:endParaRPr lang="it-IT"/>
+          </a:p>
+        </p:txBody>
+      </p:sp>
+      <p:sp>
+        <p:nvSpPr>
+          <p:cNvPr id="4" name="Segnaposto numero diapositiva 3"/>
+          <p:cNvSpPr>
+            <a:spLocks noGrp="1"/>
+          </p:cNvSpPr>
+          <p:nvPr>
+            <p:ph type="sldNum" sz="quarter" idx="5"/>
+          </p:nvPr>
+        </p:nvSpPr>
+        <p:spPr/>
+        <p:txBody>
+          <a:bodyPr/>
+          <a:lstStyle/>
+          <a:p>
+            <a:pPr marL="0" marR="0" lvl="0" indent="0" algn="r" defTabSz="457200" rtl="0" eaLnBrk="1" fontAlgn="auto" latinLnBrk="0" hangingPunct="1">
+              <a:lnSpc>
+                <a:spcPct val="100000"/>
+              </a:lnSpc>
+              <a:spcBef>
+                <a:spcPts val="0"/>
+              </a:spcBef>
+              <a:spcAft>
+                <a:spcPts val="0"/>
+              </a:spcAft>
+              <a:buClrTx/>
+              <a:buSzTx/>
+              <a:buFontTx/>
+              <a:buNone/>
+              <a:tabLst/>
+              <a:defRPr/>
+            </a:pPr>
+            <a:fld id="{439E4B1C-0B36-B34E-B5D3-9687301EE318}" type="slidenum">
+              <a:rPr kumimoji="0" lang="it-IT" sz="1200" b="0" i="0" u="none" strike="noStrike" kern="1200" cap="none" spc="0" normalizeH="0" baseline="0" noProof="0" smtClean="0">
+                <a:ln>
+                  <a:noFill/>
+                </a:ln>
+                <a:solidFill>
+                  <a:prstClr val="black"/>
+                </a:solidFill>
+                <a:effectLst/>
+                <a:uLnTx/>
+                <a:uFillTx/>
+                <a:latin typeface="Aptos" panose="02110004020202020204"/>
+                <a:ea typeface="+mn-ea"/>
+                <a:cs typeface="+mn-cs"/>
+              </a:rPr>
+              <a:pPr marL="0" marR="0" lvl="0" indent="0" algn="r" defTabSz="457200" rtl="0" eaLnBrk="1" fontAlgn="auto" latinLnBrk="0" hangingPunct="1">
+                <a:lnSpc>
+                  <a:spcPct val="100000"/>
+                </a:lnSpc>
+                <a:spcBef>
+                  <a:spcPts val="0"/>
+                </a:spcBef>
+                <a:spcAft>
+                  <a:spcPts val="0"/>
+                </a:spcAft>
+                <a:buClrTx/>
+                <a:buSzTx/>
+                <a:buFontTx/>
+                <a:buNone/>
+                <a:tabLst/>
+                <a:defRPr/>
+              </a:pPr>
+              <a:t>14</a:t>
+            </a:fld>
+            <a:endParaRPr kumimoji="0" lang="it-IT" sz="1200" b="0" i="0" u="none" strike="noStrike" kern="1200" cap="none" spc="0" normalizeH="0" baseline="0" noProof="0">
+              <a:ln>
+                <a:noFill/>
+              </a:ln>
+              <a:solidFill>
+                <a:prstClr val="black"/>
+              </a:solidFill>
+              <a:effectLst/>
+              <a:uLnTx/>
+              <a:uFillTx/>
+              <a:latin typeface="Aptos" panose="02110004020202020204"/>
+              <a:ea typeface="+mn-ea"/>
+              <a:cs typeface="+mn-cs"/>
+            </a:endParaRPr>
+          </a:p>
+        </p:txBody>
+      </p:sp>
+    </p:spTree>
+    <p:extLst>
+      <p:ext uri="{BB962C8B-B14F-4D97-AF65-F5344CB8AC3E}">
+        <p14:creationId xmlns:p14="http://schemas.microsoft.com/office/powerpoint/2010/main" val="1176942712"/>
+      </p:ext>
+    </p:extLst>
+  </p:cSld>
+  <p:clrMapOvr>
+    <a:masterClrMapping/>
+  </p:clrMapOvr>
+</p:notes>
+</file>
+
+<file path=ppt/notesSlides/notesSlide15.xml><?xml version="1.0" encoding="utf-8"?>
+<p:notes xmlns:a="http://schemas.openxmlformats.org/drawingml/2006/main" xmlns:r="http://schemas.openxmlformats.org/officeDocument/2006/relationships" xmlns:p="http://schemas.openxmlformats.org/presentationml/2006/main">
+  <p:cSld>
+    <p:spTree>
+      <p:nvGrpSpPr>
+        <p:cNvPr id="1" name=""/>
+        <p:cNvGrpSpPr/>
+        <p:nvPr/>
+      </p:nvGrpSpPr>
+      <p:grpSpPr>
+        <a:xfrm>
+          <a:off x="0" y="0"/>
+          <a:ext cx="0" cy="0"/>
+          <a:chOff x="0" y="0"/>
+          <a:chExt cx="0" cy="0"/>
+        </a:xfrm>
+      </p:grpSpPr>
+      <p:sp>
+        <p:nvSpPr>
+          <p:cNvPr id="2" name="Segnaposto immagine diapositiva 1"/>
+          <p:cNvSpPr>
+            <a:spLocks noGrp="1" noRot="1" noChangeAspect="1"/>
+          </p:cNvSpPr>
+          <p:nvPr>
+            <p:ph type="sldImg"/>
+          </p:nvPr>
+        </p:nvSpPr>
+        <p:spPr/>
+      </p:sp>
+      <p:sp>
+        <p:nvSpPr>
+          <p:cNvPr id="3" name="Segnaposto note 2"/>
+          <p:cNvSpPr>
+            <a:spLocks noGrp="1"/>
+          </p:cNvSpPr>
+          <p:nvPr>
+            <p:ph type="body" idx="1"/>
+          </p:nvPr>
+        </p:nvSpPr>
+        <p:spPr/>
+        <p:txBody>
+          <a:bodyPr/>
+          <a:lstStyle/>
+          <a:p>
+            <a:endParaRPr lang="it-IT"/>
+          </a:p>
+        </p:txBody>
+      </p:sp>
+      <p:sp>
+        <p:nvSpPr>
+          <p:cNvPr id="4" name="Segnaposto numero diapositiva 3"/>
+          <p:cNvSpPr>
+            <a:spLocks noGrp="1"/>
+          </p:cNvSpPr>
+          <p:nvPr>
+            <p:ph type="sldNum" sz="quarter" idx="5"/>
+          </p:nvPr>
+        </p:nvSpPr>
+        <p:spPr/>
+        <p:txBody>
+          <a:bodyPr/>
+          <a:lstStyle/>
+          <a:p>
+            <a:pPr marL="0" marR="0" lvl="0" indent="0" algn="r" defTabSz="457200" rtl="0" eaLnBrk="1" fontAlgn="auto" latinLnBrk="0" hangingPunct="1">
+              <a:lnSpc>
+                <a:spcPct val="100000"/>
+              </a:lnSpc>
+              <a:spcBef>
+                <a:spcPts val="0"/>
+              </a:spcBef>
+              <a:spcAft>
+                <a:spcPts val="0"/>
+              </a:spcAft>
+              <a:buClrTx/>
+              <a:buSzTx/>
+              <a:buFontTx/>
+              <a:buNone/>
+              <a:tabLst/>
+              <a:defRPr/>
+            </a:pPr>
+            <a:fld id="{439E4B1C-0B36-B34E-B5D3-9687301EE318}" type="slidenum">
+              <a:rPr kumimoji="0" lang="it-IT" sz="1200" b="0" i="0" u="none" strike="noStrike" kern="1200" cap="none" spc="0" normalizeH="0" baseline="0" noProof="0" smtClean="0">
+                <a:ln>
+                  <a:noFill/>
+                </a:ln>
+                <a:solidFill>
+                  <a:prstClr val="black"/>
+                </a:solidFill>
+                <a:effectLst/>
+                <a:uLnTx/>
+                <a:uFillTx/>
+                <a:latin typeface="Aptos" panose="02110004020202020204"/>
+                <a:ea typeface="+mn-ea"/>
+                <a:cs typeface="+mn-cs"/>
+              </a:rPr>
+              <a:pPr marL="0" marR="0" lvl="0" indent="0" algn="r" defTabSz="457200" rtl="0" eaLnBrk="1" fontAlgn="auto" latinLnBrk="0" hangingPunct="1">
+                <a:lnSpc>
+                  <a:spcPct val="100000"/>
+                </a:lnSpc>
+                <a:spcBef>
+                  <a:spcPts val="0"/>
+                </a:spcBef>
+                <a:spcAft>
+                  <a:spcPts val="0"/>
+                </a:spcAft>
+                <a:buClrTx/>
+                <a:buSzTx/>
+                <a:buFontTx/>
+                <a:buNone/>
+                <a:tabLst/>
+                <a:defRPr/>
+              </a:pPr>
+              <a:t>15</a:t>
+            </a:fld>
+            <a:endParaRPr kumimoji="0" lang="it-IT" sz="1200" b="0" i="0" u="none" strike="noStrike" kern="1200" cap="none" spc="0" normalizeH="0" baseline="0" noProof="0">
+              <a:ln>
+                <a:noFill/>
+              </a:ln>
+              <a:solidFill>
+                <a:prstClr val="black"/>
+              </a:solidFill>
+              <a:effectLst/>
+              <a:uLnTx/>
+              <a:uFillTx/>
+              <a:latin typeface="Aptos" panose="02110004020202020204"/>
+              <a:ea typeface="+mn-ea"/>
+              <a:cs typeface="+mn-cs"/>
+            </a:endParaRPr>
+          </a:p>
+        </p:txBody>
+      </p:sp>
+    </p:spTree>
+    <p:extLst>
+      <p:ext uri="{BB962C8B-B14F-4D97-AF65-F5344CB8AC3E}">
+        <p14:creationId xmlns:p14="http://schemas.microsoft.com/office/powerpoint/2010/main" val="1577744885"/>
+      </p:ext>
+    </p:extLst>
+  </p:cSld>
+  <p:clrMapOvr>
+    <a:masterClrMapping/>
+  </p:clrMapOvr>
+</p:notes>
+</file>
+
+<file path=ppt/notesSlides/notesSlide16.xml><?xml version="1.0" encoding="utf-8"?>
+<p:notes xmlns:a="http://schemas.openxmlformats.org/drawingml/2006/main" xmlns:r="http://schemas.openxmlformats.org/officeDocument/2006/relationships" xmlns:p="http://schemas.openxmlformats.org/presentationml/2006/main">
+  <p:cSld>
+    <p:spTree>
+      <p:nvGrpSpPr>
+        <p:cNvPr id="1" name=""/>
+        <p:cNvGrpSpPr/>
+        <p:nvPr/>
+      </p:nvGrpSpPr>
+      <p:grpSpPr>
+        <a:xfrm>
+          <a:off x="0" y="0"/>
+          <a:ext cx="0" cy="0"/>
+          <a:chOff x="0" y="0"/>
+          <a:chExt cx="0" cy="0"/>
+        </a:xfrm>
+      </p:grpSpPr>
+      <p:sp>
+        <p:nvSpPr>
+          <p:cNvPr id="2" name="Segnaposto immagine diapositiva 1"/>
+          <p:cNvSpPr>
+            <a:spLocks noGrp="1" noRot="1" noChangeAspect="1"/>
+          </p:cNvSpPr>
+          <p:nvPr>
+            <p:ph type="sldImg"/>
+          </p:nvPr>
+        </p:nvSpPr>
+        <p:spPr/>
+      </p:sp>
+      <p:sp>
+        <p:nvSpPr>
+          <p:cNvPr id="3" name="Segnaposto note 2"/>
+          <p:cNvSpPr>
+            <a:spLocks noGrp="1"/>
+          </p:cNvSpPr>
+          <p:nvPr>
+            <p:ph type="body" idx="1"/>
+          </p:nvPr>
+        </p:nvSpPr>
+        <p:spPr/>
+        <p:txBody>
+          <a:bodyPr/>
+          <a:lstStyle/>
+          <a:p>
+            <a:endParaRPr lang="it-IT"/>
+          </a:p>
+        </p:txBody>
+      </p:sp>
+      <p:sp>
+        <p:nvSpPr>
+          <p:cNvPr id="4" name="Segnaposto numero diapositiva 3"/>
+          <p:cNvSpPr>
+            <a:spLocks noGrp="1"/>
+          </p:cNvSpPr>
+          <p:nvPr>
+            <p:ph type="sldNum" sz="quarter" idx="5"/>
+          </p:nvPr>
+        </p:nvSpPr>
+        <p:spPr/>
+        <p:txBody>
+          <a:bodyPr/>
+          <a:lstStyle/>
+          <a:p>
+            <a:pPr marL="0" marR="0" lvl="0" indent="0" algn="r" defTabSz="457200" rtl="0" eaLnBrk="1" fontAlgn="auto" latinLnBrk="0" hangingPunct="1">
+              <a:lnSpc>
+                <a:spcPct val="100000"/>
+              </a:lnSpc>
+              <a:spcBef>
+                <a:spcPts val="0"/>
+              </a:spcBef>
+              <a:spcAft>
+                <a:spcPts val="0"/>
+              </a:spcAft>
+              <a:buClrTx/>
+              <a:buSzTx/>
+              <a:buFontTx/>
+              <a:buNone/>
+              <a:tabLst/>
+              <a:defRPr/>
+            </a:pPr>
+            <a:fld id="{439E4B1C-0B36-B34E-B5D3-9687301EE318}" type="slidenum">
+              <a:rPr kumimoji="0" lang="it-IT" sz="1200" b="0" i="0" u="none" strike="noStrike" kern="1200" cap="none" spc="0" normalizeH="0" baseline="0" noProof="0" smtClean="0">
+                <a:ln>
+                  <a:noFill/>
+                </a:ln>
+                <a:solidFill>
+                  <a:prstClr val="black"/>
+                </a:solidFill>
+                <a:effectLst/>
+                <a:uLnTx/>
+                <a:uFillTx/>
+                <a:latin typeface="Aptos" panose="02110004020202020204"/>
+                <a:ea typeface="+mn-ea"/>
+                <a:cs typeface="+mn-cs"/>
+              </a:rPr>
+              <a:pPr marL="0" marR="0" lvl="0" indent="0" algn="r" defTabSz="457200" rtl="0" eaLnBrk="1" fontAlgn="auto" latinLnBrk="0" hangingPunct="1">
+                <a:lnSpc>
+                  <a:spcPct val="100000"/>
+                </a:lnSpc>
+                <a:spcBef>
+                  <a:spcPts val="0"/>
+                </a:spcBef>
+                <a:spcAft>
+                  <a:spcPts val="0"/>
+                </a:spcAft>
+                <a:buClrTx/>
+                <a:buSzTx/>
+                <a:buFontTx/>
+                <a:buNone/>
+                <a:tabLst/>
+                <a:defRPr/>
+              </a:pPr>
+              <a:t>16</a:t>
+            </a:fld>
+            <a:endParaRPr kumimoji="0" lang="it-IT" sz="1200" b="0" i="0" u="none" strike="noStrike" kern="1200" cap="none" spc="0" normalizeH="0" baseline="0" noProof="0">
+              <a:ln>
+                <a:noFill/>
+              </a:ln>
+              <a:solidFill>
+                <a:prstClr val="black"/>
+              </a:solidFill>
+              <a:effectLst/>
+              <a:uLnTx/>
+              <a:uFillTx/>
+              <a:latin typeface="Aptos" panose="02110004020202020204"/>
+              <a:ea typeface="+mn-ea"/>
+              <a:cs typeface="+mn-cs"/>
+            </a:endParaRPr>
+          </a:p>
+        </p:txBody>
+      </p:sp>
+    </p:spTree>
+    <p:extLst>
+      <p:ext uri="{BB962C8B-B14F-4D97-AF65-F5344CB8AC3E}">
+        <p14:creationId xmlns:p14="http://schemas.microsoft.com/office/powerpoint/2010/main" val="1811558495"/>
+      </p:ext>
+    </p:extLst>
+  </p:cSld>
+  <p:clrMapOvr>
+    <a:masterClrMapping/>
+  </p:clrMapOvr>
+</p:notes>
+</file>
+
+<file path=ppt/notesSlides/notesSlide17.xml><?xml version="1.0" encoding="utf-8"?>
+<p:notes xmlns:a="http://schemas.openxmlformats.org/drawingml/2006/main" xmlns:r="http://schemas.openxmlformats.org/officeDocument/2006/relationships" xmlns:p="http://schemas.openxmlformats.org/presentationml/2006/main">
+  <p:cSld>
+    <p:spTree>
+      <p:nvGrpSpPr>
+        <p:cNvPr id="1" name=""/>
+        <p:cNvGrpSpPr/>
+        <p:nvPr/>
+      </p:nvGrpSpPr>
+      <p:grpSpPr>
+        <a:xfrm>
+          <a:off x="0" y="0"/>
+          <a:ext cx="0" cy="0"/>
+          <a:chOff x="0" y="0"/>
+          <a:chExt cx="0" cy="0"/>
+        </a:xfrm>
+      </p:grpSpPr>
+      <p:sp>
+        <p:nvSpPr>
+          <p:cNvPr id="2" name="Segnaposto immagine diapositiva 1"/>
+          <p:cNvSpPr>
+            <a:spLocks noGrp="1" noRot="1" noChangeAspect="1"/>
+          </p:cNvSpPr>
+          <p:nvPr>
+            <p:ph type="sldImg"/>
+          </p:nvPr>
+        </p:nvSpPr>
+        <p:spPr/>
+      </p:sp>
+      <p:sp>
+        <p:nvSpPr>
+          <p:cNvPr id="3" name="Segnaposto note 2"/>
+          <p:cNvSpPr>
+            <a:spLocks noGrp="1"/>
+          </p:cNvSpPr>
+          <p:nvPr>
+            <p:ph type="body" idx="1"/>
+          </p:nvPr>
+        </p:nvSpPr>
+        <p:spPr/>
+        <p:txBody>
+          <a:bodyPr/>
+          <a:lstStyle/>
+          <a:p>
+            <a:endParaRPr lang="it-IT"/>
+          </a:p>
+        </p:txBody>
+      </p:sp>
+      <p:sp>
+        <p:nvSpPr>
+          <p:cNvPr id="4" name="Segnaposto numero diapositiva 3"/>
+          <p:cNvSpPr>
+            <a:spLocks noGrp="1"/>
+          </p:cNvSpPr>
+          <p:nvPr>
+            <p:ph type="sldNum" sz="quarter" idx="5"/>
+          </p:nvPr>
+        </p:nvSpPr>
+        <p:spPr/>
+        <p:txBody>
+          <a:bodyPr/>
+          <a:lstStyle/>
+          <a:p>
+            <a:pPr marL="0" marR="0" lvl="0" indent="0" algn="r" defTabSz="457200" rtl="0" eaLnBrk="1" fontAlgn="auto" latinLnBrk="0" hangingPunct="1">
+              <a:lnSpc>
+                <a:spcPct val="100000"/>
+              </a:lnSpc>
+              <a:spcBef>
+                <a:spcPts val="0"/>
+              </a:spcBef>
+              <a:spcAft>
+                <a:spcPts val="0"/>
+              </a:spcAft>
+              <a:buClrTx/>
+              <a:buSzTx/>
+              <a:buFontTx/>
+              <a:buNone/>
+              <a:tabLst/>
+              <a:defRPr/>
+            </a:pPr>
+            <a:fld id="{439E4B1C-0B36-B34E-B5D3-9687301EE318}" type="slidenum">
+              <a:rPr kumimoji="0" lang="it-IT" sz="1200" b="0" i="0" u="none" strike="noStrike" kern="1200" cap="none" spc="0" normalizeH="0" baseline="0" noProof="0" smtClean="0">
+                <a:ln>
+                  <a:noFill/>
+                </a:ln>
+                <a:solidFill>
+                  <a:prstClr val="black"/>
+                </a:solidFill>
+                <a:effectLst/>
+                <a:uLnTx/>
+                <a:uFillTx/>
+                <a:latin typeface="Aptos" panose="02110004020202020204"/>
+                <a:ea typeface="+mn-ea"/>
+                <a:cs typeface="+mn-cs"/>
+              </a:rPr>
+              <a:pPr marL="0" marR="0" lvl="0" indent="0" algn="r" defTabSz="457200" rtl="0" eaLnBrk="1" fontAlgn="auto" latinLnBrk="0" hangingPunct="1">
+                <a:lnSpc>
+                  <a:spcPct val="100000"/>
+                </a:lnSpc>
+                <a:spcBef>
+                  <a:spcPts val="0"/>
+                </a:spcBef>
+                <a:spcAft>
+                  <a:spcPts val="0"/>
+                </a:spcAft>
+                <a:buClrTx/>
+                <a:buSzTx/>
+                <a:buFontTx/>
+                <a:buNone/>
+                <a:tabLst/>
+                <a:defRPr/>
+              </a:pPr>
+              <a:t>17</a:t>
+            </a:fld>
+            <a:endParaRPr kumimoji="0" lang="it-IT" sz="1200" b="0" i="0" u="none" strike="noStrike" kern="1200" cap="none" spc="0" normalizeH="0" baseline="0" noProof="0">
+              <a:ln>
+                <a:noFill/>
+              </a:ln>
+              <a:solidFill>
+                <a:prstClr val="black"/>
+              </a:solidFill>
+              <a:effectLst/>
+              <a:uLnTx/>
+              <a:uFillTx/>
+              <a:latin typeface="Aptos" panose="02110004020202020204"/>
+              <a:ea typeface="+mn-ea"/>
+              <a:cs typeface="+mn-cs"/>
+            </a:endParaRPr>
+          </a:p>
+        </p:txBody>
+      </p:sp>
+    </p:spTree>
+    <p:extLst>
+      <p:ext uri="{BB962C8B-B14F-4D97-AF65-F5344CB8AC3E}">
+        <p14:creationId xmlns:p14="http://schemas.microsoft.com/office/powerpoint/2010/main" val="1150424366"/>
+      </p:ext>
+    </p:extLst>
+  </p:cSld>
+  <p:clrMapOvr>
+    <a:masterClrMapping/>
+  </p:clrMapOvr>
+</p:notes>
+</file>
+
 <file path=ppt/notesSlides/notesSlide2.xml><?xml version="1.0" encoding="utf-8"?>
 <p:notes xmlns:a="http://schemas.openxmlformats.org/drawingml/2006/main" xmlns:r="http://schemas.openxmlformats.org/officeDocument/2006/relationships" xmlns:p="http://schemas.openxmlformats.org/presentationml/2006/main">
   <p:cSld>
@@ -1129,6 +2295,150 @@
     <p:extLst>
       <p:ext uri="{BB962C8B-B14F-4D97-AF65-F5344CB8AC3E}">
         <p14:creationId xmlns:p14="http://schemas.microsoft.com/office/powerpoint/2010/main" val="2071077049"/>
+      </p:ext>
+    </p:extLst>
+  </p:cSld>
+  <p:clrMapOvr>
+    <a:masterClrMapping/>
+  </p:clrMapOvr>
+</p:notes>
+</file>
+
+<file path=ppt/notesSlides/notesSlide9.xml><?xml version="1.0" encoding="utf-8"?>
+<p:notes xmlns:a="http://schemas.openxmlformats.org/drawingml/2006/main" xmlns:r="http://schemas.openxmlformats.org/officeDocument/2006/relationships" xmlns:p="http://schemas.openxmlformats.org/presentationml/2006/main">
+  <p:cSld>
+    <p:spTree>
+      <p:nvGrpSpPr>
+        <p:cNvPr id="1" name=""/>
+        <p:cNvGrpSpPr/>
+        <p:nvPr/>
+      </p:nvGrpSpPr>
+      <p:grpSpPr>
+        <a:xfrm>
+          <a:off x="0" y="0"/>
+          <a:ext cx="0" cy="0"/>
+          <a:chOff x="0" y="0"/>
+          <a:chExt cx="0" cy="0"/>
+        </a:xfrm>
+      </p:grpSpPr>
+      <p:sp>
+        <p:nvSpPr>
+          <p:cNvPr id="2" name="Segnaposto immagine diapositiva 1"/>
+          <p:cNvSpPr>
+            <a:spLocks noGrp="1" noRot="1" noChangeAspect="1"/>
+          </p:cNvSpPr>
+          <p:nvPr>
+            <p:ph type="sldImg"/>
+          </p:nvPr>
+        </p:nvSpPr>
+        <p:spPr/>
+      </p:sp>
+      <p:sp>
+        <p:nvSpPr>
+          <p:cNvPr id="3" name="Segnaposto note 2"/>
+          <p:cNvSpPr>
+            <a:spLocks noGrp="1"/>
+          </p:cNvSpPr>
+          <p:nvPr>
+            <p:ph type="body" idx="1"/>
+          </p:nvPr>
+        </p:nvSpPr>
+        <p:spPr/>
+        <p:txBody>
+          <a:bodyPr/>
+          <a:lstStyle/>
+          <a:p>
+            <a:endParaRPr lang="it-IT"/>
+          </a:p>
+        </p:txBody>
+      </p:sp>
+      <p:sp>
+        <p:nvSpPr>
+          <p:cNvPr id="4" name="Segnaposto numero diapositiva 3"/>
+          <p:cNvSpPr>
+            <a:spLocks noGrp="1"/>
+          </p:cNvSpPr>
+          <p:nvPr>
+            <p:ph type="sldNum" sz="quarter" idx="5"/>
+          </p:nvPr>
+        </p:nvSpPr>
+        <p:spPr/>
+        <p:txBody>
+          <a:bodyPr/>
+          <a:lstStyle/>
+          <a:p>
+            <a:pPr marL="0" marR="0" lvl="0" indent="0" algn="r" defTabSz="457200" rtl="0" eaLnBrk="1" fontAlgn="auto" latinLnBrk="0" hangingPunct="1">
+              <a:lnSpc>
+                <a:spcPct val="100000"/>
+              </a:lnSpc>
+              <a:spcBef>
+                <a:spcPts val="0"/>
+              </a:spcBef>
+              <a:spcAft>
+                <a:spcPts val="0"/>
+              </a:spcAft>
+              <a:buClrTx/>
+              <a:buSzTx/>
+              <a:buFontTx/>
+              <a:buNone/>
+              <a:tabLst/>
+              <a:defRPr/>
+            </a:pPr>
+            <a:fld id="{439E4B1C-0B36-B34E-B5D3-9687301EE318}" type="slidenum">
+              <a:rPr kumimoji="0" lang="it-IT" sz="1200" b="0" i="0" u="none" strike="noStrike" kern="1200" cap="none" spc="0" normalizeH="0" baseline="0" noProof="0" smtClean="0">
+                <a:ln>
+                  <a:noFill/>
+                </a:ln>
+                <a:solidFill>
+                  <a:prstClr val="black"/>
+                </a:solidFill>
+                <a:effectLst/>
+                <a:uLnTx/>
+                <a:uFillTx/>
+                <a:latin typeface="Aptos" panose="02110004020202020204"/>
+                <a:ea typeface="+mn-ea"/>
+                <a:cs typeface="+mn-cs"/>
+              </a:rPr>
+              <a:pPr marL="0" marR="0" lvl="0" indent="0" algn="r" defTabSz="457200" rtl="0" eaLnBrk="1" fontAlgn="auto" latinLnBrk="0" hangingPunct="1">
+                <a:lnSpc>
+                  <a:spcPct val="100000"/>
+                </a:lnSpc>
+                <a:spcBef>
+                  <a:spcPts val="0"/>
+                </a:spcBef>
+                <a:spcAft>
+                  <a:spcPts val="0"/>
+                </a:spcAft>
+                <a:buClrTx/>
+                <a:buSzTx/>
+                <a:buFontTx/>
+                <a:buNone/>
+                <a:tabLst/>
+                <a:defRPr/>
+              </a:pPr>
+              <a:t>9</a:t>
+            </a:fld>
+            <a:endParaRPr kumimoji="0" lang="it-IT" sz="1200" b="0" i="0" u="none" strike="noStrike" kern="1200" cap="none" spc="0" normalizeH="0" baseline="0" noProof="0">
+              <a:ln>
+                <a:noFill/>
+              </a:ln>
+              <a:solidFill>
+                <a:prstClr val="black"/>
+              </a:solidFill>
+              <a:effectLst/>
+              <a:uLnTx/>
+              <a:uFillTx/>
+              <a:latin typeface="Aptos" panose="02110004020202020204"/>
+              <a:ea typeface="+mn-ea"/>
+              <a:cs typeface="+mn-cs"/>
+            </a:endParaRPr>
+          </a:p>
+        </p:txBody>
+      </p:sp>
+    </p:spTree>
+    <p:extLst>
+      <p:ext uri="{BB962C8B-B14F-4D97-AF65-F5344CB8AC3E}">
+        <p14:creationId xmlns:p14="http://schemas.microsoft.com/office/powerpoint/2010/main" val="2631978578"/>
       </p:ext>
     </p:extLst>
   </p:cSld>
@@ -1301,7 +2611,7 @@
           <a:p>
             <a:fld id="{1160EA64-D806-43AC-9DF2-F8C432F32B4C}" type="datetimeFigureOut">
               <a:rPr lang="en-US" dirty="0"/>
-              <a:t>7/6/24</a:t>
+              <a:t>7/10/2024</a:t>
             </a:fld>
             <a:endParaRPr lang="en-US" dirty="0"/>
           </a:p>
@@ -1344,7 +2654,7 @@
             <a:fld id="{8A7A6979-0714-4377-B894-6BE4C2D6E202}" type="slidenum">
               <a:rPr lang="en-US" dirty="0"/>
               <a:pPr/>
-              <a:t>‹N›</a:t>
+              <a:t>‹#›</a:t>
             </a:fld>
             <a:endParaRPr lang="en-US" dirty="0"/>
           </a:p>
@@ -1467,7 +2777,7 @@
           <a:p>
             <a:fld id="{E9F9C37B-1D36-470B-8223-D6C91242EC14}" type="datetimeFigureOut">
               <a:rPr lang="en-US" dirty="0"/>
-              <a:t>7/6/24</a:t>
+              <a:t>7/10/2024</a:t>
             </a:fld>
             <a:endParaRPr lang="en-US" dirty="0"/>
           </a:p>
@@ -1509,7 +2819,7 @@
           <a:p>
             <a:fld id="{8A7A6979-0714-4377-B894-6BE4C2D6E202}" type="slidenum">
               <a:rPr lang="en-US" dirty="0"/>
-              <a:t>‹N›</a:t>
+              <a:t>‹#›</a:t>
             </a:fld>
             <a:endParaRPr lang="en-US" dirty="0"/>
           </a:p>
@@ -1642,7 +2952,7 @@
           <a:p>
             <a:fld id="{67C6F52A-A82B-47A2-A83A-8C4C91F2D59F}" type="datetimeFigureOut">
               <a:rPr lang="en-US" dirty="0"/>
-              <a:t>7/6/24</a:t>
+              <a:t>7/10/2024</a:t>
             </a:fld>
             <a:endParaRPr lang="en-US" dirty="0"/>
           </a:p>
@@ -1684,7 +2994,7 @@
           <a:p>
             <a:fld id="{8A7A6979-0714-4377-B894-6BE4C2D6E202}" type="slidenum">
               <a:rPr lang="en-US" dirty="0"/>
-              <a:t>‹N›</a:t>
+              <a:t>‹#›</a:t>
             </a:fld>
             <a:endParaRPr lang="en-US" dirty="0"/>
           </a:p>
@@ -1807,7 +3117,7 @@
           <a:p>
             <a:fld id="{F070A7B3-6521-4DCA-87E5-044747A908C1}" type="datetimeFigureOut">
               <a:rPr lang="en-US" dirty="0"/>
-              <a:t>7/6/24</a:t>
+              <a:t>7/10/2024</a:t>
             </a:fld>
             <a:endParaRPr lang="en-US" dirty="0"/>
           </a:p>
@@ -1850,7 +3160,7 @@
             <a:fld id="{8A7A6979-0714-4377-B894-6BE4C2D6E202}" type="slidenum">
               <a:rPr lang="en-US" dirty="0"/>
               <a:pPr/>
-              <a:t>‹N›</a:t>
+              <a:t>‹#›</a:t>
             </a:fld>
             <a:endParaRPr lang="en-US" dirty="0"/>
           </a:p>
@@ -2071,7 +3381,7 @@
           <a:p>
             <a:fld id="{1160EA64-D806-43AC-9DF2-F8C432F32B4C}" type="datetimeFigureOut">
               <a:rPr lang="en-US" dirty="0"/>
-              <a:t>7/6/24</a:t>
+              <a:t>7/10/2024</a:t>
             </a:fld>
             <a:endParaRPr lang="en-US" dirty="0"/>
           </a:p>
@@ -2114,7 +3424,7 @@
             <a:fld id="{8A7A6979-0714-4377-B894-6BE4C2D6E202}" type="slidenum">
               <a:rPr lang="en-US" dirty="0"/>
               <a:pPr/>
-              <a:t>‹N›</a:t>
+              <a:t>‹#›</a:t>
             </a:fld>
             <a:endParaRPr lang="en-US" dirty="0"/>
           </a:p>
@@ -2299,7 +3609,7 @@
           <a:p>
             <a:fld id="{AB134690-1557-4C89-A502-4959FE7FAD70}" type="datetimeFigureOut">
               <a:rPr lang="en-US" dirty="0"/>
-              <a:t>7/6/24</a:t>
+              <a:t>7/10/2024</a:t>
             </a:fld>
             <a:endParaRPr lang="en-US" dirty="0"/>
           </a:p>
@@ -2341,7 +3651,7 @@
           <a:p>
             <a:fld id="{8A7A6979-0714-4377-B894-6BE4C2D6E202}" type="slidenum">
               <a:rPr lang="en-US" dirty="0"/>
-              <a:t>‹N›</a:t>
+              <a:t>‹#›</a:t>
             </a:fld>
             <a:endParaRPr lang="en-US" dirty="0"/>
           </a:p>
@@ -2653,7 +3963,7 @@
           <a:p>
             <a:fld id="{4F7D4976-E339-4826-83B7-FBD03F55ECF8}" type="datetimeFigureOut">
               <a:rPr lang="en-US" dirty="0"/>
-              <a:t>7/6/24</a:t>
+              <a:t>7/10/2024</a:t>
             </a:fld>
             <a:endParaRPr lang="en-US" dirty="0"/>
           </a:p>
@@ -2695,7 +4005,7 @@
           <a:p>
             <a:fld id="{8A7A6979-0714-4377-B894-6BE4C2D6E202}" type="slidenum">
               <a:rPr lang="en-US" dirty="0"/>
-              <a:t>‹N›</a:t>
+              <a:t>‹#›</a:t>
             </a:fld>
             <a:endParaRPr lang="en-US" dirty="0"/>
           </a:p>
@@ -2789,7 +4099,7 @@
           <a:p>
             <a:fld id="{E1037C31-9E7A-4F99-8774-A0E530DE1A42}" type="datetimeFigureOut">
               <a:rPr lang="en-US" dirty="0"/>
-              <a:t>7/6/24</a:t>
+              <a:t>7/10/2024</a:t>
             </a:fld>
             <a:endParaRPr lang="en-US" dirty="0"/>
           </a:p>
@@ -2831,7 +4141,7 @@
           <a:p>
             <a:fld id="{8A7A6979-0714-4377-B894-6BE4C2D6E202}" type="slidenum">
               <a:rPr lang="en-US" dirty="0"/>
-              <a:t>‹N›</a:t>
+              <a:t>‹#›</a:t>
             </a:fld>
             <a:endParaRPr lang="en-US" dirty="0"/>
           </a:p>
@@ -2879,7 +4189,7 @@
           <a:p>
             <a:fld id="{C278504F-A551-4DE0-9316-4DCD1D8CC752}" type="datetimeFigureOut">
               <a:rPr lang="en-US" dirty="0"/>
-              <a:t>7/6/24</a:t>
+              <a:t>7/10/2024</a:t>
             </a:fld>
             <a:endParaRPr lang="en-US" dirty="0"/>
           </a:p>
@@ -2921,7 +4231,7 @@
           <a:p>
             <a:fld id="{8A7A6979-0714-4377-B894-6BE4C2D6E202}" type="slidenum">
               <a:rPr lang="en-US" dirty="0"/>
-              <a:t>‹N›</a:t>
+              <a:t>‹#›</a:t>
             </a:fld>
             <a:endParaRPr lang="en-US" dirty="0"/>
           </a:p>
@@ -3231,7 +4541,7 @@
           <a:p>
             <a:fld id="{D1BE4249-C0D0-4B06-8692-E8BB871AF643}" type="datetimeFigureOut">
               <a:rPr lang="en-US" dirty="0"/>
-              <a:t>7/6/24</a:t>
+              <a:t>7/10/2024</a:t>
             </a:fld>
             <a:endParaRPr lang="en-US" dirty="0"/>
           </a:p>
@@ -3288,7 +4598,7 @@
           <a:p>
             <a:fld id="{8A7A6979-0714-4377-B894-6BE4C2D6E202}" type="slidenum">
               <a:rPr lang="en-US" dirty="0"/>
-              <a:t>‹N›</a:t>
+              <a:t>‹#›</a:t>
             </a:fld>
             <a:endParaRPr lang="en-US" dirty="0"/>
           </a:p>
@@ -3583,7 +4893,7 @@
           <a:p>
             <a:fld id="{042B0DB6-F5C7-45FB-8CF3-31B45F9C2DAC}" type="datetimeFigureOut">
               <a:rPr lang="en-US" dirty="0"/>
-              <a:t>7/6/24</a:t>
+              <a:t>7/10/2024</a:t>
             </a:fld>
             <a:endParaRPr lang="en-US" dirty="0"/>
           </a:p>
@@ -3640,7 +4950,7 @@
           <a:p>
             <a:fld id="{8A7A6979-0714-4377-B894-6BE4C2D6E202}" type="slidenum">
               <a:rPr lang="en-US" dirty="0"/>
-              <a:t>‹N›</a:t>
+              <a:t>‹#›</a:t>
             </a:fld>
             <a:endParaRPr lang="en-US" dirty="0"/>
           </a:p>
@@ -3820,7 +5130,7 @@
           <a:p>
             <a:fld id="{1160EA64-D806-43AC-9DF2-F8C432F32B4C}" type="datetimeFigureOut">
               <a:rPr lang="en-US" dirty="0"/>
-              <a:t>7/6/24</a:t>
+              <a:t>7/10/2024</a:t>
             </a:fld>
             <a:endParaRPr lang="en-US" dirty="0"/>
           </a:p>
@@ -3904,7 +5214,7 @@
             <a:fld id="{8A7A6979-0714-4377-B894-6BE4C2D6E202}" type="slidenum">
               <a:rPr lang="en-US" dirty="0"/>
               <a:pPr/>
-              <a:t>‹N›</a:t>
+              <a:t>‹#›</a:t>
             </a:fld>
             <a:endParaRPr lang="en-US" dirty="0"/>
           </a:p>
@@ -4517,6 +5827,1391 @@
 </p:sld>
 </file>
 
+<file path=ppt/slides/slide10.xml><?xml version="1.0" encoding="utf-8"?>
+<p:sld xmlns:a="http://schemas.openxmlformats.org/drawingml/2006/main" xmlns:r="http://schemas.openxmlformats.org/officeDocument/2006/relationships" xmlns:p="http://schemas.openxmlformats.org/presentationml/2006/main">
+  <p:cSld>
+    <p:bg>
+      <p:bgPr>
+        <a:solidFill>
+          <a:schemeClr val="accent4">
+            <a:lumMod val="20000"/>
+            <a:lumOff val="80000"/>
+          </a:schemeClr>
+        </a:solidFill>
+        <a:effectLst/>
+      </p:bgPr>
+    </p:bg>
+    <p:spTree>
+      <p:nvGrpSpPr>
+        <p:cNvPr id="1" name=""/>
+        <p:cNvGrpSpPr/>
+        <p:nvPr/>
+      </p:nvGrpSpPr>
+      <p:grpSpPr>
+        <a:xfrm>
+          <a:off x="0" y="0"/>
+          <a:ext cx="0" cy="0"/>
+          <a:chOff x="0" y="0"/>
+          <a:chExt cx="0" cy="0"/>
+        </a:xfrm>
+      </p:grpSpPr>
+      <p:sp>
+        <p:nvSpPr>
+          <p:cNvPr id="2" name="Titolo 1">
+            <a:extLst>
+              <a:ext uri="{FF2B5EF4-FFF2-40B4-BE49-F238E27FC236}">
+                <a16:creationId xmlns:a16="http://schemas.microsoft.com/office/drawing/2014/main" id="{3D70F780-9E2F-64BB-5AAC-2FA2D1417F89}"/>
+              </a:ext>
+            </a:extLst>
+          </p:cNvPr>
+          <p:cNvSpPr>
+            <a:spLocks noGrp="1"/>
+          </p:cNvSpPr>
+          <p:nvPr>
+            <p:ph type="title"/>
+          </p:nvPr>
+        </p:nvSpPr>
+        <p:spPr>
+          <a:xfrm>
+            <a:off x="2198696" y="289778"/>
+            <a:ext cx="7794607" cy="722594"/>
+          </a:xfrm>
+          <a:solidFill>
+            <a:schemeClr val="accent2">
+              <a:lumMod val="20000"/>
+              <a:lumOff val="80000"/>
+            </a:schemeClr>
+          </a:solidFill>
+        </p:spPr>
+        <p:txBody>
+          <a:bodyPr>
+            <a:normAutofit fontScale="90000"/>
+          </a:bodyPr>
+          <a:lstStyle/>
+          <a:p>
+            <a:r>
+              <a:rPr lang="it-IT" b="1">
+                <a:latin typeface="ACADEMY ENGRAVED LET PLAIN:1.0" panose="02000000000000000000" pitchFamily="2" charset="0"/>
+              </a:rPr>
+              <a:t>setup</a:t>
+            </a:r>
+            <a:endParaRPr lang="it-IT" b="1" dirty="0">
+              <a:latin typeface="ACADEMY ENGRAVED LET PLAIN:1.0" panose="02000000000000000000" pitchFamily="2" charset="0"/>
+            </a:endParaRPr>
+          </a:p>
+        </p:txBody>
+      </p:sp>
+      <p:sp>
+        <p:nvSpPr>
+          <p:cNvPr id="4" name="TextBox 3">
+            <a:extLst>
+              <a:ext uri="{FF2B5EF4-FFF2-40B4-BE49-F238E27FC236}">
+                <a16:creationId xmlns:a16="http://schemas.microsoft.com/office/drawing/2014/main" id="{B72A6113-1884-865E-F1ED-3164E42444D6}"/>
+              </a:ext>
+            </a:extLst>
+          </p:cNvPr>
+          <p:cNvSpPr txBox="1"/>
+          <p:nvPr/>
+        </p:nvSpPr>
+        <p:spPr>
+          <a:xfrm>
+            <a:off x="504000" y="1526400"/>
+            <a:ext cx="10692000" cy="646331"/>
+          </a:xfrm>
+          <a:prstGeom prst="rect">
+            <a:avLst/>
+          </a:prstGeom>
+          <a:noFill/>
+        </p:spPr>
+        <p:txBody>
+          <a:bodyPr wrap="square" rtlCol="0">
+            <a:spAutoFit/>
+          </a:bodyPr>
+          <a:lstStyle/>
+          <a:p>
+            <a:pPr marL="285750" indent="-285750">
+              <a:buFont typeface="Arial" panose="020B0604020202020204" pitchFamily="34" charset="0"/>
+              <a:buChar char="•"/>
+            </a:pPr>
+            <a:r>
+              <a:rPr lang="en-US"/>
+              <a:t>Definition of demand curves for each interval (add formulas)</a:t>
+            </a:r>
+          </a:p>
+          <a:p>
+            <a:pPr marL="285750" indent="-285750">
+              <a:buFont typeface="Arial" panose="020B0604020202020204" pitchFamily="34" charset="0"/>
+              <a:buChar char="•"/>
+            </a:pPr>
+            <a:r>
+              <a:rPr lang="en-US"/>
+              <a:t>Derivation of profit curves</a:t>
+            </a:r>
+            <a:endParaRPr lang="en-US" dirty="0"/>
+          </a:p>
+        </p:txBody>
+      </p:sp>
+      <p:pic>
+        <p:nvPicPr>
+          <p:cNvPr id="5" name="Picture 4" descr="A graph of different colored lines&#10;&#10;Description automatically generated">
+            <a:extLst>
+              <a:ext uri="{FF2B5EF4-FFF2-40B4-BE49-F238E27FC236}">
+                <a16:creationId xmlns:a16="http://schemas.microsoft.com/office/drawing/2014/main" id="{F4E64106-1B9F-9D35-BBF3-9EC63453CE3C}"/>
+              </a:ext>
+            </a:extLst>
+          </p:cNvPr>
+          <p:cNvPicPr>
+            <a:picLocks noChangeAspect="1"/>
+          </p:cNvPicPr>
+          <p:nvPr/>
+        </p:nvPicPr>
+        <p:blipFill>
+          <a:blip r:embed="rId3"/>
+          <a:stretch>
+            <a:fillRect/>
+          </a:stretch>
+        </p:blipFill>
+        <p:spPr>
+          <a:xfrm>
+            <a:off x="504000" y="2686759"/>
+            <a:ext cx="11246401" cy="3706915"/>
+          </a:xfrm>
+          <a:prstGeom prst="rect">
+            <a:avLst/>
+          </a:prstGeom>
+        </p:spPr>
+      </p:pic>
+    </p:spTree>
+    <p:extLst>
+      <p:ext uri="{BB962C8B-B14F-4D97-AF65-F5344CB8AC3E}">
+        <p14:creationId xmlns:p14="http://schemas.microsoft.com/office/powerpoint/2010/main" val="941180309"/>
+      </p:ext>
+    </p:extLst>
+  </p:cSld>
+  <p:clrMapOvr>
+    <a:masterClrMapping/>
+  </p:clrMapOvr>
+</p:sld>
+</file>
+
+<file path=ppt/slides/slide11.xml><?xml version="1.0" encoding="utf-8"?>
+<p:sld xmlns:a="http://schemas.openxmlformats.org/drawingml/2006/main" xmlns:r="http://schemas.openxmlformats.org/officeDocument/2006/relationships" xmlns:p="http://schemas.openxmlformats.org/presentationml/2006/main">
+  <p:cSld>
+    <p:bg>
+      <p:bgPr>
+        <a:solidFill>
+          <a:schemeClr val="accent4">
+            <a:lumMod val="20000"/>
+            <a:lumOff val="80000"/>
+          </a:schemeClr>
+        </a:solidFill>
+        <a:effectLst/>
+      </p:bgPr>
+    </p:bg>
+    <p:spTree>
+      <p:nvGrpSpPr>
+        <p:cNvPr id="1" name=""/>
+        <p:cNvGrpSpPr/>
+        <p:nvPr/>
+      </p:nvGrpSpPr>
+      <p:grpSpPr>
+        <a:xfrm>
+          <a:off x="0" y="0"/>
+          <a:ext cx="0" cy="0"/>
+          <a:chOff x="0" y="0"/>
+          <a:chExt cx="0" cy="0"/>
+        </a:xfrm>
+      </p:grpSpPr>
+      <p:sp>
+        <p:nvSpPr>
+          <p:cNvPr id="2" name="Titolo 1">
+            <a:extLst>
+              <a:ext uri="{FF2B5EF4-FFF2-40B4-BE49-F238E27FC236}">
+                <a16:creationId xmlns:a16="http://schemas.microsoft.com/office/drawing/2014/main" id="{3D70F780-9E2F-64BB-5AAC-2FA2D1417F89}"/>
+              </a:ext>
+            </a:extLst>
+          </p:cNvPr>
+          <p:cNvSpPr>
+            <a:spLocks noGrp="1"/>
+          </p:cNvSpPr>
+          <p:nvPr>
+            <p:ph type="title"/>
+          </p:nvPr>
+        </p:nvSpPr>
+        <p:spPr>
+          <a:xfrm>
+            <a:off x="2198696" y="289778"/>
+            <a:ext cx="7794607" cy="722594"/>
+          </a:xfrm>
+          <a:solidFill>
+            <a:schemeClr val="accent2">
+              <a:lumMod val="20000"/>
+              <a:lumOff val="80000"/>
+            </a:schemeClr>
+          </a:solidFill>
+        </p:spPr>
+        <p:txBody>
+          <a:bodyPr>
+            <a:normAutofit fontScale="90000"/>
+          </a:bodyPr>
+          <a:lstStyle/>
+          <a:p>
+            <a:r>
+              <a:rPr lang="it-IT" b="1" dirty="0">
+                <a:latin typeface="ACADEMY ENGRAVED LET PLAIN:1.0" panose="02000000000000000000" pitchFamily="2" charset="0"/>
+              </a:rPr>
+              <a:t>Non-stationarity check</a:t>
+            </a:r>
+          </a:p>
+        </p:txBody>
+      </p:sp>
+      <p:sp>
+        <p:nvSpPr>
+          <p:cNvPr id="4" name="TextBox 3">
+            <a:extLst>
+              <a:ext uri="{FF2B5EF4-FFF2-40B4-BE49-F238E27FC236}">
+                <a16:creationId xmlns:a16="http://schemas.microsoft.com/office/drawing/2014/main" id="{B72A6113-1884-865E-F1ED-3164E42444D6}"/>
+              </a:ext>
+            </a:extLst>
+          </p:cNvPr>
+          <p:cNvSpPr txBox="1"/>
+          <p:nvPr/>
+        </p:nvSpPr>
+        <p:spPr>
+          <a:xfrm>
+            <a:off x="504000" y="1526400"/>
+            <a:ext cx="10692000" cy="646331"/>
+          </a:xfrm>
+          <a:prstGeom prst="rect">
+            <a:avLst/>
+          </a:prstGeom>
+          <a:noFill/>
+        </p:spPr>
+        <p:txBody>
+          <a:bodyPr wrap="square" rtlCol="0">
+            <a:spAutoFit/>
+          </a:bodyPr>
+          <a:lstStyle/>
+          <a:p>
+            <a:pPr marL="285750" indent="-285750">
+              <a:buFont typeface="Arial" panose="020B0604020202020204" pitchFamily="34" charset="0"/>
+              <a:buChar char="•"/>
+            </a:pPr>
+            <a:r>
+              <a:rPr lang="en-US" dirty="0"/>
+              <a:t>Tested UCB1 on the environment</a:t>
+            </a:r>
+          </a:p>
+          <a:p>
+            <a:pPr marL="285750" indent="-285750">
+              <a:buFont typeface="Arial" panose="020B0604020202020204" pitchFamily="34" charset="0"/>
+              <a:buChar char="•"/>
+            </a:pPr>
+            <a:r>
+              <a:rPr lang="en-US" dirty="0"/>
+              <a:t>Results indicate presence of non-stationarity</a:t>
+            </a:r>
+          </a:p>
+        </p:txBody>
+      </p:sp>
+      <p:pic>
+        <p:nvPicPr>
+          <p:cNvPr id="6" name="Picture 5" descr="A graph with a line&#10;&#10;Description automatically generated">
+            <a:extLst>
+              <a:ext uri="{FF2B5EF4-FFF2-40B4-BE49-F238E27FC236}">
+                <a16:creationId xmlns:a16="http://schemas.microsoft.com/office/drawing/2014/main" id="{97795C4F-AC4D-681C-7358-7EFDF569888D}"/>
+              </a:ext>
+            </a:extLst>
+          </p:cNvPr>
+          <p:cNvPicPr>
+            <a:picLocks noChangeAspect="1"/>
+          </p:cNvPicPr>
+          <p:nvPr/>
+        </p:nvPicPr>
+        <p:blipFill>
+          <a:blip r:embed="rId3"/>
+          <a:stretch>
+            <a:fillRect/>
+          </a:stretch>
+        </p:blipFill>
+        <p:spPr>
+          <a:xfrm>
+            <a:off x="720206" y="2686758"/>
+            <a:ext cx="4716229" cy="3631749"/>
+          </a:xfrm>
+          <a:prstGeom prst="rect">
+            <a:avLst/>
+          </a:prstGeom>
+        </p:spPr>
+      </p:pic>
+      <p:pic>
+        <p:nvPicPr>
+          <p:cNvPr id="8" name="Picture 7" descr="A graph with different colored lines&#10;&#10;Description automatically generated">
+            <a:extLst>
+              <a:ext uri="{FF2B5EF4-FFF2-40B4-BE49-F238E27FC236}">
+                <a16:creationId xmlns:a16="http://schemas.microsoft.com/office/drawing/2014/main" id="{47150A67-A3D2-61A5-F102-D5151384AF7F}"/>
+              </a:ext>
+            </a:extLst>
+          </p:cNvPr>
+          <p:cNvPicPr>
+            <a:picLocks noChangeAspect="1"/>
+          </p:cNvPicPr>
+          <p:nvPr/>
+        </p:nvPicPr>
+        <p:blipFill>
+          <a:blip r:embed="rId4"/>
+          <a:stretch>
+            <a:fillRect/>
+          </a:stretch>
+        </p:blipFill>
+        <p:spPr>
+          <a:xfrm>
+            <a:off x="6755567" y="2683221"/>
+            <a:ext cx="4441477" cy="3631749"/>
+          </a:xfrm>
+          <a:prstGeom prst="rect">
+            <a:avLst/>
+          </a:prstGeom>
+        </p:spPr>
+      </p:pic>
+    </p:spTree>
+    <p:extLst>
+      <p:ext uri="{BB962C8B-B14F-4D97-AF65-F5344CB8AC3E}">
+        <p14:creationId xmlns:p14="http://schemas.microsoft.com/office/powerpoint/2010/main" val="2128052944"/>
+      </p:ext>
+    </p:extLst>
+  </p:cSld>
+  <p:clrMapOvr>
+    <a:masterClrMapping/>
+  </p:clrMapOvr>
+</p:sld>
+</file>
+
+<file path=ppt/slides/slide12.xml><?xml version="1.0" encoding="utf-8"?>
+<p:sld xmlns:a="http://schemas.openxmlformats.org/drawingml/2006/main" xmlns:r="http://schemas.openxmlformats.org/officeDocument/2006/relationships" xmlns:p="http://schemas.openxmlformats.org/presentationml/2006/main">
+  <p:cSld>
+    <p:bg>
+      <p:bgPr>
+        <a:solidFill>
+          <a:schemeClr val="accent4">
+            <a:lumMod val="20000"/>
+            <a:lumOff val="80000"/>
+          </a:schemeClr>
+        </a:solidFill>
+        <a:effectLst/>
+      </p:bgPr>
+    </p:bg>
+    <p:spTree>
+      <p:nvGrpSpPr>
+        <p:cNvPr id="1" name=""/>
+        <p:cNvGrpSpPr/>
+        <p:nvPr/>
+      </p:nvGrpSpPr>
+      <p:grpSpPr>
+        <a:xfrm>
+          <a:off x="0" y="0"/>
+          <a:ext cx="0" cy="0"/>
+          <a:chOff x="0" y="0"/>
+          <a:chExt cx="0" cy="0"/>
+        </a:xfrm>
+      </p:grpSpPr>
+      <p:sp>
+        <p:nvSpPr>
+          <p:cNvPr id="2" name="Titolo 1">
+            <a:extLst>
+              <a:ext uri="{FF2B5EF4-FFF2-40B4-BE49-F238E27FC236}">
+                <a16:creationId xmlns:a16="http://schemas.microsoft.com/office/drawing/2014/main" id="{3D70F780-9E2F-64BB-5AAC-2FA2D1417F89}"/>
+              </a:ext>
+            </a:extLst>
+          </p:cNvPr>
+          <p:cNvSpPr>
+            <a:spLocks noGrp="1"/>
+          </p:cNvSpPr>
+          <p:nvPr>
+            <p:ph type="title"/>
+          </p:nvPr>
+        </p:nvSpPr>
+        <p:spPr>
+          <a:xfrm>
+            <a:off x="2198696" y="289778"/>
+            <a:ext cx="7794607" cy="722594"/>
+          </a:xfrm>
+          <a:solidFill>
+            <a:schemeClr val="accent2">
+              <a:lumMod val="20000"/>
+              <a:lumOff val="80000"/>
+            </a:schemeClr>
+          </a:solidFill>
+        </p:spPr>
+        <p:txBody>
+          <a:bodyPr>
+            <a:normAutofit fontScale="90000"/>
+          </a:bodyPr>
+          <a:lstStyle/>
+          <a:p>
+            <a:r>
+              <a:rPr lang="it-IT" b="1" dirty="0">
+                <a:latin typeface="ACADEMY ENGRAVED LET PLAIN:1.0" panose="02000000000000000000" pitchFamily="2" charset="0"/>
+              </a:rPr>
+              <a:t>Sliding window</a:t>
+            </a:r>
+          </a:p>
+        </p:txBody>
+      </p:sp>
+      <p:sp>
+        <p:nvSpPr>
+          <p:cNvPr id="4" name="TextBox 3">
+            <a:extLst>
+              <a:ext uri="{FF2B5EF4-FFF2-40B4-BE49-F238E27FC236}">
+                <a16:creationId xmlns:a16="http://schemas.microsoft.com/office/drawing/2014/main" id="{B72A6113-1884-865E-F1ED-3164E42444D6}"/>
+              </a:ext>
+            </a:extLst>
+          </p:cNvPr>
+          <p:cNvSpPr txBox="1"/>
+          <p:nvPr/>
+        </p:nvSpPr>
+        <p:spPr>
+          <a:xfrm>
+            <a:off x="489600" y="1562400"/>
+            <a:ext cx="10692000" cy="923330"/>
+          </a:xfrm>
+          <a:prstGeom prst="rect">
+            <a:avLst/>
+          </a:prstGeom>
+          <a:noFill/>
+        </p:spPr>
+        <p:txBody>
+          <a:bodyPr wrap="square" rtlCol="0">
+            <a:spAutoFit/>
+          </a:bodyPr>
+          <a:lstStyle/>
+          <a:p>
+            <a:pPr marL="285750" indent="-285750">
+              <a:buFont typeface="Arial" panose="020B0604020202020204" pitchFamily="34" charset="0"/>
+              <a:buChar char="•"/>
+            </a:pPr>
+            <a:r>
+              <a:rPr lang="en-US" dirty="0"/>
+              <a:t>Algorithm: Sliding Window UCB</a:t>
+            </a:r>
+          </a:p>
+          <a:p>
+            <a:pPr marL="285750" indent="-285750">
+              <a:buFont typeface="Arial" panose="020B0604020202020204" pitchFamily="34" charset="0"/>
+              <a:buChar char="•"/>
+            </a:pPr>
+            <a:r>
+              <a:rPr lang="en-US" dirty="0"/>
+              <a:t>Initial trials failed</a:t>
+            </a:r>
+          </a:p>
+          <a:p>
+            <a:pPr marL="285750" indent="-285750">
+              <a:buFont typeface="Arial" panose="020B0604020202020204" pitchFamily="34" charset="0"/>
+              <a:buChar char="•"/>
+            </a:pPr>
+            <a:r>
+              <a:rPr lang="en-US" dirty="0"/>
+              <a:t>Decided to test different window sizes</a:t>
+            </a:r>
+          </a:p>
+        </p:txBody>
+      </p:sp>
+      <p:pic>
+        <p:nvPicPr>
+          <p:cNvPr id="5" name="Picture 4" descr="A graph and a chart&#10;&#10;Description automatically generated with medium confidence">
+            <a:extLst>
+              <a:ext uri="{FF2B5EF4-FFF2-40B4-BE49-F238E27FC236}">
+                <a16:creationId xmlns:a16="http://schemas.microsoft.com/office/drawing/2014/main" id="{B3320183-1954-EE1F-BE50-AF8DD9843DED}"/>
+              </a:ext>
+            </a:extLst>
+          </p:cNvPr>
+          <p:cNvPicPr>
+            <a:picLocks noChangeAspect="1"/>
+          </p:cNvPicPr>
+          <p:nvPr/>
+        </p:nvPicPr>
+        <p:blipFill>
+          <a:blip r:embed="rId3"/>
+          <a:stretch>
+            <a:fillRect/>
+          </a:stretch>
+        </p:blipFill>
+        <p:spPr>
+          <a:xfrm>
+            <a:off x="1087200" y="2827428"/>
+            <a:ext cx="9482400" cy="3136079"/>
+          </a:xfrm>
+          <a:prstGeom prst="rect">
+            <a:avLst/>
+          </a:prstGeom>
+        </p:spPr>
+      </p:pic>
+    </p:spTree>
+    <p:extLst>
+      <p:ext uri="{BB962C8B-B14F-4D97-AF65-F5344CB8AC3E}">
+        <p14:creationId xmlns:p14="http://schemas.microsoft.com/office/powerpoint/2010/main" val="567471348"/>
+      </p:ext>
+    </p:extLst>
+  </p:cSld>
+  <p:clrMapOvr>
+    <a:masterClrMapping/>
+  </p:clrMapOvr>
+</p:sld>
+</file>
+
+<file path=ppt/slides/slide13.xml><?xml version="1.0" encoding="utf-8"?>
+<p:sld xmlns:a="http://schemas.openxmlformats.org/drawingml/2006/main" xmlns:r="http://schemas.openxmlformats.org/officeDocument/2006/relationships" xmlns:p="http://schemas.openxmlformats.org/presentationml/2006/main">
+  <p:cSld>
+    <p:bg>
+      <p:bgPr>
+        <a:solidFill>
+          <a:schemeClr val="accent4">
+            <a:lumMod val="20000"/>
+            <a:lumOff val="80000"/>
+          </a:schemeClr>
+        </a:solidFill>
+        <a:effectLst/>
+      </p:bgPr>
+    </p:bg>
+    <p:spTree>
+      <p:nvGrpSpPr>
+        <p:cNvPr id="1" name=""/>
+        <p:cNvGrpSpPr/>
+        <p:nvPr/>
+      </p:nvGrpSpPr>
+      <p:grpSpPr>
+        <a:xfrm>
+          <a:off x="0" y="0"/>
+          <a:ext cx="0" cy="0"/>
+          <a:chOff x="0" y="0"/>
+          <a:chExt cx="0" cy="0"/>
+        </a:xfrm>
+      </p:grpSpPr>
+      <p:pic>
+        <p:nvPicPr>
+          <p:cNvPr id="8" name="Picture 7" descr="A graph and a chart&#10;&#10;Description automatically generated with medium confidence">
+            <a:extLst>
+              <a:ext uri="{FF2B5EF4-FFF2-40B4-BE49-F238E27FC236}">
+                <a16:creationId xmlns:a16="http://schemas.microsoft.com/office/drawing/2014/main" id="{6505DB4F-0D3A-F6C2-F086-2A12B7D6E8B7}"/>
+              </a:ext>
+            </a:extLst>
+          </p:cNvPr>
+          <p:cNvPicPr>
+            <a:picLocks noChangeAspect="1"/>
+          </p:cNvPicPr>
+          <p:nvPr/>
+        </p:nvPicPr>
+        <p:blipFill>
+          <a:blip r:embed="rId3"/>
+          <a:stretch>
+            <a:fillRect/>
+          </a:stretch>
+        </p:blipFill>
+        <p:spPr>
+          <a:xfrm>
+            <a:off x="1094398" y="201600"/>
+            <a:ext cx="9600689" cy="3175200"/>
+          </a:xfrm>
+          <a:prstGeom prst="rect">
+            <a:avLst/>
+          </a:prstGeom>
+        </p:spPr>
+      </p:pic>
+      <p:pic>
+        <p:nvPicPr>
+          <p:cNvPr id="10" name="Picture 9" descr="A graph and a chart&#10;&#10;Description automatically generated with medium confidence">
+            <a:extLst>
+              <a:ext uri="{FF2B5EF4-FFF2-40B4-BE49-F238E27FC236}">
+                <a16:creationId xmlns:a16="http://schemas.microsoft.com/office/drawing/2014/main" id="{5094E713-1944-F5C8-A60D-E6D3D67DCD95}"/>
+              </a:ext>
+            </a:extLst>
+          </p:cNvPr>
+          <p:cNvPicPr>
+            <a:picLocks noChangeAspect="1"/>
+          </p:cNvPicPr>
+          <p:nvPr/>
+        </p:nvPicPr>
+        <p:blipFill>
+          <a:blip r:embed="rId4"/>
+          <a:stretch>
+            <a:fillRect/>
+          </a:stretch>
+        </p:blipFill>
+        <p:spPr>
+          <a:xfrm>
+            <a:off x="1094400" y="3481201"/>
+            <a:ext cx="9600687" cy="3175200"/>
+          </a:xfrm>
+          <a:prstGeom prst="rect">
+            <a:avLst/>
+          </a:prstGeom>
+        </p:spPr>
+      </p:pic>
+    </p:spTree>
+    <p:extLst>
+      <p:ext uri="{BB962C8B-B14F-4D97-AF65-F5344CB8AC3E}">
+        <p14:creationId xmlns:p14="http://schemas.microsoft.com/office/powerpoint/2010/main" val="2582301789"/>
+      </p:ext>
+    </p:extLst>
+  </p:cSld>
+  <p:clrMapOvr>
+    <a:masterClrMapping/>
+  </p:clrMapOvr>
+</p:sld>
+</file>
+
+<file path=ppt/slides/slide14.xml><?xml version="1.0" encoding="utf-8"?>
+<p:sld xmlns:a="http://schemas.openxmlformats.org/drawingml/2006/main" xmlns:r="http://schemas.openxmlformats.org/officeDocument/2006/relationships" xmlns:p="http://schemas.openxmlformats.org/presentationml/2006/main">
+  <p:cSld>
+    <p:bg>
+      <p:bgPr>
+        <a:solidFill>
+          <a:schemeClr val="accent4">
+            <a:lumMod val="20000"/>
+            <a:lumOff val="80000"/>
+          </a:schemeClr>
+        </a:solidFill>
+        <a:effectLst/>
+      </p:bgPr>
+    </p:bg>
+    <p:spTree>
+      <p:nvGrpSpPr>
+        <p:cNvPr id="1" name=""/>
+        <p:cNvGrpSpPr/>
+        <p:nvPr/>
+      </p:nvGrpSpPr>
+      <p:grpSpPr>
+        <a:xfrm>
+          <a:off x="0" y="0"/>
+          <a:ext cx="0" cy="0"/>
+          <a:chOff x="0" y="0"/>
+          <a:chExt cx="0" cy="0"/>
+        </a:xfrm>
+      </p:grpSpPr>
+      <p:pic>
+        <p:nvPicPr>
+          <p:cNvPr id="3" name="Picture 2" descr="A graph and a chart&#10;&#10;Description automatically generated with medium confidence">
+            <a:extLst>
+              <a:ext uri="{FF2B5EF4-FFF2-40B4-BE49-F238E27FC236}">
+                <a16:creationId xmlns:a16="http://schemas.microsoft.com/office/drawing/2014/main" id="{4DAA9CF4-776A-FA22-07DD-C1B158455640}"/>
+              </a:ext>
+            </a:extLst>
+          </p:cNvPr>
+          <p:cNvPicPr>
+            <a:picLocks noChangeAspect="1"/>
+          </p:cNvPicPr>
+          <p:nvPr/>
+        </p:nvPicPr>
+        <p:blipFill>
+          <a:blip r:embed="rId3"/>
+          <a:stretch>
+            <a:fillRect/>
+          </a:stretch>
+        </p:blipFill>
+        <p:spPr>
+          <a:xfrm>
+            <a:off x="1094400" y="201599"/>
+            <a:ext cx="9600686" cy="3175199"/>
+          </a:xfrm>
+          <a:prstGeom prst="rect">
+            <a:avLst/>
+          </a:prstGeom>
+        </p:spPr>
+      </p:pic>
+      <p:pic>
+        <p:nvPicPr>
+          <p:cNvPr id="5" name="Picture 4" descr="A graph of a bar graph&#10;&#10;Description automatically generated with medium confidence">
+            <a:extLst>
+              <a:ext uri="{FF2B5EF4-FFF2-40B4-BE49-F238E27FC236}">
+                <a16:creationId xmlns:a16="http://schemas.microsoft.com/office/drawing/2014/main" id="{8FB16127-4FA6-8B9B-0EB0-72326C43A1F3}"/>
+              </a:ext>
+            </a:extLst>
+          </p:cNvPr>
+          <p:cNvPicPr>
+            <a:picLocks noChangeAspect="1"/>
+          </p:cNvPicPr>
+          <p:nvPr/>
+        </p:nvPicPr>
+        <p:blipFill>
+          <a:blip r:embed="rId4"/>
+          <a:stretch>
+            <a:fillRect/>
+          </a:stretch>
+        </p:blipFill>
+        <p:spPr>
+          <a:xfrm>
+            <a:off x="1094400" y="3481203"/>
+            <a:ext cx="9600686" cy="3178751"/>
+          </a:xfrm>
+          <a:prstGeom prst="rect">
+            <a:avLst/>
+          </a:prstGeom>
+        </p:spPr>
+      </p:pic>
+    </p:spTree>
+    <p:extLst>
+      <p:ext uri="{BB962C8B-B14F-4D97-AF65-F5344CB8AC3E}">
+        <p14:creationId xmlns:p14="http://schemas.microsoft.com/office/powerpoint/2010/main" val="499157571"/>
+      </p:ext>
+    </p:extLst>
+  </p:cSld>
+  <p:clrMapOvr>
+    <a:masterClrMapping/>
+  </p:clrMapOvr>
+</p:sld>
+</file>
+
+<file path=ppt/slides/slide15.xml><?xml version="1.0" encoding="utf-8"?>
+<p:sld xmlns:a="http://schemas.openxmlformats.org/drawingml/2006/main" xmlns:r="http://schemas.openxmlformats.org/officeDocument/2006/relationships" xmlns:p="http://schemas.openxmlformats.org/presentationml/2006/main">
+  <p:cSld>
+    <p:bg>
+      <p:bgPr>
+        <a:solidFill>
+          <a:schemeClr val="accent4">
+            <a:lumMod val="20000"/>
+            <a:lumOff val="80000"/>
+          </a:schemeClr>
+        </a:solidFill>
+        <a:effectLst/>
+      </p:bgPr>
+    </p:bg>
+    <p:spTree>
+      <p:nvGrpSpPr>
+        <p:cNvPr id="1" name=""/>
+        <p:cNvGrpSpPr/>
+        <p:nvPr/>
+      </p:nvGrpSpPr>
+      <p:grpSpPr>
+        <a:xfrm>
+          <a:off x="0" y="0"/>
+          <a:ext cx="0" cy="0"/>
+          <a:chOff x="0" y="0"/>
+          <a:chExt cx="0" cy="0"/>
+        </a:xfrm>
+      </p:grpSpPr>
+      <p:sp>
+        <p:nvSpPr>
+          <p:cNvPr id="2" name="Titolo 1">
+            <a:extLst>
+              <a:ext uri="{FF2B5EF4-FFF2-40B4-BE49-F238E27FC236}">
+                <a16:creationId xmlns:a16="http://schemas.microsoft.com/office/drawing/2014/main" id="{3D70F780-9E2F-64BB-5AAC-2FA2D1417F89}"/>
+              </a:ext>
+            </a:extLst>
+          </p:cNvPr>
+          <p:cNvSpPr>
+            <a:spLocks noGrp="1"/>
+          </p:cNvSpPr>
+          <p:nvPr>
+            <p:ph type="title"/>
+          </p:nvPr>
+        </p:nvSpPr>
+        <p:spPr>
+          <a:xfrm>
+            <a:off x="2198696" y="289778"/>
+            <a:ext cx="7794607" cy="722594"/>
+          </a:xfrm>
+          <a:solidFill>
+            <a:schemeClr val="accent2">
+              <a:lumMod val="20000"/>
+              <a:lumOff val="80000"/>
+            </a:schemeClr>
+          </a:solidFill>
+        </p:spPr>
+        <p:txBody>
+          <a:bodyPr>
+            <a:normAutofit fontScale="90000"/>
+          </a:bodyPr>
+          <a:lstStyle/>
+          <a:p>
+            <a:r>
+              <a:rPr lang="it-IT" b="1" dirty="0">
+                <a:latin typeface="ACADEMY ENGRAVED LET PLAIN:1.0" panose="02000000000000000000" pitchFamily="2" charset="0"/>
+              </a:rPr>
+              <a:t>Change detection</a:t>
+            </a:r>
+          </a:p>
+        </p:txBody>
+      </p:sp>
+      <p:sp>
+        <p:nvSpPr>
+          <p:cNvPr id="4" name="TextBox 3">
+            <a:extLst>
+              <a:ext uri="{FF2B5EF4-FFF2-40B4-BE49-F238E27FC236}">
+                <a16:creationId xmlns:a16="http://schemas.microsoft.com/office/drawing/2014/main" id="{B72A6113-1884-865E-F1ED-3164E42444D6}"/>
+              </a:ext>
+            </a:extLst>
+          </p:cNvPr>
+          <p:cNvSpPr txBox="1"/>
+          <p:nvPr/>
+        </p:nvSpPr>
+        <p:spPr>
+          <a:xfrm>
+            <a:off x="504000" y="1526400"/>
+            <a:ext cx="10692000" cy="646331"/>
+          </a:xfrm>
+          <a:prstGeom prst="rect">
+            <a:avLst/>
+          </a:prstGeom>
+          <a:noFill/>
+        </p:spPr>
+        <p:txBody>
+          <a:bodyPr wrap="square" rtlCol="0">
+            <a:spAutoFit/>
+          </a:bodyPr>
+          <a:lstStyle/>
+          <a:p>
+            <a:pPr marL="285750" indent="-285750">
+              <a:buFont typeface="Arial" panose="020B0604020202020204" pitchFamily="34" charset="0"/>
+              <a:buChar char="•"/>
+            </a:pPr>
+            <a:r>
+              <a:rPr lang="en-US" dirty="0"/>
+              <a:t>Algorithm: CUSUM UCB</a:t>
+            </a:r>
+          </a:p>
+          <a:p>
+            <a:pPr marL="285750" indent="-285750">
+              <a:buFont typeface="Arial" panose="020B0604020202020204" pitchFamily="34" charset="0"/>
+              <a:buChar char="•"/>
+            </a:pPr>
+            <a:r>
+              <a:rPr lang="en-US" dirty="0"/>
+              <a:t>Overall, best performing method</a:t>
+            </a:r>
+          </a:p>
+        </p:txBody>
+      </p:sp>
+      <p:pic>
+        <p:nvPicPr>
+          <p:cNvPr id="5" name="Picture 4" descr="A graph with a line&#10;&#10;Description automatically generated">
+            <a:extLst>
+              <a:ext uri="{FF2B5EF4-FFF2-40B4-BE49-F238E27FC236}">
+                <a16:creationId xmlns:a16="http://schemas.microsoft.com/office/drawing/2014/main" id="{DCCA113A-7D57-12AC-B509-87EBF823759D}"/>
+              </a:ext>
+            </a:extLst>
+          </p:cNvPr>
+          <p:cNvPicPr>
+            <a:picLocks noChangeAspect="1"/>
+          </p:cNvPicPr>
+          <p:nvPr/>
+        </p:nvPicPr>
+        <p:blipFill>
+          <a:blip r:embed="rId3"/>
+          <a:stretch>
+            <a:fillRect/>
+          </a:stretch>
+        </p:blipFill>
+        <p:spPr>
+          <a:xfrm>
+            <a:off x="298304" y="3175200"/>
+            <a:ext cx="3788694" cy="3059320"/>
+          </a:xfrm>
+          <a:prstGeom prst="rect">
+            <a:avLst/>
+          </a:prstGeom>
+        </p:spPr>
+      </p:pic>
+      <p:pic>
+        <p:nvPicPr>
+          <p:cNvPr id="9" name="Picture 8" descr="A bar graph with numbers and text&#10;&#10;Description automatically generated">
+            <a:extLst>
+              <a:ext uri="{FF2B5EF4-FFF2-40B4-BE49-F238E27FC236}">
+                <a16:creationId xmlns:a16="http://schemas.microsoft.com/office/drawing/2014/main" id="{3589D7D3-3BDE-66C3-785B-0FBCF0B44674}"/>
+              </a:ext>
+            </a:extLst>
+          </p:cNvPr>
+          <p:cNvPicPr>
+            <a:picLocks noChangeAspect="1"/>
+          </p:cNvPicPr>
+          <p:nvPr/>
+        </p:nvPicPr>
+        <p:blipFill>
+          <a:blip r:embed="rId4"/>
+          <a:stretch>
+            <a:fillRect/>
+          </a:stretch>
+        </p:blipFill>
+        <p:spPr>
+          <a:xfrm>
+            <a:off x="4232707" y="3175200"/>
+            <a:ext cx="3741420" cy="3059320"/>
+          </a:xfrm>
+          <a:prstGeom prst="rect">
+            <a:avLst/>
+          </a:prstGeom>
+        </p:spPr>
+      </p:pic>
+      <p:pic>
+        <p:nvPicPr>
+          <p:cNvPr id="11" name="Picture 10" descr="A graph with numbers and lines&#10;&#10;Description automatically generated with medium confidence">
+            <a:extLst>
+              <a:ext uri="{FF2B5EF4-FFF2-40B4-BE49-F238E27FC236}">
+                <a16:creationId xmlns:a16="http://schemas.microsoft.com/office/drawing/2014/main" id="{BBA95E09-203E-9954-16BF-00B0321ACA23}"/>
+              </a:ext>
+            </a:extLst>
+          </p:cNvPr>
+          <p:cNvPicPr>
+            <a:picLocks noChangeAspect="1"/>
+          </p:cNvPicPr>
+          <p:nvPr/>
+        </p:nvPicPr>
+        <p:blipFill>
+          <a:blip r:embed="rId5"/>
+          <a:stretch>
+            <a:fillRect/>
+          </a:stretch>
+        </p:blipFill>
+        <p:spPr>
+          <a:xfrm>
+            <a:off x="8119836" y="3175200"/>
+            <a:ext cx="3741420" cy="3059320"/>
+          </a:xfrm>
+          <a:prstGeom prst="rect">
+            <a:avLst/>
+          </a:prstGeom>
+        </p:spPr>
+      </p:pic>
+    </p:spTree>
+    <p:extLst>
+      <p:ext uri="{BB962C8B-B14F-4D97-AF65-F5344CB8AC3E}">
+        <p14:creationId xmlns:p14="http://schemas.microsoft.com/office/powerpoint/2010/main" val="3251229395"/>
+      </p:ext>
+    </p:extLst>
+  </p:cSld>
+  <p:clrMapOvr>
+    <a:masterClrMapping/>
+  </p:clrMapOvr>
+</p:sld>
+</file>
+
+<file path=ppt/slides/slide16.xml><?xml version="1.0" encoding="utf-8"?>
+<p:sld xmlns:a="http://schemas.openxmlformats.org/drawingml/2006/main" xmlns:r="http://schemas.openxmlformats.org/officeDocument/2006/relationships" xmlns:p="http://schemas.openxmlformats.org/presentationml/2006/main">
+  <p:cSld>
+    <p:bg>
+      <p:bgPr>
+        <a:solidFill>
+          <a:schemeClr val="accent4">
+            <a:lumMod val="20000"/>
+            <a:lumOff val="80000"/>
+          </a:schemeClr>
+        </a:solidFill>
+        <a:effectLst/>
+      </p:bgPr>
+    </p:bg>
+    <p:spTree>
+      <p:nvGrpSpPr>
+        <p:cNvPr id="1" name=""/>
+        <p:cNvGrpSpPr/>
+        <p:nvPr/>
+      </p:nvGrpSpPr>
+      <p:grpSpPr>
+        <a:xfrm>
+          <a:off x="0" y="0"/>
+          <a:ext cx="0" cy="0"/>
+          <a:chOff x="0" y="0"/>
+          <a:chExt cx="0" cy="0"/>
+        </a:xfrm>
+      </p:grpSpPr>
+      <p:sp>
+        <p:nvSpPr>
+          <p:cNvPr id="2" name="Titolo 1">
+            <a:extLst>
+              <a:ext uri="{FF2B5EF4-FFF2-40B4-BE49-F238E27FC236}">
+                <a16:creationId xmlns:a16="http://schemas.microsoft.com/office/drawing/2014/main" id="{3D70F780-9E2F-64BB-5AAC-2FA2D1417F89}"/>
+              </a:ext>
+            </a:extLst>
+          </p:cNvPr>
+          <p:cNvSpPr>
+            <a:spLocks noGrp="1"/>
+          </p:cNvSpPr>
+          <p:nvPr>
+            <p:ph type="title"/>
+          </p:nvPr>
+        </p:nvSpPr>
+        <p:spPr>
+          <a:xfrm>
+            <a:off x="2198696" y="289778"/>
+            <a:ext cx="7794607" cy="722594"/>
+          </a:xfrm>
+          <a:solidFill>
+            <a:schemeClr val="accent2">
+              <a:lumMod val="20000"/>
+              <a:lumOff val="80000"/>
+            </a:schemeClr>
+          </a:solidFill>
+        </p:spPr>
+        <p:txBody>
+          <a:bodyPr>
+            <a:normAutofit fontScale="90000"/>
+          </a:bodyPr>
+          <a:lstStyle/>
+          <a:p>
+            <a:r>
+              <a:rPr lang="it-IT" b="1" dirty="0">
+                <a:latin typeface="ACADEMY ENGRAVED LET PLAIN:1.0" panose="02000000000000000000" pitchFamily="2" charset="0"/>
+              </a:rPr>
+              <a:t>Bonus point</a:t>
+            </a:r>
+          </a:p>
+        </p:txBody>
+      </p:sp>
+      <p:sp>
+        <p:nvSpPr>
+          <p:cNvPr id="4" name="TextBox 3">
+            <a:extLst>
+              <a:ext uri="{FF2B5EF4-FFF2-40B4-BE49-F238E27FC236}">
+                <a16:creationId xmlns:a16="http://schemas.microsoft.com/office/drawing/2014/main" id="{B72A6113-1884-865E-F1ED-3164E42444D6}"/>
+              </a:ext>
+            </a:extLst>
+          </p:cNvPr>
+          <p:cNvSpPr txBox="1"/>
+          <p:nvPr/>
+        </p:nvSpPr>
+        <p:spPr>
+          <a:xfrm>
+            <a:off x="504000" y="1526400"/>
+            <a:ext cx="10692000" cy="646331"/>
+          </a:xfrm>
+          <a:prstGeom prst="rect">
+            <a:avLst/>
+          </a:prstGeom>
+          <a:noFill/>
+        </p:spPr>
+        <p:txBody>
+          <a:bodyPr wrap="square" rtlCol="0">
+            <a:spAutoFit/>
+          </a:bodyPr>
+          <a:lstStyle/>
+          <a:p>
+            <a:pPr marL="285750" indent="-285750">
+              <a:buFont typeface="Arial" panose="020B0604020202020204" pitchFamily="34" charset="0"/>
+              <a:buChar char="•"/>
+            </a:pPr>
+            <a:r>
+              <a:rPr lang="en-US" dirty="0"/>
+              <a:t>Two-item stochastic pricing environment</a:t>
+            </a:r>
+          </a:p>
+          <a:p>
+            <a:pPr marL="285750" indent="-285750">
+              <a:buFont typeface="Arial" panose="020B0604020202020204" pitchFamily="34" charset="0"/>
+              <a:buChar char="•"/>
+            </a:pPr>
+            <a:r>
+              <a:rPr lang="en-US" dirty="0"/>
+              <a:t>Noisy demand curve D(p1, p2) + eta</a:t>
+            </a:r>
+          </a:p>
+        </p:txBody>
+      </p:sp>
+      <p:sp>
+        <p:nvSpPr>
+          <p:cNvPr id="3" name="TextBox 2">
+            <a:extLst>
+              <a:ext uri="{FF2B5EF4-FFF2-40B4-BE49-F238E27FC236}">
+                <a16:creationId xmlns:a16="http://schemas.microsoft.com/office/drawing/2014/main" id="{200AA7FF-8C2B-BE70-D9A6-1D479419ED46}"/>
+              </a:ext>
+            </a:extLst>
+          </p:cNvPr>
+          <p:cNvSpPr txBox="1"/>
+          <p:nvPr/>
+        </p:nvSpPr>
+        <p:spPr>
+          <a:xfrm>
+            <a:off x="504000" y="2363593"/>
+            <a:ext cx="9489303" cy="646331"/>
+          </a:xfrm>
+          <a:prstGeom prst="rect">
+            <a:avLst/>
+          </a:prstGeom>
+          <a:noFill/>
+        </p:spPr>
+        <p:txBody>
+          <a:bodyPr wrap="square" rtlCol="0">
+            <a:spAutoFit/>
+          </a:bodyPr>
+          <a:lstStyle/>
+          <a:p>
+            <a:r>
+              <a:rPr lang="en-US" dirty="0"/>
+              <a:t>GOAL</a:t>
+            </a:r>
+          </a:p>
+          <a:p>
+            <a:r>
+              <a:rPr lang="en-US" dirty="0"/>
+              <a:t>Build a regret minimizer for the continuous action set [0,1]^2 using 2D Gaussian Processes</a:t>
+            </a:r>
+          </a:p>
+        </p:txBody>
+      </p:sp>
+      <p:pic>
+        <p:nvPicPr>
+          <p:cNvPr id="7" name="Picture 6" descr="A screenshot of a graph&#10;&#10;Description automatically generated">
+            <a:extLst>
+              <a:ext uri="{FF2B5EF4-FFF2-40B4-BE49-F238E27FC236}">
+                <a16:creationId xmlns:a16="http://schemas.microsoft.com/office/drawing/2014/main" id="{EEF63B9F-01C4-4CE1-B224-C5012AC64F77}"/>
+              </a:ext>
+            </a:extLst>
+          </p:cNvPr>
+          <p:cNvPicPr>
+            <a:picLocks noChangeAspect="1"/>
+          </p:cNvPicPr>
+          <p:nvPr/>
+        </p:nvPicPr>
+        <p:blipFill>
+          <a:blip r:embed="rId3"/>
+          <a:stretch>
+            <a:fillRect/>
+          </a:stretch>
+        </p:blipFill>
+        <p:spPr>
+          <a:xfrm>
+            <a:off x="2311143" y="3227811"/>
+            <a:ext cx="7569711" cy="3340411"/>
+          </a:xfrm>
+          <a:prstGeom prst="rect">
+            <a:avLst/>
+          </a:prstGeom>
+        </p:spPr>
+      </p:pic>
+    </p:spTree>
+    <p:extLst>
+      <p:ext uri="{BB962C8B-B14F-4D97-AF65-F5344CB8AC3E}">
+        <p14:creationId xmlns:p14="http://schemas.microsoft.com/office/powerpoint/2010/main" val="577718204"/>
+      </p:ext>
+    </p:extLst>
+  </p:cSld>
+  <p:clrMapOvr>
+    <a:masterClrMapping/>
+  </p:clrMapOvr>
+</p:sld>
+</file>
+
+<file path=ppt/slides/slide17.xml><?xml version="1.0" encoding="utf-8"?>
+<p:sld xmlns:a="http://schemas.openxmlformats.org/drawingml/2006/main" xmlns:r="http://schemas.openxmlformats.org/officeDocument/2006/relationships" xmlns:p="http://schemas.openxmlformats.org/presentationml/2006/main">
+  <p:cSld>
+    <p:bg>
+      <p:bgPr>
+        <a:solidFill>
+          <a:schemeClr val="accent4">
+            <a:lumMod val="20000"/>
+            <a:lumOff val="80000"/>
+          </a:schemeClr>
+        </a:solidFill>
+        <a:effectLst/>
+      </p:bgPr>
+    </p:bg>
+    <p:spTree>
+      <p:nvGrpSpPr>
+        <p:cNvPr id="1" name=""/>
+        <p:cNvGrpSpPr/>
+        <p:nvPr/>
+      </p:nvGrpSpPr>
+      <p:grpSpPr>
+        <a:xfrm>
+          <a:off x="0" y="0"/>
+          <a:ext cx="0" cy="0"/>
+          <a:chOff x="0" y="0"/>
+          <a:chExt cx="0" cy="0"/>
+        </a:xfrm>
+      </p:grpSpPr>
+      <p:sp>
+        <p:nvSpPr>
+          <p:cNvPr id="2" name="Titolo 1">
+            <a:extLst>
+              <a:ext uri="{FF2B5EF4-FFF2-40B4-BE49-F238E27FC236}">
+                <a16:creationId xmlns:a16="http://schemas.microsoft.com/office/drawing/2014/main" id="{3D70F780-9E2F-64BB-5AAC-2FA2D1417F89}"/>
+              </a:ext>
+            </a:extLst>
+          </p:cNvPr>
+          <p:cNvSpPr>
+            <a:spLocks noGrp="1"/>
+          </p:cNvSpPr>
+          <p:nvPr>
+            <p:ph type="title"/>
+          </p:nvPr>
+        </p:nvSpPr>
+        <p:spPr>
+          <a:xfrm>
+            <a:off x="2198696" y="289778"/>
+            <a:ext cx="7794607" cy="722594"/>
+          </a:xfrm>
+          <a:solidFill>
+            <a:schemeClr val="accent2">
+              <a:lumMod val="20000"/>
+              <a:lumOff val="80000"/>
+            </a:schemeClr>
+          </a:solidFill>
+        </p:spPr>
+        <p:txBody>
+          <a:bodyPr>
+            <a:normAutofit fontScale="90000"/>
+          </a:bodyPr>
+          <a:lstStyle/>
+          <a:p>
+            <a:r>
+              <a:rPr lang="it-IT" b="1" dirty="0">
+                <a:latin typeface="ACADEMY ENGRAVED LET PLAIN:1.0" panose="02000000000000000000" pitchFamily="2" charset="0"/>
+              </a:rPr>
+              <a:t>results</a:t>
+            </a:r>
+          </a:p>
+        </p:txBody>
+      </p:sp>
+      <p:sp>
+        <p:nvSpPr>
+          <p:cNvPr id="4" name="TextBox 3">
+            <a:extLst>
+              <a:ext uri="{FF2B5EF4-FFF2-40B4-BE49-F238E27FC236}">
+                <a16:creationId xmlns:a16="http://schemas.microsoft.com/office/drawing/2014/main" id="{B72A6113-1884-865E-F1ED-3164E42444D6}"/>
+              </a:ext>
+            </a:extLst>
+          </p:cNvPr>
+          <p:cNvSpPr txBox="1"/>
+          <p:nvPr/>
+        </p:nvSpPr>
+        <p:spPr>
+          <a:xfrm>
+            <a:off x="504000" y="1526400"/>
+            <a:ext cx="10692000" cy="646331"/>
+          </a:xfrm>
+          <a:prstGeom prst="rect">
+            <a:avLst/>
+          </a:prstGeom>
+          <a:noFill/>
+        </p:spPr>
+        <p:txBody>
+          <a:bodyPr wrap="square" rtlCol="0">
+            <a:spAutoFit/>
+          </a:bodyPr>
+          <a:lstStyle/>
+          <a:p>
+            <a:pPr marL="285750" indent="-285750">
+              <a:buFont typeface="Arial" panose="020B0604020202020204" pitchFamily="34" charset="0"/>
+              <a:buChar char="•"/>
+            </a:pPr>
+            <a:r>
+              <a:rPr lang="en-US" dirty="0"/>
+              <a:t>Algorithm: GP UCB</a:t>
+            </a:r>
+          </a:p>
+          <a:p>
+            <a:pPr marL="285750" indent="-285750">
+              <a:buFont typeface="Arial" panose="020B0604020202020204" pitchFamily="34" charset="0"/>
+              <a:buChar char="•"/>
+            </a:pPr>
+            <a:r>
+              <a:rPr lang="en-US" dirty="0"/>
+              <a:t>Great results</a:t>
+            </a:r>
+          </a:p>
+        </p:txBody>
+      </p:sp>
+      <p:pic>
+        <p:nvPicPr>
+          <p:cNvPr id="6" name="Picture 5" descr="A graph with a line&#10;&#10;Description automatically generated">
+            <a:extLst>
+              <a:ext uri="{FF2B5EF4-FFF2-40B4-BE49-F238E27FC236}">
+                <a16:creationId xmlns:a16="http://schemas.microsoft.com/office/drawing/2014/main" id="{DA520E1E-ECDC-EEA8-2B2A-6922E903519C}"/>
+              </a:ext>
+            </a:extLst>
+          </p:cNvPr>
+          <p:cNvPicPr>
+            <a:picLocks noChangeAspect="1"/>
+          </p:cNvPicPr>
+          <p:nvPr/>
+        </p:nvPicPr>
+        <p:blipFill>
+          <a:blip r:embed="rId3"/>
+          <a:stretch>
+            <a:fillRect/>
+          </a:stretch>
+        </p:blipFill>
+        <p:spPr>
+          <a:xfrm>
+            <a:off x="285483" y="2936590"/>
+            <a:ext cx="5571606" cy="3323810"/>
+          </a:xfrm>
+          <a:prstGeom prst="rect">
+            <a:avLst/>
+          </a:prstGeom>
+        </p:spPr>
+      </p:pic>
+      <p:pic>
+        <p:nvPicPr>
+          <p:cNvPr id="9" name="Picture 8" descr="A graph of a graph&#10;&#10;Description automatically generated with medium confidence">
+            <a:extLst>
+              <a:ext uri="{FF2B5EF4-FFF2-40B4-BE49-F238E27FC236}">
+                <a16:creationId xmlns:a16="http://schemas.microsoft.com/office/drawing/2014/main" id="{D30FD920-0526-C0EB-24B0-1BA21DBB66EB}"/>
+              </a:ext>
+            </a:extLst>
+          </p:cNvPr>
+          <p:cNvPicPr>
+            <a:picLocks noChangeAspect="1"/>
+          </p:cNvPicPr>
+          <p:nvPr/>
+        </p:nvPicPr>
+        <p:blipFill>
+          <a:blip r:embed="rId4"/>
+          <a:stretch>
+            <a:fillRect/>
+          </a:stretch>
+        </p:blipFill>
+        <p:spPr>
+          <a:xfrm>
+            <a:off x="7635171" y="3870970"/>
+            <a:ext cx="2933997" cy="2345607"/>
+          </a:xfrm>
+          <a:prstGeom prst="rect">
+            <a:avLst/>
+          </a:prstGeom>
+        </p:spPr>
+      </p:pic>
+      <p:pic>
+        <p:nvPicPr>
+          <p:cNvPr id="11" name="Picture 10" descr="A green and blue gradient&#10;&#10;Description automatically generated">
+            <a:extLst>
+              <a:ext uri="{FF2B5EF4-FFF2-40B4-BE49-F238E27FC236}">
+                <a16:creationId xmlns:a16="http://schemas.microsoft.com/office/drawing/2014/main" id="{ED8B3048-65BA-4FEC-4AFA-EDA399BD3CB1}"/>
+              </a:ext>
+            </a:extLst>
+          </p:cNvPr>
+          <p:cNvPicPr>
+            <a:picLocks noChangeAspect="1"/>
+          </p:cNvPicPr>
+          <p:nvPr/>
+        </p:nvPicPr>
+        <p:blipFill>
+          <a:blip r:embed="rId5"/>
+          <a:stretch>
+            <a:fillRect/>
+          </a:stretch>
+        </p:blipFill>
+        <p:spPr>
+          <a:xfrm>
+            <a:off x="7635171" y="1268866"/>
+            <a:ext cx="2933997" cy="2387667"/>
+          </a:xfrm>
+          <a:prstGeom prst="rect">
+            <a:avLst/>
+          </a:prstGeom>
+        </p:spPr>
+      </p:pic>
+    </p:spTree>
+    <p:extLst>
+      <p:ext uri="{BB962C8B-B14F-4D97-AF65-F5344CB8AC3E}">
+        <p14:creationId xmlns:p14="http://schemas.microsoft.com/office/powerpoint/2010/main" val="2024312068"/>
+      </p:ext>
+    </p:extLst>
+  </p:cSld>
+  <p:clrMapOvr>
+    <a:masterClrMapping/>
+  </p:clrMapOvr>
+</p:sld>
+</file>
+
 <file path=ppt/slides/slide2.xml><?xml version="1.0" encoding="utf-8"?>
 <p:sld xmlns:a="http://schemas.openxmlformats.org/drawingml/2006/main" xmlns:r="http://schemas.openxmlformats.org/officeDocument/2006/relationships" xmlns:p="http://schemas.openxmlformats.org/presentationml/2006/main">
   <p:cSld>
@@ -8080,6 +10775,210 @@
     <p:extLst>
       <p:ext uri="{BB962C8B-B14F-4D97-AF65-F5344CB8AC3E}">
         <p14:creationId xmlns:p14="http://schemas.microsoft.com/office/powerpoint/2010/main" val="3563673374"/>
+      </p:ext>
+    </p:extLst>
+  </p:cSld>
+  <p:clrMapOvr>
+    <a:masterClrMapping/>
+  </p:clrMapOvr>
+</p:sld>
+</file>
+
+<file path=ppt/slides/slide9.xml><?xml version="1.0" encoding="utf-8"?>
+<p:sld xmlns:a="http://schemas.openxmlformats.org/drawingml/2006/main" xmlns:r="http://schemas.openxmlformats.org/officeDocument/2006/relationships" xmlns:p="http://schemas.openxmlformats.org/presentationml/2006/main">
+  <p:cSld>
+    <p:bg>
+      <p:bgPr>
+        <a:solidFill>
+          <a:schemeClr val="accent4">
+            <a:lumMod val="20000"/>
+            <a:lumOff val="80000"/>
+          </a:schemeClr>
+        </a:solidFill>
+        <a:effectLst/>
+      </p:bgPr>
+    </p:bg>
+    <p:spTree>
+      <p:nvGrpSpPr>
+        <p:cNvPr id="1" name=""/>
+        <p:cNvGrpSpPr/>
+        <p:nvPr/>
+      </p:nvGrpSpPr>
+      <p:grpSpPr>
+        <a:xfrm>
+          <a:off x="0" y="0"/>
+          <a:ext cx="0" cy="0"/>
+          <a:chOff x="0" y="0"/>
+          <a:chExt cx="0" cy="0"/>
+        </a:xfrm>
+      </p:grpSpPr>
+      <p:sp>
+        <p:nvSpPr>
+          <p:cNvPr id="2" name="Titolo 1">
+            <a:extLst>
+              <a:ext uri="{FF2B5EF4-FFF2-40B4-BE49-F238E27FC236}">
+                <a16:creationId xmlns:a16="http://schemas.microsoft.com/office/drawing/2014/main" id="{3D70F780-9E2F-64BB-5AAC-2FA2D1417F89}"/>
+              </a:ext>
+            </a:extLst>
+          </p:cNvPr>
+          <p:cNvSpPr>
+            <a:spLocks noGrp="1"/>
+          </p:cNvSpPr>
+          <p:nvPr>
+            <p:ph type="title"/>
+          </p:nvPr>
+        </p:nvSpPr>
+        <p:spPr>
+          <a:xfrm>
+            <a:off x="2198696" y="289778"/>
+            <a:ext cx="7794607" cy="722594"/>
+          </a:xfrm>
+          <a:solidFill>
+            <a:schemeClr val="accent2">
+              <a:lumMod val="20000"/>
+              <a:lumOff val="80000"/>
+            </a:schemeClr>
+          </a:solidFill>
+        </p:spPr>
+        <p:txBody>
+          <a:bodyPr>
+            <a:normAutofit fontScale="90000"/>
+          </a:bodyPr>
+          <a:lstStyle/>
+          <a:p>
+            <a:r>
+              <a:rPr lang="it-IT" b="1" dirty="0">
+                <a:latin typeface="ACADEMY ENGRAVED LET PLAIN:1.0" panose="02000000000000000000" pitchFamily="2" charset="0"/>
+              </a:rPr>
+              <a:t>Requirement 3</a:t>
+            </a:r>
+          </a:p>
+        </p:txBody>
+      </p:sp>
+      <p:sp>
+        <p:nvSpPr>
+          <p:cNvPr id="4" name="TextBox 3">
+            <a:extLst>
+              <a:ext uri="{FF2B5EF4-FFF2-40B4-BE49-F238E27FC236}">
+                <a16:creationId xmlns:a16="http://schemas.microsoft.com/office/drawing/2014/main" id="{B72A6113-1884-865E-F1ED-3164E42444D6}"/>
+              </a:ext>
+            </a:extLst>
+          </p:cNvPr>
+          <p:cNvSpPr txBox="1"/>
+          <p:nvPr/>
+        </p:nvSpPr>
+        <p:spPr>
+          <a:xfrm>
+            <a:off x="504000" y="1526400"/>
+            <a:ext cx="10692000" cy="923330"/>
+          </a:xfrm>
+          <a:prstGeom prst="rect">
+            <a:avLst/>
+          </a:prstGeom>
+          <a:noFill/>
+        </p:spPr>
+        <p:txBody>
+          <a:bodyPr wrap="square" rtlCol="0">
+            <a:spAutoFit/>
+          </a:bodyPr>
+          <a:lstStyle/>
+          <a:p>
+            <a:pPr marL="285750" indent="-285750">
+              <a:buFont typeface="Arial" panose="020B0604020202020204" pitchFamily="34" charset="0"/>
+              <a:buChar char="•"/>
+            </a:pPr>
+            <a:r>
+              <a:rPr lang="en-US" dirty="0"/>
+              <a:t>Focus on pricing problem</a:t>
+            </a:r>
+          </a:p>
+          <a:p>
+            <a:pPr marL="285750" indent="-285750">
+              <a:buFont typeface="Arial" panose="020B0604020202020204" pitchFamily="34" charset="0"/>
+              <a:buChar char="•"/>
+            </a:pPr>
+            <a:r>
+              <a:rPr lang="en-US" dirty="0"/>
+              <a:t>Non-stationary environment (abrupt changes)</a:t>
+            </a:r>
+          </a:p>
+          <a:p>
+            <a:pPr marL="285750" indent="-285750">
+              <a:buFont typeface="Arial" panose="020B0604020202020204" pitchFamily="34" charset="0"/>
+              <a:buChar char="•"/>
+            </a:pPr>
+            <a:r>
+              <a:rPr lang="en-US" dirty="0"/>
+              <a:t>Noisy demand curve changes each interval</a:t>
+            </a:r>
+          </a:p>
+        </p:txBody>
+      </p:sp>
+      <p:sp>
+        <p:nvSpPr>
+          <p:cNvPr id="11" name="TextBox 10">
+            <a:extLst>
+              <a:ext uri="{FF2B5EF4-FFF2-40B4-BE49-F238E27FC236}">
+                <a16:creationId xmlns:a16="http://schemas.microsoft.com/office/drawing/2014/main" id="{58FE4009-EEFC-9D50-8CF5-FA6DF2CC25C1}"/>
+              </a:ext>
+            </a:extLst>
+          </p:cNvPr>
+          <p:cNvSpPr txBox="1"/>
+          <p:nvPr/>
+        </p:nvSpPr>
+        <p:spPr>
+          <a:xfrm>
+            <a:off x="504000" y="2856530"/>
+            <a:ext cx="10692000" cy="1200329"/>
+          </a:xfrm>
+          <a:prstGeom prst="rect">
+            <a:avLst/>
+          </a:prstGeom>
+          <a:noFill/>
+        </p:spPr>
+        <p:txBody>
+          <a:bodyPr wrap="square" rtlCol="0">
+            <a:spAutoFit/>
+          </a:bodyPr>
+          <a:lstStyle/>
+          <a:p>
+            <a:r>
+              <a:rPr lang="en-US" dirty="0"/>
+              <a:t>GOAL</a:t>
+            </a:r>
+          </a:p>
+          <a:p>
+            <a:r>
+              <a:rPr lang="en-US" dirty="0"/>
+              <a:t>Pricing strategy for discretized set of prices p in [0, 1] using:</a:t>
+            </a:r>
+          </a:p>
+          <a:p>
+            <a:pPr marL="285750" indent="-285750">
+              <a:buFont typeface="Arial" panose="020B0604020202020204" pitchFamily="34" charset="0"/>
+              <a:buChar char="•"/>
+            </a:pPr>
+            <a:r>
+              <a:rPr lang="en-US" dirty="0"/>
+              <a:t>Sliding Window</a:t>
+            </a:r>
+          </a:p>
+          <a:p>
+            <a:pPr marL="285750" indent="-285750">
+              <a:buFont typeface="Arial" panose="020B0604020202020204" pitchFamily="34" charset="0"/>
+              <a:buChar char="•"/>
+            </a:pPr>
+            <a:r>
+              <a:rPr lang="en-US" dirty="0"/>
+              <a:t>CUSUM</a:t>
+            </a:r>
+          </a:p>
+        </p:txBody>
+      </p:sp>
+    </p:spTree>
+    <p:extLst>
+      <p:ext uri="{BB962C8B-B14F-4D97-AF65-F5344CB8AC3E}">
+        <p14:creationId xmlns:p14="http://schemas.microsoft.com/office/powerpoint/2010/main" val="1433408740"/>
       </p:ext>
     </p:extLst>
   </p:cSld>

</xml_diff>

<commit_message>
Set up scheme for requirement 4
</commit_message>
<xml_diff>
--- a/SLIDES.pptx
+++ b/SLIDES.pptx
@@ -5,12 +5,12 @@
     <p:sldMasterId id="2147483696" r:id="rId1"/>
   </p:sldMasterIdLst>
   <p:notesMasterIdLst>
-    <p:notesMasterId r:id="rId19"/>
+    <p:notesMasterId r:id="rId25"/>
   </p:notesMasterIdLst>
   <p:sldIdLst>
     <p:sldId id="260" r:id="rId2"/>
-    <p:sldId id="268" r:id="rId3"/>
-    <p:sldId id="261" r:id="rId4"/>
+    <p:sldId id="261" r:id="rId3"/>
+    <p:sldId id="268" r:id="rId4"/>
     <p:sldId id="258" r:id="rId5"/>
     <p:sldId id="263" r:id="rId6"/>
     <p:sldId id="265" r:id="rId7"/>
@@ -25,6 +25,12 @@
     <p:sldId id="275" r:id="rId16"/>
     <p:sldId id="276" r:id="rId17"/>
     <p:sldId id="277" r:id="rId18"/>
+    <p:sldId id="280" r:id="rId19"/>
+    <p:sldId id="285" r:id="rId20"/>
+    <p:sldId id="281" r:id="rId21"/>
+    <p:sldId id="282" r:id="rId22"/>
+    <p:sldId id="283" r:id="rId23"/>
+    <p:sldId id="284" r:id="rId24"/>
   </p:sldIdLst>
   <p:sldSz cx="12192000" cy="6858000"/>
   <p:notesSz cx="6858000" cy="9144000"/>
@@ -213,7 +219,7 @@
           <a:p>
             <a:fld id="{C655A3F9-72E7-9A49-86BD-FB37A5575CC8}" type="datetimeFigureOut">
               <a:rPr lang="it-IT" smtClean="0"/>
-              <a:t>10/07/2024</a:t>
+              <a:t>11/07/24</a:t>
             </a:fld>
             <a:endParaRPr lang="it-IT"/>
           </a:p>
@@ -371,7 +377,7 @@
           <a:p>
             <a:fld id="{439E4B1C-0B36-B34E-B5D3-9687301EE318}" type="slidenum">
               <a:rPr lang="it-IT" smtClean="0"/>
-              <a:t>‹#›</a:t>
+              <a:t>‹N›</a:t>
             </a:fld>
             <a:endParaRPr lang="it-IT"/>
           </a:p>
@@ -1716,6 +1722,294 @@
 </p:notes>
 </file>
 
+<file path=ppt/notesSlides/notesSlide18.xml><?xml version="1.0" encoding="utf-8"?>
+<p:notes xmlns:a="http://schemas.openxmlformats.org/drawingml/2006/main" xmlns:r="http://schemas.openxmlformats.org/officeDocument/2006/relationships" xmlns:p="http://schemas.openxmlformats.org/presentationml/2006/main">
+  <p:cSld>
+    <p:spTree>
+      <p:nvGrpSpPr>
+        <p:cNvPr id="1" name=""/>
+        <p:cNvGrpSpPr/>
+        <p:nvPr/>
+      </p:nvGrpSpPr>
+      <p:grpSpPr>
+        <a:xfrm>
+          <a:off x="0" y="0"/>
+          <a:ext cx="0" cy="0"/>
+          <a:chOff x="0" y="0"/>
+          <a:chExt cx="0" cy="0"/>
+        </a:xfrm>
+      </p:grpSpPr>
+      <p:sp>
+        <p:nvSpPr>
+          <p:cNvPr id="2" name="Segnaposto immagine diapositiva 1"/>
+          <p:cNvSpPr>
+            <a:spLocks noGrp="1" noRot="1" noChangeAspect="1"/>
+          </p:cNvSpPr>
+          <p:nvPr>
+            <p:ph type="sldImg"/>
+          </p:nvPr>
+        </p:nvSpPr>
+        <p:spPr/>
+      </p:sp>
+      <p:sp>
+        <p:nvSpPr>
+          <p:cNvPr id="3" name="Segnaposto note 2"/>
+          <p:cNvSpPr>
+            <a:spLocks noGrp="1"/>
+          </p:cNvSpPr>
+          <p:nvPr>
+            <p:ph type="body" idx="1"/>
+          </p:nvPr>
+        </p:nvSpPr>
+        <p:spPr/>
+        <p:txBody>
+          <a:bodyPr/>
+          <a:lstStyle/>
+          <a:p>
+            <a:endParaRPr lang="it-IT"/>
+          </a:p>
+        </p:txBody>
+      </p:sp>
+      <p:sp>
+        <p:nvSpPr>
+          <p:cNvPr id="4" name="Segnaposto numero diapositiva 3"/>
+          <p:cNvSpPr>
+            <a:spLocks noGrp="1"/>
+          </p:cNvSpPr>
+          <p:nvPr>
+            <p:ph type="sldNum" sz="quarter" idx="5"/>
+          </p:nvPr>
+        </p:nvSpPr>
+        <p:spPr/>
+        <p:txBody>
+          <a:bodyPr/>
+          <a:lstStyle/>
+          <a:p>
+            <a:pPr marL="0" marR="0" lvl="0" indent="0" algn="r" defTabSz="457200" rtl="0" eaLnBrk="1" fontAlgn="auto" latinLnBrk="0" hangingPunct="1">
+              <a:lnSpc>
+                <a:spcPct val="100000"/>
+              </a:lnSpc>
+              <a:spcBef>
+                <a:spcPts val="0"/>
+              </a:spcBef>
+              <a:spcAft>
+                <a:spcPts val="0"/>
+              </a:spcAft>
+              <a:buClrTx/>
+              <a:buSzTx/>
+              <a:buFontTx/>
+              <a:buNone/>
+              <a:tabLst/>
+              <a:defRPr/>
+            </a:pPr>
+            <a:fld id="{439E4B1C-0B36-B34E-B5D3-9687301EE318}" type="slidenum">
+              <a:rPr kumimoji="0" lang="it-IT" sz="1200" b="0" i="0" u="none" strike="noStrike" kern="1200" cap="none" spc="0" normalizeH="0" baseline="0" noProof="0" smtClean="0">
+                <a:ln>
+                  <a:noFill/>
+                </a:ln>
+                <a:solidFill>
+                  <a:prstClr val="black"/>
+                </a:solidFill>
+                <a:effectLst/>
+                <a:uLnTx/>
+                <a:uFillTx/>
+                <a:latin typeface="Aptos" panose="02110004020202020204"/>
+                <a:ea typeface="+mn-ea"/>
+                <a:cs typeface="+mn-cs"/>
+              </a:rPr>
+              <a:pPr marL="0" marR="0" lvl="0" indent="0" algn="r" defTabSz="457200" rtl="0" eaLnBrk="1" fontAlgn="auto" latinLnBrk="0" hangingPunct="1">
+                <a:lnSpc>
+                  <a:spcPct val="100000"/>
+                </a:lnSpc>
+                <a:spcBef>
+                  <a:spcPts val="0"/>
+                </a:spcBef>
+                <a:spcAft>
+                  <a:spcPts val="0"/>
+                </a:spcAft>
+                <a:buClrTx/>
+                <a:buSzTx/>
+                <a:buFontTx/>
+                <a:buNone/>
+                <a:tabLst/>
+                <a:defRPr/>
+              </a:pPr>
+              <a:t>18</a:t>
+            </a:fld>
+            <a:endParaRPr kumimoji="0" lang="it-IT" sz="1200" b="0" i="0" u="none" strike="noStrike" kern="1200" cap="none" spc="0" normalizeH="0" baseline="0" noProof="0">
+              <a:ln>
+                <a:noFill/>
+              </a:ln>
+              <a:solidFill>
+                <a:prstClr val="black"/>
+              </a:solidFill>
+              <a:effectLst/>
+              <a:uLnTx/>
+              <a:uFillTx/>
+              <a:latin typeface="Aptos" panose="02110004020202020204"/>
+              <a:ea typeface="+mn-ea"/>
+              <a:cs typeface="+mn-cs"/>
+            </a:endParaRPr>
+          </a:p>
+        </p:txBody>
+      </p:sp>
+    </p:spTree>
+    <p:extLst>
+      <p:ext uri="{BB962C8B-B14F-4D97-AF65-F5344CB8AC3E}">
+        <p14:creationId xmlns:p14="http://schemas.microsoft.com/office/powerpoint/2010/main" val="2989519371"/>
+      </p:ext>
+    </p:extLst>
+  </p:cSld>
+  <p:clrMapOvr>
+    <a:masterClrMapping/>
+  </p:clrMapOvr>
+</p:notes>
+</file>
+
+<file path=ppt/notesSlides/notesSlide19.xml><?xml version="1.0" encoding="utf-8"?>
+<p:notes xmlns:a="http://schemas.openxmlformats.org/drawingml/2006/main" xmlns:r="http://schemas.openxmlformats.org/officeDocument/2006/relationships" xmlns:p="http://schemas.openxmlformats.org/presentationml/2006/main">
+  <p:cSld>
+    <p:spTree>
+      <p:nvGrpSpPr>
+        <p:cNvPr id="1" name=""/>
+        <p:cNvGrpSpPr/>
+        <p:nvPr/>
+      </p:nvGrpSpPr>
+      <p:grpSpPr>
+        <a:xfrm>
+          <a:off x="0" y="0"/>
+          <a:ext cx="0" cy="0"/>
+          <a:chOff x="0" y="0"/>
+          <a:chExt cx="0" cy="0"/>
+        </a:xfrm>
+      </p:grpSpPr>
+      <p:sp>
+        <p:nvSpPr>
+          <p:cNvPr id="2" name="Segnaposto immagine diapositiva 1"/>
+          <p:cNvSpPr>
+            <a:spLocks noGrp="1" noRot="1" noChangeAspect="1"/>
+          </p:cNvSpPr>
+          <p:nvPr>
+            <p:ph type="sldImg"/>
+          </p:nvPr>
+        </p:nvSpPr>
+        <p:spPr/>
+      </p:sp>
+      <p:sp>
+        <p:nvSpPr>
+          <p:cNvPr id="3" name="Segnaposto note 2"/>
+          <p:cNvSpPr>
+            <a:spLocks noGrp="1"/>
+          </p:cNvSpPr>
+          <p:nvPr>
+            <p:ph type="body" idx="1"/>
+          </p:nvPr>
+        </p:nvSpPr>
+        <p:spPr/>
+        <p:txBody>
+          <a:bodyPr/>
+          <a:lstStyle/>
+          <a:p>
+            <a:endParaRPr lang="it-IT"/>
+          </a:p>
+        </p:txBody>
+      </p:sp>
+      <p:sp>
+        <p:nvSpPr>
+          <p:cNvPr id="4" name="Segnaposto numero diapositiva 3"/>
+          <p:cNvSpPr>
+            <a:spLocks noGrp="1"/>
+          </p:cNvSpPr>
+          <p:nvPr>
+            <p:ph type="sldNum" sz="quarter" idx="5"/>
+          </p:nvPr>
+        </p:nvSpPr>
+        <p:spPr/>
+        <p:txBody>
+          <a:bodyPr/>
+          <a:lstStyle/>
+          <a:p>
+            <a:pPr marL="0" marR="0" lvl="0" indent="0" algn="r" defTabSz="457200" rtl="0" eaLnBrk="1" fontAlgn="auto" latinLnBrk="0" hangingPunct="1">
+              <a:lnSpc>
+                <a:spcPct val="100000"/>
+              </a:lnSpc>
+              <a:spcBef>
+                <a:spcPts val="0"/>
+              </a:spcBef>
+              <a:spcAft>
+                <a:spcPts val="0"/>
+              </a:spcAft>
+              <a:buClrTx/>
+              <a:buSzTx/>
+              <a:buFontTx/>
+              <a:buNone/>
+              <a:tabLst/>
+              <a:defRPr/>
+            </a:pPr>
+            <a:fld id="{439E4B1C-0B36-B34E-B5D3-9687301EE318}" type="slidenum">
+              <a:rPr kumimoji="0" lang="it-IT" sz="1200" b="0" i="0" u="none" strike="noStrike" kern="1200" cap="none" spc="0" normalizeH="0" baseline="0" noProof="0" smtClean="0">
+                <a:ln>
+                  <a:noFill/>
+                </a:ln>
+                <a:solidFill>
+                  <a:prstClr val="black"/>
+                </a:solidFill>
+                <a:effectLst/>
+                <a:uLnTx/>
+                <a:uFillTx/>
+                <a:latin typeface="Aptos" panose="02110004020202020204"/>
+                <a:ea typeface="+mn-ea"/>
+                <a:cs typeface="+mn-cs"/>
+              </a:rPr>
+              <a:pPr marL="0" marR="0" lvl="0" indent="0" algn="r" defTabSz="457200" rtl="0" eaLnBrk="1" fontAlgn="auto" latinLnBrk="0" hangingPunct="1">
+                <a:lnSpc>
+                  <a:spcPct val="100000"/>
+                </a:lnSpc>
+                <a:spcBef>
+                  <a:spcPts val="0"/>
+                </a:spcBef>
+                <a:spcAft>
+                  <a:spcPts val="0"/>
+                </a:spcAft>
+                <a:buClrTx/>
+                <a:buSzTx/>
+                <a:buFontTx/>
+                <a:buNone/>
+                <a:tabLst/>
+                <a:defRPr/>
+              </a:pPr>
+              <a:t>19</a:t>
+            </a:fld>
+            <a:endParaRPr kumimoji="0" lang="it-IT" sz="1200" b="0" i="0" u="none" strike="noStrike" kern="1200" cap="none" spc="0" normalizeH="0" baseline="0" noProof="0">
+              <a:ln>
+                <a:noFill/>
+              </a:ln>
+              <a:solidFill>
+                <a:prstClr val="black"/>
+              </a:solidFill>
+              <a:effectLst/>
+              <a:uLnTx/>
+              <a:uFillTx/>
+              <a:latin typeface="Aptos" panose="02110004020202020204"/>
+              <a:ea typeface="+mn-ea"/>
+              <a:cs typeface="+mn-cs"/>
+            </a:endParaRPr>
+          </a:p>
+        </p:txBody>
+      </p:sp>
+    </p:spTree>
+    <p:extLst>
+      <p:ext uri="{BB962C8B-B14F-4D97-AF65-F5344CB8AC3E}">
+        <p14:creationId xmlns:p14="http://schemas.microsoft.com/office/powerpoint/2010/main" val="3277217643"/>
+      </p:ext>
+    </p:extLst>
+  </p:cSld>
+  <p:clrMapOvr>
+    <a:masterClrMapping/>
+  </p:clrMapOvr>
+</p:notes>
+</file>
+
 <file path=ppt/notesSlides/notesSlide2.xml><?xml version="1.0" encoding="utf-8"?>
 <p:notes xmlns:a="http://schemas.openxmlformats.org/drawingml/2006/main" xmlns:r="http://schemas.openxmlformats.org/officeDocument/2006/relationships" xmlns:p="http://schemas.openxmlformats.org/presentationml/2006/main">
   <p:cSld>
@@ -1790,7 +2084,583 @@
     </p:spTree>
     <p:extLst>
       <p:ext uri="{BB962C8B-B14F-4D97-AF65-F5344CB8AC3E}">
-        <p14:creationId xmlns:p14="http://schemas.microsoft.com/office/powerpoint/2010/main" val="3063598697"/>
+        <p14:creationId xmlns:p14="http://schemas.microsoft.com/office/powerpoint/2010/main" val="1069376291"/>
+      </p:ext>
+    </p:extLst>
+  </p:cSld>
+  <p:clrMapOvr>
+    <a:masterClrMapping/>
+  </p:clrMapOvr>
+</p:notes>
+</file>
+
+<file path=ppt/notesSlides/notesSlide20.xml><?xml version="1.0" encoding="utf-8"?>
+<p:notes xmlns:a="http://schemas.openxmlformats.org/drawingml/2006/main" xmlns:r="http://schemas.openxmlformats.org/officeDocument/2006/relationships" xmlns:p="http://schemas.openxmlformats.org/presentationml/2006/main">
+  <p:cSld>
+    <p:spTree>
+      <p:nvGrpSpPr>
+        <p:cNvPr id="1" name=""/>
+        <p:cNvGrpSpPr/>
+        <p:nvPr/>
+      </p:nvGrpSpPr>
+      <p:grpSpPr>
+        <a:xfrm>
+          <a:off x="0" y="0"/>
+          <a:ext cx="0" cy="0"/>
+          <a:chOff x="0" y="0"/>
+          <a:chExt cx="0" cy="0"/>
+        </a:xfrm>
+      </p:grpSpPr>
+      <p:sp>
+        <p:nvSpPr>
+          <p:cNvPr id="2" name="Segnaposto immagine diapositiva 1"/>
+          <p:cNvSpPr>
+            <a:spLocks noGrp="1" noRot="1" noChangeAspect="1"/>
+          </p:cNvSpPr>
+          <p:nvPr>
+            <p:ph type="sldImg"/>
+          </p:nvPr>
+        </p:nvSpPr>
+        <p:spPr/>
+      </p:sp>
+      <p:sp>
+        <p:nvSpPr>
+          <p:cNvPr id="3" name="Segnaposto note 2"/>
+          <p:cNvSpPr>
+            <a:spLocks noGrp="1"/>
+          </p:cNvSpPr>
+          <p:nvPr>
+            <p:ph type="body" idx="1"/>
+          </p:nvPr>
+        </p:nvSpPr>
+        <p:spPr/>
+        <p:txBody>
+          <a:bodyPr/>
+          <a:lstStyle/>
+          <a:p>
+            <a:endParaRPr lang="it-IT"/>
+          </a:p>
+        </p:txBody>
+      </p:sp>
+      <p:sp>
+        <p:nvSpPr>
+          <p:cNvPr id="4" name="Segnaposto numero diapositiva 3"/>
+          <p:cNvSpPr>
+            <a:spLocks noGrp="1"/>
+          </p:cNvSpPr>
+          <p:nvPr>
+            <p:ph type="sldNum" sz="quarter" idx="5"/>
+          </p:nvPr>
+        </p:nvSpPr>
+        <p:spPr/>
+        <p:txBody>
+          <a:bodyPr/>
+          <a:lstStyle/>
+          <a:p>
+            <a:pPr marL="0" marR="0" lvl="0" indent="0" algn="r" defTabSz="457200" rtl="0" eaLnBrk="1" fontAlgn="auto" latinLnBrk="0" hangingPunct="1">
+              <a:lnSpc>
+                <a:spcPct val="100000"/>
+              </a:lnSpc>
+              <a:spcBef>
+                <a:spcPts val="0"/>
+              </a:spcBef>
+              <a:spcAft>
+                <a:spcPts val="0"/>
+              </a:spcAft>
+              <a:buClrTx/>
+              <a:buSzTx/>
+              <a:buFontTx/>
+              <a:buNone/>
+              <a:tabLst/>
+              <a:defRPr/>
+            </a:pPr>
+            <a:fld id="{439E4B1C-0B36-B34E-B5D3-9687301EE318}" type="slidenum">
+              <a:rPr kumimoji="0" lang="it-IT" sz="1200" b="0" i="0" u="none" strike="noStrike" kern="1200" cap="none" spc="0" normalizeH="0" baseline="0" noProof="0" smtClean="0">
+                <a:ln>
+                  <a:noFill/>
+                </a:ln>
+                <a:solidFill>
+                  <a:prstClr val="black"/>
+                </a:solidFill>
+                <a:effectLst/>
+                <a:uLnTx/>
+                <a:uFillTx/>
+                <a:latin typeface="Aptos" panose="02110004020202020204"/>
+                <a:ea typeface="+mn-ea"/>
+                <a:cs typeface="+mn-cs"/>
+              </a:rPr>
+              <a:pPr marL="0" marR="0" lvl="0" indent="0" algn="r" defTabSz="457200" rtl="0" eaLnBrk="1" fontAlgn="auto" latinLnBrk="0" hangingPunct="1">
+                <a:lnSpc>
+                  <a:spcPct val="100000"/>
+                </a:lnSpc>
+                <a:spcBef>
+                  <a:spcPts val="0"/>
+                </a:spcBef>
+                <a:spcAft>
+                  <a:spcPts val="0"/>
+                </a:spcAft>
+                <a:buClrTx/>
+                <a:buSzTx/>
+                <a:buFontTx/>
+                <a:buNone/>
+                <a:tabLst/>
+                <a:defRPr/>
+              </a:pPr>
+              <a:t>20</a:t>
+            </a:fld>
+            <a:endParaRPr kumimoji="0" lang="it-IT" sz="1200" b="0" i="0" u="none" strike="noStrike" kern="1200" cap="none" spc="0" normalizeH="0" baseline="0" noProof="0">
+              <a:ln>
+                <a:noFill/>
+              </a:ln>
+              <a:solidFill>
+                <a:prstClr val="black"/>
+              </a:solidFill>
+              <a:effectLst/>
+              <a:uLnTx/>
+              <a:uFillTx/>
+              <a:latin typeface="Aptos" panose="02110004020202020204"/>
+              <a:ea typeface="+mn-ea"/>
+              <a:cs typeface="+mn-cs"/>
+            </a:endParaRPr>
+          </a:p>
+        </p:txBody>
+      </p:sp>
+    </p:spTree>
+    <p:extLst>
+      <p:ext uri="{BB962C8B-B14F-4D97-AF65-F5344CB8AC3E}">
+        <p14:creationId xmlns:p14="http://schemas.microsoft.com/office/powerpoint/2010/main" val="1715262756"/>
+      </p:ext>
+    </p:extLst>
+  </p:cSld>
+  <p:clrMapOvr>
+    <a:masterClrMapping/>
+  </p:clrMapOvr>
+</p:notes>
+</file>
+
+<file path=ppt/notesSlides/notesSlide21.xml><?xml version="1.0" encoding="utf-8"?>
+<p:notes xmlns:a="http://schemas.openxmlformats.org/drawingml/2006/main" xmlns:r="http://schemas.openxmlformats.org/officeDocument/2006/relationships" xmlns:p="http://schemas.openxmlformats.org/presentationml/2006/main">
+  <p:cSld>
+    <p:spTree>
+      <p:nvGrpSpPr>
+        <p:cNvPr id="1" name=""/>
+        <p:cNvGrpSpPr/>
+        <p:nvPr/>
+      </p:nvGrpSpPr>
+      <p:grpSpPr>
+        <a:xfrm>
+          <a:off x="0" y="0"/>
+          <a:ext cx="0" cy="0"/>
+          <a:chOff x="0" y="0"/>
+          <a:chExt cx="0" cy="0"/>
+        </a:xfrm>
+      </p:grpSpPr>
+      <p:sp>
+        <p:nvSpPr>
+          <p:cNvPr id="2" name="Segnaposto immagine diapositiva 1"/>
+          <p:cNvSpPr>
+            <a:spLocks noGrp="1" noRot="1" noChangeAspect="1"/>
+          </p:cNvSpPr>
+          <p:nvPr>
+            <p:ph type="sldImg"/>
+          </p:nvPr>
+        </p:nvSpPr>
+        <p:spPr/>
+      </p:sp>
+      <p:sp>
+        <p:nvSpPr>
+          <p:cNvPr id="3" name="Segnaposto note 2"/>
+          <p:cNvSpPr>
+            <a:spLocks noGrp="1"/>
+          </p:cNvSpPr>
+          <p:nvPr>
+            <p:ph type="body" idx="1"/>
+          </p:nvPr>
+        </p:nvSpPr>
+        <p:spPr/>
+        <p:txBody>
+          <a:bodyPr/>
+          <a:lstStyle/>
+          <a:p>
+            <a:endParaRPr lang="it-IT"/>
+          </a:p>
+        </p:txBody>
+      </p:sp>
+      <p:sp>
+        <p:nvSpPr>
+          <p:cNvPr id="4" name="Segnaposto numero diapositiva 3"/>
+          <p:cNvSpPr>
+            <a:spLocks noGrp="1"/>
+          </p:cNvSpPr>
+          <p:nvPr>
+            <p:ph type="sldNum" sz="quarter" idx="5"/>
+          </p:nvPr>
+        </p:nvSpPr>
+        <p:spPr/>
+        <p:txBody>
+          <a:bodyPr/>
+          <a:lstStyle/>
+          <a:p>
+            <a:pPr marL="0" marR="0" lvl="0" indent="0" algn="r" defTabSz="457200" rtl="0" eaLnBrk="1" fontAlgn="auto" latinLnBrk="0" hangingPunct="1">
+              <a:lnSpc>
+                <a:spcPct val="100000"/>
+              </a:lnSpc>
+              <a:spcBef>
+                <a:spcPts val="0"/>
+              </a:spcBef>
+              <a:spcAft>
+                <a:spcPts val="0"/>
+              </a:spcAft>
+              <a:buClrTx/>
+              <a:buSzTx/>
+              <a:buFontTx/>
+              <a:buNone/>
+              <a:tabLst/>
+              <a:defRPr/>
+            </a:pPr>
+            <a:fld id="{439E4B1C-0B36-B34E-B5D3-9687301EE318}" type="slidenum">
+              <a:rPr kumimoji="0" lang="it-IT" sz="1200" b="0" i="0" u="none" strike="noStrike" kern="1200" cap="none" spc="0" normalizeH="0" baseline="0" noProof="0" smtClean="0">
+                <a:ln>
+                  <a:noFill/>
+                </a:ln>
+                <a:solidFill>
+                  <a:prstClr val="black"/>
+                </a:solidFill>
+                <a:effectLst/>
+                <a:uLnTx/>
+                <a:uFillTx/>
+                <a:latin typeface="Aptos" panose="02110004020202020204"/>
+                <a:ea typeface="+mn-ea"/>
+                <a:cs typeface="+mn-cs"/>
+              </a:rPr>
+              <a:pPr marL="0" marR="0" lvl="0" indent="0" algn="r" defTabSz="457200" rtl="0" eaLnBrk="1" fontAlgn="auto" latinLnBrk="0" hangingPunct="1">
+                <a:lnSpc>
+                  <a:spcPct val="100000"/>
+                </a:lnSpc>
+                <a:spcBef>
+                  <a:spcPts val="0"/>
+                </a:spcBef>
+                <a:spcAft>
+                  <a:spcPts val="0"/>
+                </a:spcAft>
+                <a:buClrTx/>
+                <a:buSzTx/>
+                <a:buFontTx/>
+                <a:buNone/>
+                <a:tabLst/>
+                <a:defRPr/>
+              </a:pPr>
+              <a:t>21</a:t>
+            </a:fld>
+            <a:endParaRPr kumimoji="0" lang="it-IT" sz="1200" b="0" i="0" u="none" strike="noStrike" kern="1200" cap="none" spc="0" normalizeH="0" baseline="0" noProof="0">
+              <a:ln>
+                <a:noFill/>
+              </a:ln>
+              <a:solidFill>
+                <a:prstClr val="black"/>
+              </a:solidFill>
+              <a:effectLst/>
+              <a:uLnTx/>
+              <a:uFillTx/>
+              <a:latin typeface="Aptos" panose="02110004020202020204"/>
+              <a:ea typeface="+mn-ea"/>
+              <a:cs typeface="+mn-cs"/>
+            </a:endParaRPr>
+          </a:p>
+        </p:txBody>
+      </p:sp>
+    </p:spTree>
+    <p:extLst>
+      <p:ext uri="{BB962C8B-B14F-4D97-AF65-F5344CB8AC3E}">
+        <p14:creationId xmlns:p14="http://schemas.microsoft.com/office/powerpoint/2010/main" val="3327624394"/>
+      </p:ext>
+    </p:extLst>
+  </p:cSld>
+  <p:clrMapOvr>
+    <a:masterClrMapping/>
+  </p:clrMapOvr>
+</p:notes>
+</file>
+
+<file path=ppt/notesSlides/notesSlide22.xml><?xml version="1.0" encoding="utf-8"?>
+<p:notes xmlns:a="http://schemas.openxmlformats.org/drawingml/2006/main" xmlns:r="http://schemas.openxmlformats.org/officeDocument/2006/relationships" xmlns:p="http://schemas.openxmlformats.org/presentationml/2006/main">
+  <p:cSld>
+    <p:spTree>
+      <p:nvGrpSpPr>
+        <p:cNvPr id="1" name=""/>
+        <p:cNvGrpSpPr/>
+        <p:nvPr/>
+      </p:nvGrpSpPr>
+      <p:grpSpPr>
+        <a:xfrm>
+          <a:off x="0" y="0"/>
+          <a:ext cx="0" cy="0"/>
+          <a:chOff x="0" y="0"/>
+          <a:chExt cx="0" cy="0"/>
+        </a:xfrm>
+      </p:grpSpPr>
+      <p:sp>
+        <p:nvSpPr>
+          <p:cNvPr id="2" name="Segnaposto immagine diapositiva 1"/>
+          <p:cNvSpPr>
+            <a:spLocks noGrp="1" noRot="1" noChangeAspect="1"/>
+          </p:cNvSpPr>
+          <p:nvPr>
+            <p:ph type="sldImg"/>
+          </p:nvPr>
+        </p:nvSpPr>
+        <p:spPr/>
+      </p:sp>
+      <p:sp>
+        <p:nvSpPr>
+          <p:cNvPr id="3" name="Segnaposto note 2"/>
+          <p:cNvSpPr>
+            <a:spLocks noGrp="1"/>
+          </p:cNvSpPr>
+          <p:nvPr>
+            <p:ph type="body" idx="1"/>
+          </p:nvPr>
+        </p:nvSpPr>
+        <p:spPr/>
+        <p:txBody>
+          <a:bodyPr/>
+          <a:lstStyle/>
+          <a:p>
+            <a:endParaRPr lang="it-IT"/>
+          </a:p>
+        </p:txBody>
+      </p:sp>
+      <p:sp>
+        <p:nvSpPr>
+          <p:cNvPr id="4" name="Segnaposto numero diapositiva 3"/>
+          <p:cNvSpPr>
+            <a:spLocks noGrp="1"/>
+          </p:cNvSpPr>
+          <p:nvPr>
+            <p:ph type="sldNum" sz="quarter" idx="5"/>
+          </p:nvPr>
+        </p:nvSpPr>
+        <p:spPr/>
+        <p:txBody>
+          <a:bodyPr/>
+          <a:lstStyle/>
+          <a:p>
+            <a:pPr marL="0" marR="0" lvl="0" indent="0" algn="r" defTabSz="457200" rtl="0" eaLnBrk="1" fontAlgn="auto" latinLnBrk="0" hangingPunct="1">
+              <a:lnSpc>
+                <a:spcPct val="100000"/>
+              </a:lnSpc>
+              <a:spcBef>
+                <a:spcPts val="0"/>
+              </a:spcBef>
+              <a:spcAft>
+                <a:spcPts val="0"/>
+              </a:spcAft>
+              <a:buClrTx/>
+              <a:buSzTx/>
+              <a:buFontTx/>
+              <a:buNone/>
+              <a:tabLst/>
+              <a:defRPr/>
+            </a:pPr>
+            <a:fld id="{439E4B1C-0B36-B34E-B5D3-9687301EE318}" type="slidenum">
+              <a:rPr kumimoji="0" lang="it-IT" sz="1200" b="0" i="0" u="none" strike="noStrike" kern="1200" cap="none" spc="0" normalizeH="0" baseline="0" noProof="0" smtClean="0">
+                <a:ln>
+                  <a:noFill/>
+                </a:ln>
+                <a:solidFill>
+                  <a:prstClr val="black"/>
+                </a:solidFill>
+                <a:effectLst/>
+                <a:uLnTx/>
+                <a:uFillTx/>
+                <a:latin typeface="Aptos" panose="02110004020202020204"/>
+                <a:ea typeface="+mn-ea"/>
+                <a:cs typeface="+mn-cs"/>
+              </a:rPr>
+              <a:pPr marL="0" marR="0" lvl="0" indent="0" algn="r" defTabSz="457200" rtl="0" eaLnBrk="1" fontAlgn="auto" latinLnBrk="0" hangingPunct="1">
+                <a:lnSpc>
+                  <a:spcPct val="100000"/>
+                </a:lnSpc>
+                <a:spcBef>
+                  <a:spcPts val="0"/>
+                </a:spcBef>
+                <a:spcAft>
+                  <a:spcPts val="0"/>
+                </a:spcAft>
+                <a:buClrTx/>
+                <a:buSzTx/>
+                <a:buFontTx/>
+                <a:buNone/>
+                <a:tabLst/>
+                <a:defRPr/>
+              </a:pPr>
+              <a:t>22</a:t>
+            </a:fld>
+            <a:endParaRPr kumimoji="0" lang="it-IT" sz="1200" b="0" i="0" u="none" strike="noStrike" kern="1200" cap="none" spc="0" normalizeH="0" baseline="0" noProof="0">
+              <a:ln>
+                <a:noFill/>
+              </a:ln>
+              <a:solidFill>
+                <a:prstClr val="black"/>
+              </a:solidFill>
+              <a:effectLst/>
+              <a:uLnTx/>
+              <a:uFillTx/>
+              <a:latin typeface="Aptos" panose="02110004020202020204"/>
+              <a:ea typeface="+mn-ea"/>
+              <a:cs typeface="+mn-cs"/>
+            </a:endParaRPr>
+          </a:p>
+        </p:txBody>
+      </p:sp>
+    </p:spTree>
+    <p:extLst>
+      <p:ext uri="{BB962C8B-B14F-4D97-AF65-F5344CB8AC3E}">
+        <p14:creationId xmlns:p14="http://schemas.microsoft.com/office/powerpoint/2010/main" val="165773281"/>
+      </p:ext>
+    </p:extLst>
+  </p:cSld>
+  <p:clrMapOvr>
+    <a:masterClrMapping/>
+  </p:clrMapOvr>
+</p:notes>
+</file>
+
+<file path=ppt/notesSlides/notesSlide23.xml><?xml version="1.0" encoding="utf-8"?>
+<p:notes xmlns:a="http://schemas.openxmlformats.org/drawingml/2006/main" xmlns:r="http://schemas.openxmlformats.org/officeDocument/2006/relationships" xmlns:p="http://schemas.openxmlformats.org/presentationml/2006/main">
+  <p:cSld>
+    <p:spTree>
+      <p:nvGrpSpPr>
+        <p:cNvPr id="1" name=""/>
+        <p:cNvGrpSpPr/>
+        <p:nvPr/>
+      </p:nvGrpSpPr>
+      <p:grpSpPr>
+        <a:xfrm>
+          <a:off x="0" y="0"/>
+          <a:ext cx="0" cy="0"/>
+          <a:chOff x="0" y="0"/>
+          <a:chExt cx="0" cy="0"/>
+        </a:xfrm>
+      </p:grpSpPr>
+      <p:sp>
+        <p:nvSpPr>
+          <p:cNvPr id="2" name="Segnaposto immagine diapositiva 1"/>
+          <p:cNvSpPr>
+            <a:spLocks noGrp="1" noRot="1" noChangeAspect="1"/>
+          </p:cNvSpPr>
+          <p:nvPr>
+            <p:ph type="sldImg"/>
+          </p:nvPr>
+        </p:nvSpPr>
+        <p:spPr/>
+      </p:sp>
+      <p:sp>
+        <p:nvSpPr>
+          <p:cNvPr id="3" name="Segnaposto note 2"/>
+          <p:cNvSpPr>
+            <a:spLocks noGrp="1"/>
+          </p:cNvSpPr>
+          <p:nvPr>
+            <p:ph type="body" idx="1"/>
+          </p:nvPr>
+        </p:nvSpPr>
+        <p:spPr/>
+        <p:txBody>
+          <a:bodyPr/>
+          <a:lstStyle/>
+          <a:p>
+            <a:endParaRPr lang="it-IT"/>
+          </a:p>
+        </p:txBody>
+      </p:sp>
+      <p:sp>
+        <p:nvSpPr>
+          <p:cNvPr id="4" name="Segnaposto numero diapositiva 3"/>
+          <p:cNvSpPr>
+            <a:spLocks noGrp="1"/>
+          </p:cNvSpPr>
+          <p:nvPr>
+            <p:ph type="sldNum" sz="quarter" idx="5"/>
+          </p:nvPr>
+        </p:nvSpPr>
+        <p:spPr/>
+        <p:txBody>
+          <a:bodyPr/>
+          <a:lstStyle/>
+          <a:p>
+            <a:pPr marL="0" marR="0" lvl="0" indent="0" algn="r" defTabSz="457200" rtl="0" eaLnBrk="1" fontAlgn="auto" latinLnBrk="0" hangingPunct="1">
+              <a:lnSpc>
+                <a:spcPct val="100000"/>
+              </a:lnSpc>
+              <a:spcBef>
+                <a:spcPts val="0"/>
+              </a:spcBef>
+              <a:spcAft>
+                <a:spcPts val="0"/>
+              </a:spcAft>
+              <a:buClrTx/>
+              <a:buSzTx/>
+              <a:buFontTx/>
+              <a:buNone/>
+              <a:tabLst/>
+              <a:defRPr/>
+            </a:pPr>
+            <a:fld id="{439E4B1C-0B36-B34E-B5D3-9687301EE318}" type="slidenum">
+              <a:rPr kumimoji="0" lang="it-IT" sz="1200" b="0" i="0" u="none" strike="noStrike" kern="1200" cap="none" spc="0" normalizeH="0" baseline="0" noProof="0" smtClean="0">
+                <a:ln>
+                  <a:noFill/>
+                </a:ln>
+                <a:solidFill>
+                  <a:prstClr val="black"/>
+                </a:solidFill>
+                <a:effectLst/>
+                <a:uLnTx/>
+                <a:uFillTx/>
+                <a:latin typeface="Aptos" panose="02110004020202020204"/>
+                <a:ea typeface="+mn-ea"/>
+                <a:cs typeface="+mn-cs"/>
+              </a:rPr>
+              <a:pPr marL="0" marR="0" lvl="0" indent="0" algn="r" defTabSz="457200" rtl="0" eaLnBrk="1" fontAlgn="auto" latinLnBrk="0" hangingPunct="1">
+                <a:lnSpc>
+                  <a:spcPct val="100000"/>
+                </a:lnSpc>
+                <a:spcBef>
+                  <a:spcPts val="0"/>
+                </a:spcBef>
+                <a:spcAft>
+                  <a:spcPts val="0"/>
+                </a:spcAft>
+                <a:buClrTx/>
+                <a:buSzTx/>
+                <a:buFontTx/>
+                <a:buNone/>
+                <a:tabLst/>
+                <a:defRPr/>
+              </a:pPr>
+              <a:t>23</a:t>
+            </a:fld>
+            <a:endParaRPr kumimoji="0" lang="it-IT" sz="1200" b="0" i="0" u="none" strike="noStrike" kern="1200" cap="none" spc="0" normalizeH="0" baseline="0" noProof="0">
+              <a:ln>
+                <a:noFill/>
+              </a:ln>
+              <a:solidFill>
+                <a:prstClr val="black"/>
+              </a:solidFill>
+              <a:effectLst/>
+              <a:uLnTx/>
+              <a:uFillTx/>
+              <a:latin typeface="Aptos" panose="02110004020202020204"/>
+              <a:ea typeface="+mn-ea"/>
+              <a:cs typeface="+mn-cs"/>
+            </a:endParaRPr>
+          </a:p>
+        </p:txBody>
+      </p:sp>
+    </p:spTree>
+    <p:extLst>
+      <p:ext uri="{BB962C8B-B14F-4D97-AF65-F5344CB8AC3E}">
+        <p14:creationId xmlns:p14="http://schemas.microsoft.com/office/powerpoint/2010/main" val="4154047954"/>
       </p:ext>
     </p:extLst>
   </p:cSld>
@@ -1874,7 +2744,7 @@
     </p:spTree>
     <p:extLst>
       <p:ext uri="{BB962C8B-B14F-4D97-AF65-F5344CB8AC3E}">
-        <p14:creationId xmlns:p14="http://schemas.microsoft.com/office/powerpoint/2010/main" val="1069376291"/>
+        <p14:creationId xmlns:p14="http://schemas.microsoft.com/office/powerpoint/2010/main" val="3063598697"/>
       </p:ext>
     </p:extLst>
   </p:cSld>
@@ -2611,7 +3481,7 @@
           <a:p>
             <a:fld id="{1160EA64-D806-43AC-9DF2-F8C432F32B4C}" type="datetimeFigureOut">
               <a:rPr lang="en-US" dirty="0"/>
-              <a:t>7/10/2024</a:t>
+              <a:t>7/11/24</a:t>
             </a:fld>
             <a:endParaRPr lang="en-US" dirty="0"/>
           </a:p>
@@ -2654,7 +3524,7 @@
             <a:fld id="{8A7A6979-0714-4377-B894-6BE4C2D6E202}" type="slidenum">
               <a:rPr lang="en-US" dirty="0"/>
               <a:pPr/>
-              <a:t>‹#›</a:t>
+              <a:t>‹N›</a:t>
             </a:fld>
             <a:endParaRPr lang="en-US" dirty="0"/>
           </a:p>
@@ -2777,7 +3647,7 @@
           <a:p>
             <a:fld id="{E9F9C37B-1D36-470B-8223-D6C91242EC14}" type="datetimeFigureOut">
               <a:rPr lang="en-US" dirty="0"/>
-              <a:t>7/10/2024</a:t>
+              <a:t>7/11/24</a:t>
             </a:fld>
             <a:endParaRPr lang="en-US" dirty="0"/>
           </a:p>
@@ -2819,7 +3689,7 @@
           <a:p>
             <a:fld id="{8A7A6979-0714-4377-B894-6BE4C2D6E202}" type="slidenum">
               <a:rPr lang="en-US" dirty="0"/>
-              <a:t>‹#›</a:t>
+              <a:t>‹N›</a:t>
             </a:fld>
             <a:endParaRPr lang="en-US" dirty="0"/>
           </a:p>
@@ -2952,7 +3822,7 @@
           <a:p>
             <a:fld id="{67C6F52A-A82B-47A2-A83A-8C4C91F2D59F}" type="datetimeFigureOut">
               <a:rPr lang="en-US" dirty="0"/>
-              <a:t>7/10/2024</a:t>
+              <a:t>7/11/24</a:t>
             </a:fld>
             <a:endParaRPr lang="en-US" dirty="0"/>
           </a:p>
@@ -2994,7 +3864,7 @@
           <a:p>
             <a:fld id="{8A7A6979-0714-4377-B894-6BE4C2D6E202}" type="slidenum">
               <a:rPr lang="en-US" dirty="0"/>
-              <a:t>‹#›</a:t>
+              <a:t>‹N›</a:t>
             </a:fld>
             <a:endParaRPr lang="en-US" dirty="0"/>
           </a:p>
@@ -3117,7 +3987,7 @@
           <a:p>
             <a:fld id="{F070A7B3-6521-4DCA-87E5-044747A908C1}" type="datetimeFigureOut">
               <a:rPr lang="en-US" dirty="0"/>
-              <a:t>7/10/2024</a:t>
+              <a:t>7/11/24</a:t>
             </a:fld>
             <a:endParaRPr lang="en-US" dirty="0"/>
           </a:p>
@@ -3160,7 +4030,7 @@
             <a:fld id="{8A7A6979-0714-4377-B894-6BE4C2D6E202}" type="slidenum">
               <a:rPr lang="en-US" dirty="0"/>
               <a:pPr/>
-              <a:t>‹#›</a:t>
+              <a:t>‹N›</a:t>
             </a:fld>
             <a:endParaRPr lang="en-US" dirty="0"/>
           </a:p>
@@ -3381,7 +4251,7 @@
           <a:p>
             <a:fld id="{1160EA64-D806-43AC-9DF2-F8C432F32B4C}" type="datetimeFigureOut">
               <a:rPr lang="en-US" dirty="0"/>
-              <a:t>7/10/2024</a:t>
+              <a:t>7/11/24</a:t>
             </a:fld>
             <a:endParaRPr lang="en-US" dirty="0"/>
           </a:p>
@@ -3424,7 +4294,7 @@
             <a:fld id="{8A7A6979-0714-4377-B894-6BE4C2D6E202}" type="slidenum">
               <a:rPr lang="en-US" dirty="0"/>
               <a:pPr/>
-              <a:t>‹#›</a:t>
+              <a:t>‹N›</a:t>
             </a:fld>
             <a:endParaRPr lang="en-US" dirty="0"/>
           </a:p>
@@ -3609,7 +4479,7 @@
           <a:p>
             <a:fld id="{AB134690-1557-4C89-A502-4959FE7FAD70}" type="datetimeFigureOut">
               <a:rPr lang="en-US" dirty="0"/>
-              <a:t>7/10/2024</a:t>
+              <a:t>7/11/24</a:t>
             </a:fld>
             <a:endParaRPr lang="en-US" dirty="0"/>
           </a:p>
@@ -3651,7 +4521,7 @@
           <a:p>
             <a:fld id="{8A7A6979-0714-4377-B894-6BE4C2D6E202}" type="slidenum">
               <a:rPr lang="en-US" dirty="0"/>
-              <a:t>‹#›</a:t>
+              <a:t>‹N›</a:t>
             </a:fld>
             <a:endParaRPr lang="en-US" dirty="0"/>
           </a:p>
@@ -3963,7 +4833,7 @@
           <a:p>
             <a:fld id="{4F7D4976-E339-4826-83B7-FBD03F55ECF8}" type="datetimeFigureOut">
               <a:rPr lang="en-US" dirty="0"/>
-              <a:t>7/10/2024</a:t>
+              <a:t>7/11/24</a:t>
             </a:fld>
             <a:endParaRPr lang="en-US" dirty="0"/>
           </a:p>
@@ -4005,7 +4875,7 @@
           <a:p>
             <a:fld id="{8A7A6979-0714-4377-B894-6BE4C2D6E202}" type="slidenum">
               <a:rPr lang="en-US" dirty="0"/>
-              <a:t>‹#›</a:t>
+              <a:t>‹N›</a:t>
             </a:fld>
             <a:endParaRPr lang="en-US" dirty="0"/>
           </a:p>
@@ -4099,7 +4969,7 @@
           <a:p>
             <a:fld id="{E1037C31-9E7A-4F99-8774-A0E530DE1A42}" type="datetimeFigureOut">
               <a:rPr lang="en-US" dirty="0"/>
-              <a:t>7/10/2024</a:t>
+              <a:t>7/11/24</a:t>
             </a:fld>
             <a:endParaRPr lang="en-US" dirty="0"/>
           </a:p>
@@ -4141,7 +5011,7 @@
           <a:p>
             <a:fld id="{8A7A6979-0714-4377-B894-6BE4C2D6E202}" type="slidenum">
               <a:rPr lang="en-US" dirty="0"/>
-              <a:t>‹#›</a:t>
+              <a:t>‹N›</a:t>
             </a:fld>
             <a:endParaRPr lang="en-US" dirty="0"/>
           </a:p>
@@ -4189,7 +5059,7 @@
           <a:p>
             <a:fld id="{C278504F-A551-4DE0-9316-4DCD1D8CC752}" type="datetimeFigureOut">
               <a:rPr lang="en-US" dirty="0"/>
-              <a:t>7/10/2024</a:t>
+              <a:t>7/11/24</a:t>
             </a:fld>
             <a:endParaRPr lang="en-US" dirty="0"/>
           </a:p>
@@ -4231,7 +5101,7 @@
           <a:p>
             <a:fld id="{8A7A6979-0714-4377-B894-6BE4C2D6E202}" type="slidenum">
               <a:rPr lang="en-US" dirty="0"/>
-              <a:t>‹#›</a:t>
+              <a:t>‹N›</a:t>
             </a:fld>
             <a:endParaRPr lang="en-US" dirty="0"/>
           </a:p>
@@ -4541,7 +5411,7 @@
           <a:p>
             <a:fld id="{D1BE4249-C0D0-4B06-8692-E8BB871AF643}" type="datetimeFigureOut">
               <a:rPr lang="en-US" dirty="0"/>
-              <a:t>7/10/2024</a:t>
+              <a:t>7/11/24</a:t>
             </a:fld>
             <a:endParaRPr lang="en-US" dirty="0"/>
           </a:p>
@@ -4598,7 +5468,7 @@
           <a:p>
             <a:fld id="{8A7A6979-0714-4377-B894-6BE4C2D6E202}" type="slidenum">
               <a:rPr lang="en-US" dirty="0"/>
-              <a:t>‹#›</a:t>
+              <a:t>‹N›</a:t>
             </a:fld>
             <a:endParaRPr lang="en-US" dirty="0"/>
           </a:p>
@@ -4893,7 +5763,7 @@
           <a:p>
             <a:fld id="{042B0DB6-F5C7-45FB-8CF3-31B45F9C2DAC}" type="datetimeFigureOut">
               <a:rPr lang="en-US" dirty="0"/>
-              <a:t>7/10/2024</a:t>
+              <a:t>7/11/24</a:t>
             </a:fld>
             <a:endParaRPr lang="en-US" dirty="0"/>
           </a:p>
@@ -4950,7 +5820,7 @@
           <a:p>
             <a:fld id="{8A7A6979-0714-4377-B894-6BE4C2D6E202}" type="slidenum">
               <a:rPr lang="en-US" dirty="0"/>
-              <a:t>‹#›</a:t>
+              <a:t>‹N›</a:t>
             </a:fld>
             <a:endParaRPr lang="en-US" dirty="0"/>
           </a:p>
@@ -5130,7 +6000,7 @@
           <a:p>
             <a:fld id="{1160EA64-D806-43AC-9DF2-F8C432F32B4C}" type="datetimeFigureOut">
               <a:rPr lang="en-US" dirty="0"/>
-              <a:t>7/10/2024</a:t>
+              <a:t>7/11/24</a:t>
             </a:fld>
             <a:endParaRPr lang="en-US" dirty="0"/>
           </a:p>
@@ -5214,7 +6084,7 @@
             <a:fld id="{8A7A6979-0714-4377-B894-6BE4C2D6E202}" type="slidenum">
               <a:rPr lang="en-US" dirty="0"/>
               <a:pPr/>
-              <a:t>‹#›</a:t>
+              <a:t>‹N›</a:t>
             </a:fld>
             <a:endParaRPr lang="en-US" dirty="0"/>
           </a:p>
@@ -7212,6 +8082,552 @@
 </p:sld>
 </file>
 
+<file path=ppt/slides/slide18.xml><?xml version="1.0" encoding="utf-8"?>
+<p:sld xmlns:a="http://schemas.openxmlformats.org/drawingml/2006/main" xmlns:r="http://schemas.openxmlformats.org/officeDocument/2006/relationships" xmlns:p="http://schemas.openxmlformats.org/presentationml/2006/main">
+  <p:cSld>
+    <p:spTree>
+      <p:nvGrpSpPr>
+        <p:cNvPr id="1" name=""/>
+        <p:cNvGrpSpPr/>
+        <p:nvPr/>
+      </p:nvGrpSpPr>
+      <p:grpSpPr>
+        <a:xfrm>
+          <a:off x="0" y="0"/>
+          <a:ext cx="0" cy="0"/>
+          <a:chOff x="0" y="0"/>
+          <a:chExt cx="0" cy="0"/>
+        </a:xfrm>
+      </p:grpSpPr>
+      <p:sp>
+        <p:nvSpPr>
+          <p:cNvPr id="2" name="Titolo 1">
+            <a:extLst>
+              <a:ext uri="{FF2B5EF4-FFF2-40B4-BE49-F238E27FC236}">
+                <a16:creationId xmlns:a16="http://schemas.microsoft.com/office/drawing/2014/main" id="{3D70F780-9E2F-64BB-5AAC-2FA2D1417F89}"/>
+              </a:ext>
+            </a:extLst>
+          </p:cNvPr>
+          <p:cNvSpPr>
+            <a:spLocks noGrp="1"/>
+          </p:cNvSpPr>
+          <p:nvPr>
+            <p:ph type="title"/>
+          </p:nvPr>
+        </p:nvSpPr>
+        <p:spPr>
+          <a:xfrm>
+            <a:off x="2198696" y="289778"/>
+            <a:ext cx="7794607" cy="722594"/>
+          </a:xfrm>
+          <a:solidFill>
+            <a:schemeClr val="accent2">
+              <a:lumMod val="20000"/>
+              <a:lumOff val="80000"/>
+            </a:schemeClr>
+          </a:solidFill>
+        </p:spPr>
+        <p:txBody>
+          <a:bodyPr>
+            <a:normAutofit fontScale="90000"/>
+          </a:bodyPr>
+          <a:lstStyle/>
+          <a:p>
+            <a:r>
+              <a:rPr lang="it-IT" b="1" dirty="0" err="1">
+                <a:latin typeface="ACADEMY ENGRAVED LET PLAIN:1.0" panose="02000000000000000000" pitchFamily="2" charset="0"/>
+              </a:rPr>
+              <a:t>Requirement</a:t>
+            </a:r>
+            <a:r>
+              <a:rPr lang="it-IT" b="1" dirty="0">
+                <a:latin typeface="ACADEMY ENGRAVED LET PLAIN:1.0" panose="02000000000000000000" pitchFamily="2" charset="0"/>
+              </a:rPr>
+              <a:t> 4</a:t>
+            </a:r>
+          </a:p>
+        </p:txBody>
+      </p:sp>
+      <p:sp>
+        <p:nvSpPr>
+          <p:cNvPr id="5" name="CasellaDiTesto 4">
+            <a:extLst>
+              <a:ext uri="{FF2B5EF4-FFF2-40B4-BE49-F238E27FC236}">
+                <a16:creationId xmlns:a16="http://schemas.microsoft.com/office/drawing/2014/main" id="{F7D2F5BA-FFC2-17F7-6F69-6204E29093A9}"/>
+              </a:ext>
+            </a:extLst>
+          </p:cNvPr>
+          <p:cNvSpPr txBox="1"/>
+          <p:nvPr/>
+        </p:nvSpPr>
+        <p:spPr>
+          <a:xfrm>
+            <a:off x="744372" y="1827944"/>
+            <a:ext cx="6912022" cy="338554"/>
+          </a:xfrm>
+          <a:prstGeom prst="rect">
+            <a:avLst/>
+          </a:prstGeom>
+          <a:noFill/>
+        </p:spPr>
+        <p:txBody>
+          <a:bodyPr wrap="square" rtlCol="0">
+            <a:spAutoFit/>
+          </a:bodyPr>
+          <a:lstStyle/>
+          <a:p>
+            <a:r>
+              <a:rPr lang="it-IT" sz="1600" b="1" dirty="0"/>
+              <a:t>BIDDING ENVIRONMENT</a:t>
+            </a:r>
+            <a:r>
+              <a:rPr lang="it-IT" sz="1600" dirty="0"/>
+              <a:t>:   </a:t>
+            </a:r>
+            <a:r>
+              <a:rPr lang="it-IT" sz="1600" dirty="0" err="1"/>
+              <a:t>Adversarial</a:t>
+            </a:r>
+            <a:r>
+              <a:rPr lang="it-IT" sz="1600" dirty="0"/>
+              <a:t> with full feedback</a:t>
+            </a:r>
+          </a:p>
+        </p:txBody>
+      </p:sp>
+      <p:sp>
+        <p:nvSpPr>
+          <p:cNvPr id="7" name="CasellaDiTesto 6">
+            <a:extLst>
+              <a:ext uri="{FF2B5EF4-FFF2-40B4-BE49-F238E27FC236}">
+                <a16:creationId xmlns:a16="http://schemas.microsoft.com/office/drawing/2014/main" id="{BEED63D0-9236-E549-FDD7-3FE0CAD29CED}"/>
+              </a:ext>
+            </a:extLst>
+          </p:cNvPr>
+          <p:cNvSpPr txBox="1"/>
+          <p:nvPr/>
+        </p:nvSpPr>
+        <p:spPr>
+          <a:xfrm>
+            <a:off x="744372" y="2736972"/>
+            <a:ext cx="8755382" cy="338554"/>
+          </a:xfrm>
+          <a:prstGeom prst="rect">
+            <a:avLst/>
+          </a:prstGeom>
+          <a:noFill/>
+        </p:spPr>
+        <p:txBody>
+          <a:bodyPr wrap="square" rtlCol="0">
+            <a:spAutoFit/>
+          </a:bodyPr>
+          <a:lstStyle/>
+          <a:p>
+            <a:r>
+              <a:rPr lang="it-IT" sz="1600" b="1" dirty="0"/>
+              <a:t>AUCTION TYPE:  			 </a:t>
+            </a:r>
+            <a:r>
+              <a:rPr lang="it-IT" sz="1600" dirty="0" err="1"/>
+              <a:t>Generalized</a:t>
+            </a:r>
+            <a:r>
+              <a:rPr lang="it-IT" sz="1600" dirty="0"/>
+              <a:t> first-price auction (Non-</a:t>
+            </a:r>
+            <a:r>
+              <a:rPr lang="it-IT" sz="1600" dirty="0" err="1"/>
+              <a:t>truthful</a:t>
+            </a:r>
+            <a:r>
+              <a:rPr lang="it-IT" sz="1600" dirty="0"/>
+              <a:t>) </a:t>
+            </a:r>
+          </a:p>
+        </p:txBody>
+      </p:sp>
+      <p:sp>
+        <p:nvSpPr>
+          <p:cNvPr id="8" name="CasellaDiTesto 7">
+            <a:extLst>
+              <a:ext uri="{FF2B5EF4-FFF2-40B4-BE49-F238E27FC236}">
+                <a16:creationId xmlns:a16="http://schemas.microsoft.com/office/drawing/2014/main" id="{B97958CC-73B7-0605-8E06-4EDA55308BAD}"/>
+              </a:ext>
+            </a:extLst>
+          </p:cNvPr>
+          <p:cNvSpPr txBox="1"/>
+          <p:nvPr/>
+        </p:nvSpPr>
+        <p:spPr>
+          <a:xfrm>
+            <a:off x="744372" y="3691080"/>
+            <a:ext cx="1968816" cy="584775"/>
+          </a:xfrm>
+          <a:prstGeom prst="rect">
+            <a:avLst/>
+          </a:prstGeom>
+          <a:noFill/>
+        </p:spPr>
+        <p:txBody>
+          <a:bodyPr wrap="square" rtlCol="0">
+            <a:spAutoFit/>
+          </a:bodyPr>
+          <a:lstStyle/>
+          <a:p>
+            <a:r>
+              <a:rPr lang="it-IT" sz="1600" b="1" dirty="0"/>
+              <a:t>BIDDING AGENTS: </a:t>
+            </a:r>
+            <a:endParaRPr lang="it-IT" sz="1600" dirty="0"/>
+          </a:p>
+        </p:txBody>
+      </p:sp>
+      <p:sp>
+        <p:nvSpPr>
+          <p:cNvPr id="9" name="CasellaDiTesto 8">
+            <a:extLst>
+              <a:ext uri="{FF2B5EF4-FFF2-40B4-BE49-F238E27FC236}">
+                <a16:creationId xmlns:a16="http://schemas.microsoft.com/office/drawing/2014/main" id="{7D841207-3D09-10BB-351E-08D3E10F83E3}"/>
+              </a:ext>
+            </a:extLst>
+          </p:cNvPr>
+          <p:cNvSpPr txBox="1"/>
+          <p:nvPr/>
+        </p:nvSpPr>
+        <p:spPr>
+          <a:xfrm>
+            <a:off x="3583383" y="3691080"/>
+            <a:ext cx="6254866" cy="830997"/>
+          </a:xfrm>
+          <a:prstGeom prst="rect">
+            <a:avLst/>
+          </a:prstGeom>
+          <a:noFill/>
+        </p:spPr>
+        <p:txBody>
+          <a:bodyPr wrap="square" rtlCol="0">
+            <a:spAutoFit/>
+          </a:bodyPr>
+          <a:lstStyle/>
+          <a:p>
+            <a:pPr marL="285750" indent="-285750">
+              <a:buFont typeface="Arial" panose="020B0604020202020204" pitchFamily="34" charset="0"/>
+              <a:buChar char="•"/>
+            </a:pPr>
+            <a:r>
+              <a:rPr lang="it-IT" sz="1600" dirty="0" err="1"/>
+              <a:t>Primal</a:t>
+            </a:r>
+            <a:r>
+              <a:rPr lang="it-IT" sz="1600" dirty="0"/>
+              <a:t>-dual for </a:t>
+            </a:r>
+            <a:r>
+              <a:rPr lang="it-IT" sz="1600" dirty="0" err="1"/>
+              <a:t>truthful</a:t>
+            </a:r>
+            <a:r>
+              <a:rPr lang="it-IT" sz="1600" dirty="0"/>
+              <a:t> (</a:t>
+            </a:r>
+            <a:r>
+              <a:rPr lang="it-IT" sz="1600" dirty="0" err="1"/>
+              <a:t>Multiplicative</a:t>
+            </a:r>
+            <a:r>
+              <a:rPr lang="it-IT" sz="1600" dirty="0"/>
+              <a:t> </a:t>
+            </a:r>
+            <a:r>
+              <a:rPr lang="it-IT" sz="1600" dirty="0" err="1"/>
+              <a:t>Pacing</a:t>
+            </a:r>
+            <a:r>
+              <a:rPr lang="it-IT" sz="1600" dirty="0"/>
+              <a:t>)</a:t>
+            </a:r>
+          </a:p>
+          <a:p>
+            <a:pPr marL="285750" indent="-285750">
+              <a:buFont typeface="Arial" panose="020B0604020202020204" pitchFamily="34" charset="0"/>
+              <a:buChar char="•"/>
+            </a:pPr>
+            <a:r>
+              <a:rPr lang="it-IT" sz="1600" dirty="0" err="1"/>
+              <a:t>Primal</a:t>
+            </a:r>
+            <a:r>
+              <a:rPr lang="it-IT" sz="1600" dirty="0"/>
+              <a:t>-dual for non-</a:t>
+            </a:r>
+            <a:r>
+              <a:rPr lang="it-IT" sz="1600" dirty="0" err="1"/>
+              <a:t>truthful</a:t>
+            </a:r>
+            <a:r>
+              <a:rPr lang="it-IT" sz="1600" dirty="0"/>
+              <a:t> (</a:t>
+            </a:r>
+            <a:r>
+              <a:rPr lang="it-IT" sz="1600" dirty="0" err="1"/>
+              <a:t>Multiplicative</a:t>
+            </a:r>
+            <a:r>
+              <a:rPr lang="it-IT" sz="1600" dirty="0"/>
+              <a:t> </a:t>
+            </a:r>
+            <a:r>
+              <a:rPr lang="it-IT" sz="1600" dirty="0" err="1"/>
+              <a:t>Pacing</a:t>
+            </a:r>
+            <a:r>
+              <a:rPr lang="it-IT" sz="1600" dirty="0"/>
+              <a:t> with Hedge) </a:t>
+            </a:r>
+          </a:p>
+          <a:p>
+            <a:pPr marL="285750" indent="-285750">
+              <a:buFont typeface="Arial" panose="020B0604020202020204" pitchFamily="34" charset="0"/>
+              <a:buChar char="•"/>
+            </a:pPr>
+            <a:r>
+              <a:rPr lang="it-IT" sz="1600" dirty="0"/>
+              <a:t>UCB-like (UCB1)</a:t>
+            </a:r>
+          </a:p>
+        </p:txBody>
+      </p:sp>
+      <p:sp>
+        <p:nvSpPr>
+          <p:cNvPr id="12" name="CasellaDiTesto 11">
+            <a:extLst>
+              <a:ext uri="{FF2B5EF4-FFF2-40B4-BE49-F238E27FC236}">
+                <a16:creationId xmlns:a16="http://schemas.microsoft.com/office/drawing/2014/main" id="{7DEF7384-3F66-057E-FF3E-67219C794BA9}"/>
+              </a:ext>
+            </a:extLst>
+          </p:cNvPr>
+          <p:cNvSpPr txBox="1"/>
+          <p:nvPr/>
+        </p:nvSpPr>
+        <p:spPr>
+          <a:xfrm>
+            <a:off x="744372" y="5137631"/>
+            <a:ext cx="9764404" cy="338554"/>
+          </a:xfrm>
+          <a:prstGeom prst="rect">
+            <a:avLst/>
+          </a:prstGeom>
+          <a:noFill/>
+        </p:spPr>
+        <p:txBody>
+          <a:bodyPr wrap="square" rtlCol="0">
+            <a:spAutoFit/>
+          </a:bodyPr>
+          <a:lstStyle/>
+          <a:p>
+            <a:r>
+              <a:rPr lang="it-IT" sz="1600" b="1" dirty="0"/>
+              <a:t>GOAL:  			                  </a:t>
+            </a:r>
+            <a:r>
+              <a:rPr lang="it-IT" sz="1600" dirty="0"/>
+              <a:t>Compare the performances of </a:t>
+            </a:r>
+            <a:r>
+              <a:rPr lang="it-IT" sz="1600" dirty="0" err="1"/>
+              <a:t>different</a:t>
+            </a:r>
+            <a:r>
+              <a:rPr lang="it-IT" sz="1600" dirty="0"/>
+              <a:t> </a:t>
+            </a:r>
+            <a:r>
+              <a:rPr lang="it-IT" sz="1600" dirty="0" err="1"/>
+              <a:t>algorithms</a:t>
+            </a:r>
+            <a:r>
+              <a:rPr lang="it-IT" sz="1600" dirty="0"/>
+              <a:t> under </a:t>
+            </a:r>
+            <a:r>
+              <a:rPr lang="it-IT" sz="1600" dirty="0" err="1"/>
+              <a:t>various</a:t>
+            </a:r>
+            <a:r>
+              <a:rPr lang="it-IT" sz="1600" dirty="0"/>
+              <a:t> setups</a:t>
+            </a:r>
+          </a:p>
+        </p:txBody>
+      </p:sp>
+    </p:spTree>
+    <p:extLst>
+      <p:ext uri="{BB962C8B-B14F-4D97-AF65-F5344CB8AC3E}">
+        <p14:creationId xmlns:p14="http://schemas.microsoft.com/office/powerpoint/2010/main" val="3300155819"/>
+      </p:ext>
+    </p:extLst>
+  </p:cSld>
+  <p:clrMapOvr>
+    <a:masterClrMapping/>
+  </p:clrMapOvr>
+</p:sld>
+</file>
+
+<file path=ppt/slides/slide19.xml><?xml version="1.0" encoding="utf-8"?>
+<p:sld xmlns:a="http://schemas.openxmlformats.org/drawingml/2006/main" xmlns:r="http://schemas.openxmlformats.org/officeDocument/2006/relationships" xmlns:p="http://schemas.openxmlformats.org/presentationml/2006/main">
+  <p:cSld>
+    <p:spTree>
+      <p:nvGrpSpPr>
+        <p:cNvPr id="1" name=""/>
+        <p:cNvGrpSpPr/>
+        <p:nvPr/>
+      </p:nvGrpSpPr>
+      <p:grpSpPr>
+        <a:xfrm>
+          <a:off x="0" y="0"/>
+          <a:ext cx="0" cy="0"/>
+          <a:chOff x="0" y="0"/>
+          <a:chExt cx="0" cy="0"/>
+        </a:xfrm>
+      </p:grpSpPr>
+      <p:sp>
+        <p:nvSpPr>
+          <p:cNvPr id="2" name="Titolo 1">
+            <a:extLst>
+              <a:ext uri="{FF2B5EF4-FFF2-40B4-BE49-F238E27FC236}">
+                <a16:creationId xmlns:a16="http://schemas.microsoft.com/office/drawing/2014/main" id="{3D70F780-9E2F-64BB-5AAC-2FA2D1417F89}"/>
+              </a:ext>
+            </a:extLst>
+          </p:cNvPr>
+          <p:cNvSpPr>
+            <a:spLocks noGrp="1"/>
+          </p:cNvSpPr>
+          <p:nvPr>
+            <p:ph type="title"/>
+          </p:nvPr>
+        </p:nvSpPr>
+        <p:spPr>
+          <a:xfrm>
+            <a:off x="2198696" y="289778"/>
+            <a:ext cx="7794607" cy="722594"/>
+          </a:xfrm>
+          <a:solidFill>
+            <a:schemeClr val="accent2">
+              <a:lumMod val="20000"/>
+              <a:lumOff val="80000"/>
+            </a:schemeClr>
+          </a:solidFill>
+        </p:spPr>
+        <p:txBody>
+          <a:bodyPr>
+            <a:normAutofit fontScale="90000"/>
+          </a:bodyPr>
+          <a:lstStyle/>
+          <a:p>
+            <a:r>
+              <a:rPr lang="it-IT" b="1" dirty="0">
+                <a:latin typeface="ACADEMY ENGRAVED LET PLAIN:1.0" panose="02000000000000000000" pitchFamily="2" charset="0"/>
+              </a:rPr>
+              <a:t>SIMPLE CASE</a:t>
+            </a:r>
+          </a:p>
+        </p:txBody>
+      </p:sp>
+      <p:sp>
+        <p:nvSpPr>
+          <p:cNvPr id="3" name="CasellaDiTesto 2">
+            <a:extLst>
+              <a:ext uri="{FF2B5EF4-FFF2-40B4-BE49-F238E27FC236}">
+                <a16:creationId xmlns:a16="http://schemas.microsoft.com/office/drawing/2014/main" id="{EA4F199A-B874-EBCB-40CC-98A2A2031258}"/>
+              </a:ext>
+            </a:extLst>
+          </p:cNvPr>
+          <p:cNvSpPr txBox="1"/>
+          <p:nvPr/>
+        </p:nvSpPr>
+        <p:spPr>
+          <a:xfrm>
+            <a:off x="709056" y="1582284"/>
+            <a:ext cx="6912022" cy="1077218"/>
+          </a:xfrm>
+          <a:prstGeom prst="rect">
+            <a:avLst/>
+          </a:prstGeom>
+          <a:noFill/>
+        </p:spPr>
+        <p:txBody>
+          <a:bodyPr wrap="square" rtlCol="0">
+            <a:spAutoFit/>
+          </a:bodyPr>
+          <a:lstStyle/>
+          <a:p>
+            <a:r>
+              <a:rPr lang="it-IT" sz="1600" b="1" dirty="0"/>
+              <a:t>SETUP</a:t>
+            </a:r>
+            <a:r>
+              <a:rPr lang="it-IT" sz="1600" dirty="0"/>
+              <a:t>:   </a:t>
+            </a:r>
+          </a:p>
+          <a:p>
+            <a:pPr marL="285750" indent="-285750">
+              <a:buFont typeface="Arial" panose="020B0604020202020204" pitchFamily="34" charset="0"/>
+              <a:buChar char="•"/>
+            </a:pPr>
+            <a:r>
+              <a:rPr lang="it-IT" sz="1600" dirty="0"/>
+              <a:t>Single </a:t>
+            </a:r>
+            <a:r>
+              <a:rPr lang="it-IT" sz="1600" dirty="0" err="1"/>
+              <a:t>bidder</a:t>
+            </a:r>
+            <a:r>
+              <a:rPr lang="it-IT" sz="1600" dirty="0"/>
+              <a:t> per </a:t>
+            </a:r>
+            <a:r>
+              <a:rPr lang="it-IT" sz="1600" dirty="0" err="1"/>
+              <a:t>type</a:t>
+            </a:r>
+            <a:endParaRPr lang="it-IT" sz="1600" dirty="0"/>
+          </a:p>
+          <a:p>
+            <a:pPr marL="285750" indent="-285750">
+              <a:buFont typeface="Arial" panose="020B0604020202020204" pitchFamily="34" charset="0"/>
+              <a:buChar char="•"/>
+            </a:pPr>
+            <a:r>
+              <a:rPr lang="it-IT" sz="1600" dirty="0"/>
+              <a:t>Single slot</a:t>
+            </a:r>
+          </a:p>
+          <a:p>
+            <a:pPr marL="285750" indent="-285750">
+              <a:buFont typeface="Arial" panose="020B0604020202020204" pitchFamily="34" charset="0"/>
+              <a:buChar char="•"/>
+            </a:pPr>
+            <a:r>
+              <a:rPr lang="it-IT" sz="1600" dirty="0"/>
+              <a:t>Budget:     B = 400</a:t>
+            </a:r>
+          </a:p>
+        </p:txBody>
+      </p:sp>
+    </p:spTree>
+    <p:extLst>
+      <p:ext uri="{BB962C8B-B14F-4D97-AF65-F5344CB8AC3E}">
+        <p14:creationId xmlns:p14="http://schemas.microsoft.com/office/powerpoint/2010/main" val="2753551281"/>
+      </p:ext>
+    </p:extLst>
+  </p:cSld>
+  <p:clrMapOvr>
+    <a:masterClrMapping/>
+  </p:clrMapOvr>
+</p:sld>
+</file>
+
 <file path=ppt/slides/slide2.xml><?xml version="1.0" encoding="utf-8"?>
 <p:sld xmlns:a="http://schemas.openxmlformats.org/drawingml/2006/main" xmlns:r="http://schemas.openxmlformats.org/officeDocument/2006/relationships" xmlns:p="http://schemas.openxmlformats.org/presentationml/2006/main">
   <p:cSld>
@@ -7242,740 +8658,24 @@
       </p:grpSpPr>
       <p:sp>
         <p:nvSpPr>
-          <p:cNvPr id="6" name="Rettangolo 5">
+          <p:cNvPr id="2" name="Titolo 1">
             <a:extLst>
               <a:ext uri="{FF2B5EF4-FFF2-40B4-BE49-F238E27FC236}">
-                <a16:creationId xmlns:a16="http://schemas.microsoft.com/office/drawing/2014/main" id="{AA219B29-59DF-DB9A-72BA-9CF3DA4BE034}"/>
+                <a16:creationId xmlns:a16="http://schemas.microsoft.com/office/drawing/2014/main" id="{3D70F780-9E2F-64BB-5AAC-2FA2D1417F89}"/>
               </a:ext>
             </a:extLst>
           </p:cNvPr>
-          <p:cNvSpPr/>
-          <p:nvPr/>
+          <p:cNvSpPr>
+            <a:spLocks noGrp="1"/>
+          </p:cNvSpPr>
+          <p:nvPr>
+            <p:ph type="title"/>
+          </p:nvPr>
         </p:nvSpPr>
         <p:spPr>
           <a:xfrm>
-            <a:off x="2285998" y="1807027"/>
-            <a:ext cx="2318659" cy="1415145"/>
-          </a:xfrm>
-          <a:prstGeom prst="rect">
-            <a:avLst/>
-          </a:prstGeom>
-          <a:solidFill>
-            <a:schemeClr val="accent2">
-              <a:lumMod val="60000"/>
-              <a:lumOff val="40000"/>
-            </a:schemeClr>
-          </a:solidFill>
-        </p:spPr>
-        <p:style>
-          <a:lnRef idx="2">
-            <a:schemeClr val="accent1">
-              <a:shade val="15000"/>
-            </a:schemeClr>
-          </a:lnRef>
-          <a:fillRef idx="1">
-            <a:schemeClr val="accent1"/>
-          </a:fillRef>
-          <a:effectRef idx="0">
-            <a:schemeClr val="accent1"/>
-          </a:effectRef>
-          <a:fontRef idx="minor">
-            <a:schemeClr val="lt1"/>
-          </a:fontRef>
-        </p:style>
-        <p:txBody>
-          <a:bodyPr rtlCol="0" anchor="ctr"/>
-          <a:lstStyle/>
-          <a:p>
-            <a:pPr algn="ctr"/>
-            <a:endParaRPr lang="it-IT" dirty="0"/>
-          </a:p>
-        </p:txBody>
-      </p:sp>
-      <p:sp>
-        <p:nvSpPr>
-          <p:cNvPr id="7" name="Rettangolo 6">
-            <a:extLst>
-              <a:ext uri="{FF2B5EF4-FFF2-40B4-BE49-F238E27FC236}">
-                <a16:creationId xmlns:a16="http://schemas.microsoft.com/office/drawing/2014/main" id="{4BE1844D-47F4-168C-95DA-3A5815B5ED14}"/>
-              </a:ext>
-            </a:extLst>
-          </p:cNvPr>
-          <p:cNvSpPr/>
-          <p:nvPr/>
-        </p:nvSpPr>
-        <p:spPr>
-          <a:xfrm>
-            <a:off x="5350155" y="4375630"/>
-            <a:ext cx="2188026" cy="1533491"/>
-          </a:xfrm>
-          <a:prstGeom prst="rect">
-            <a:avLst/>
-          </a:prstGeom>
-          <a:solidFill>
-            <a:schemeClr val="accent2">
-              <a:lumMod val="60000"/>
-              <a:lumOff val="40000"/>
-            </a:schemeClr>
-          </a:solidFill>
-        </p:spPr>
-        <p:style>
-          <a:lnRef idx="2">
-            <a:schemeClr val="accent1">
-              <a:shade val="15000"/>
-            </a:schemeClr>
-          </a:lnRef>
-          <a:fillRef idx="1">
-            <a:schemeClr val="accent1"/>
-          </a:fillRef>
-          <a:effectRef idx="0">
-            <a:schemeClr val="accent1"/>
-          </a:effectRef>
-          <a:fontRef idx="minor">
-            <a:schemeClr val="lt1"/>
-          </a:fontRef>
-        </p:style>
-        <p:txBody>
-          <a:bodyPr rtlCol="0" anchor="ctr"/>
-          <a:lstStyle/>
-          <a:p>
-            <a:pPr algn="ctr"/>
-            <a:endParaRPr lang="it-IT" dirty="0"/>
-          </a:p>
-        </p:txBody>
-      </p:sp>
-      <p:sp>
-        <p:nvSpPr>
-          <p:cNvPr id="8" name="Rettangolo 7">
-            <a:extLst>
-              <a:ext uri="{FF2B5EF4-FFF2-40B4-BE49-F238E27FC236}">
-                <a16:creationId xmlns:a16="http://schemas.microsoft.com/office/drawing/2014/main" id="{4ACFB1BB-D48E-AD9D-7EBA-FB1CCCC7D8C4}"/>
-              </a:ext>
-            </a:extLst>
-          </p:cNvPr>
-          <p:cNvSpPr/>
-          <p:nvPr/>
-        </p:nvSpPr>
-        <p:spPr>
-          <a:xfrm>
-            <a:off x="2416629" y="2416628"/>
-            <a:ext cx="881743" cy="511629"/>
-          </a:xfrm>
-          <a:prstGeom prst="rect">
-            <a:avLst/>
-          </a:prstGeom>
-          <a:solidFill>
-            <a:schemeClr val="accent2">
-              <a:lumMod val="40000"/>
-              <a:lumOff val="60000"/>
-            </a:schemeClr>
-          </a:solidFill>
-          <a:ln>
-            <a:noFill/>
-          </a:ln>
-        </p:spPr>
-        <p:style>
-          <a:lnRef idx="2">
-            <a:schemeClr val="accent1">
-              <a:shade val="15000"/>
-            </a:schemeClr>
-          </a:lnRef>
-          <a:fillRef idx="1">
-            <a:schemeClr val="accent1"/>
-          </a:fillRef>
-          <a:effectRef idx="0">
-            <a:schemeClr val="accent1"/>
-          </a:effectRef>
-          <a:fontRef idx="minor">
-            <a:schemeClr val="lt1"/>
-          </a:fontRef>
-        </p:style>
-        <p:txBody>
-          <a:bodyPr rtlCol="0" anchor="ctr"/>
-          <a:lstStyle/>
-          <a:p>
-            <a:pPr algn="ctr"/>
-            <a:r>
-              <a:rPr lang="it-IT" i="1" dirty="0">
-                <a:solidFill>
-                  <a:schemeClr val="tx1"/>
-                </a:solidFill>
-              </a:rPr>
-              <a:t>pricing</a:t>
-            </a:r>
-          </a:p>
-          <a:p>
-            <a:pPr algn="ctr"/>
-            <a:r>
-              <a:rPr lang="it-IT" i="1" dirty="0">
-                <a:solidFill>
-                  <a:schemeClr val="tx1"/>
-                </a:solidFill>
-              </a:rPr>
-              <a:t>agent</a:t>
-            </a:r>
-          </a:p>
-        </p:txBody>
-      </p:sp>
-      <p:sp>
-        <p:nvSpPr>
-          <p:cNvPr id="9" name="Rettangolo 8">
-            <a:extLst>
-              <a:ext uri="{FF2B5EF4-FFF2-40B4-BE49-F238E27FC236}">
-                <a16:creationId xmlns:a16="http://schemas.microsoft.com/office/drawing/2014/main" id="{F2E65424-F607-A670-1172-B9A08B899FC1}"/>
-              </a:ext>
-            </a:extLst>
-          </p:cNvPr>
-          <p:cNvSpPr/>
-          <p:nvPr/>
-        </p:nvSpPr>
-        <p:spPr>
-          <a:xfrm>
-            <a:off x="3526971" y="2416627"/>
-            <a:ext cx="881743" cy="511629"/>
-          </a:xfrm>
-          <a:prstGeom prst="rect">
-            <a:avLst/>
-          </a:prstGeom>
-          <a:solidFill>
-            <a:schemeClr val="accent2">
-              <a:lumMod val="40000"/>
-              <a:lumOff val="60000"/>
-            </a:schemeClr>
-          </a:solidFill>
-          <a:ln>
-            <a:noFill/>
-          </a:ln>
-        </p:spPr>
-        <p:style>
-          <a:lnRef idx="2">
-            <a:schemeClr val="accent1">
-              <a:shade val="15000"/>
-            </a:schemeClr>
-          </a:lnRef>
-          <a:fillRef idx="1">
-            <a:schemeClr val="accent1"/>
-          </a:fillRef>
-          <a:effectRef idx="0">
-            <a:schemeClr val="accent1"/>
-          </a:effectRef>
-          <a:fontRef idx="minor">
-            <a:schemeClr val="lt1"/>
-          </a:fontRef>
-        </p:style>
-        <p:txBody>
-          <a:bodyPr rtlCol="0" anchor="ctr"/>
-          <a:lstStyle/>
-          <a:p>
-            <a:pPr algn="ctr"/>
-            <a:r>
-              <a:rPr lang="it-IT" i="1" dirty="0">
-                <a:solidFill>
-                  <a:schemeClr val="tx1"/>
-                </a:solidFill>
-              </a:rPr>
-              <a:t>bidding agent</a:t>
-            </a:r>
-          </a:p>
-        </p:txBody>
-      </p:sp>
-      <p:sp>
-        <p:nvSpPr>
-          <p:cNvPr id="10" name="Rettangolo 9">
-            <a:extLst>
-              <a:ext uri="{FF2B5EF4-FFF2-40B4-BE49-F238E27FC236}">
-                <a16:creationId xmlns:a16="http://schemas.microsoft.com/office/drawing/2014/main" id="{455591E2-B2F3-F946-5B1C-46770BF9CCFA}"/>
-              </a:ext>
-            </a:extLst>
-          </p:cNvPr>
-          <p:cNvSpPr/>
-          <p:nvPr/>
-        </p:nvSpPr>
-        <p:spPr>
-          <a:xfrm>
-            <a:off x="2416629" y="1926772"/>
-            <a:ext cx="2100942" cy="250371"/>
-          </a:xfrm>
-          <a:prstGeom prst="rect">
-            <a:avLst/>
-          </a:prstGeom>
-          <a:solidFill>
-            <a:schemeClr val="accent2">
-              <a:lumMod val="60000"/>
-              <a:lumOff val="40000"/>
-            </a:schemeClr>
-          </a:solidFill>
-          <a:ln>
-            <a:noFill/>
-          </a:ln>
-        </p:spPr>
-        <p:style>
-          <a:lnRef idx="2">
-            <a:schemeClr val="accent1">
-              <a:shade val="15000"/>
-            </a:schemeClr>
-          </a:lnRef>
-          <a:fillRef idx="1">
-            <a:schemeClr val="accent1"/>
-          </a:fillRef>
-          <a:effectRef idx="0">
-            <a:schemeClr val="accent1"/>
-          </a:effectRef>
-          <a:fontRef idx="minor">
-            <a:schemeClr val="lt1"/>
-          </a:fontRef>
-        </p:style>
-        <p:txBody>
-          <a:bodyPr rtlCol="0" anchor="ctr"/>
-          <a:lstStyle/>
-          <a:p>
-            <a:pPr algn="ctr"/>
-            <a:r>
-              <a:rPr lang="it-IT" dirty="0">
-                <a:solidFill>
-                  <a:schemeClr val="tx1"/>
-                </a:solidFill>
-              </a:rPr>
-              <a:t>COMPANY</a:t>
-            </a:r>
-          </a:p>
-        </p:txBody>
-      </p:sp>
-      <p:sp>
-        <p:nvSpPr>
-          <p:cNvPr id="17" name="Rettangolo 16">
-            <a:extLst>
-              <a:ext uri="{FF2B5EF4-FFF2-40B4-BE49-F238E27FC236}">
-                <a16:creationId xmlns:a16="http://schemas.microsoft.com/office/drawing/2014/main" id="{8D6E882F-4628-EBA7-826D-2CD48792C435}"/>
-              </a:ext>
-            </a:extLst>
-          </p:cNvPr>
-          <p:cNvSpPr/>
-          <p:nvPr/>
-        </p:nvSpPr>
-        <p:spPr>
-          <a:xfrm>
-            <a:off x="5633183" y="4599236"/>
-            <a:ext cx="1621971" cy="333995"/>
-          </a:xfrm>
-          <a:prstGeom prst="rect">
-            <a:avLst/>
-          </a:prstGeom>
-          <a:solidFill>
-            <a:schemeClr val="accent2">
-              <a:lumMod val="60000"/>
-              <a:lumOff val="40000"/>
-            </a:schemeClr>
-          </a:solidFill>
-          <a:ln>
-            <a:noFill/>
-          </a:ln>
-        </p:spPr>
-        <p:style>
-          <a:lnRef idx="2">
-            <a:schemeClr val="accent1">
-              <a:shade val="15000"/>
-            </a:schemeClr>
-          </a:lnRef>
-          <a:fillRef idx="1">
-            <a:schemeClr val="accent1"/>
-          </a:fillRef>
-          <a:effectRef idx="0">
-            <a:schemeClr val="accent1"/>
-          </a:effectRef>
-          <a:fontRef idx="minor">
-            <a:schemeClr val="lt1"/>
-          </a:fontRef>
-        </p:style>
-        <p:txBody>
-          <a:bodyPr rtlCol="0" anchor="ctr"/>
-          <a:lstStyle/>
-          <a:p>
-            <a:pPr algn="ctr"/>
-            <a:r>
-              <a:rPr lang="it-IT" dirty="0">
-                <a:solidFill>
-                  <a:schemeClr val="tx1"/>
-                </a:solidFill>
-              </a:rPr>
-              <a:t>PUBLISHER</a:t>
-            </a:r>
-          </a:p>
-        </p:txBody>
-      </p:sp>
-      <p:sp>
-        <p:nvSpPr>
-          <p:cNvPr id="18" name="Rettangolo 17">
-            <a:extLst>
-              <a:ext uri="{FF2B5EF4-FFF2-40B4-BE49-F238E27FC236}">
-                <a16:creationId xmlns:a16="http://schemas.microsoft.com/office/drawing/2014/main" id="{E03FB275-C57F-17F3-E835-D21432989A78}"/>
-              </a:ext>
-            </a:extLst>
-          </p:cNvPr>
-          <p:cNvSpPr/>
-          <p:nvPr/>
-        </p:nvSpPr>
-        <p:spPr>
-          <a:xfrm>
-            <a:off x="5714825" y="5142375"/>
-            <a:ext cx="1458685" cy="522514"/>
-          </a:xfrm>
-          <a:prstGeom prst="rect">
-            <a:avLst/>
-          </a:prstGeom>
-          <a:solidFill>
-            <a:schemeClr val="accent2">
-              <a:lumMod val="40000"/>
-              <a:lumOff val="60000"/>
-            </a:schemeClr>
-          </a:solidFill>
-          <a:ln>
-            <a:noFill/>
-          </a:ln>
-        </p:spPr>
-        <p:style>
-          <a:lnRef idx="2">
-            <a:schemeClr val="accent1">
-              <a:shade val="15000"/>
-            </a:schemeClr>
-          </a:lnRef>
-          <a:fillRef idx="1">
-            <a:schemeClr val="accent1"/>
-          </a:fillRef>
-          <a:effectRef idx="0">
-            <a:schemeClr val="accent1"/>
-          </a:effectRef>
-          <a:fontRef idx="minor">
-            <a:schemeClr val="lt1"/>
-          </a:fontRef>
-        </p:style>
-        <p:txBody>
-          <a:bodyPr rtlCol="0" anchor="ctr"/>
-          <a:lstStyle/>
-          <a:p>
-            <a:pPr algn="ctr"/>
-            <a:r>
-              <a:rPr lang="it-IT" i="1" dirty="0">
-                <a:solidFill>
-                  <a:schemeClr val="tx1"/>
-                </a:solidFill>
-              </a:rPr>
-              <a:t>auction</a:t>
-            </a:r>
-          </a:p>
-        </p:txBody>
-      </p:sp>
-      <p:sp>
-        <p:nvSpPr>
-          <p:cNvPr id="19" name="Ovale 18">
-            <a:extLst>
-              <a:ext uri="{FF2B5EF4-FFF2-40B4-BE49-F238E27FC236}">
-                <a16:creationId xmlns:a16="http://schemas.microsoft.com/office/drawing/2014/main" id="{06C03A86-7F3A-6FB8-F298-A8A860B9FBDB}"/>
-              </a:ext>
-            </a:extLst>
-          </p:cNvPr>
-          <p:cNvSpPr/>
-          <p:nvPr/>
-        </p:nvSpPr>
-        <p:spPr>
-          <a:xfrm>
-            <a:off x="2383973" y="4319199"/>
-            <a:ext cx="2019300" cy="1387927"/>
-          </a:xfrm>
-          <a:prstGeom prst="ellipse">
-            <a:avLst/>
-          </a:prstGeom>
-          <a:solidFill>
-            <a:schemeClr val="accent2">
-              <a:lumMod val="60000"/>
-              <a:lumOff val="40000"/>
-            </a:schemeClr>
-          </a:solidFill>
-        </p:spPr>
-        <p:style>
-          <a:lnRef idx="2">
-            <a:schemeClr val="accent1">
-              <a:shade val="15000"/>
-            </a:schemeClr>
-          </a:lnRef>
-          <a:fillRef idx="1">
-            <a:schemeClr val="accent1"/>
-          </a:fillRef>
-          <a:effectRef idx="0">
-            <a:schemeClr val="accent1"/>
-          </a:effectRef>
-          <a:fontRef idx="minor">
-            <a:schemeClr val="lt1"/>
-          </a:fontRef>
-        </p:style>
-        <p:txBody>
-          <a:bodyPr rtlCol="0" anchor="ctr"/>
-          <a:lstStyle/>
-          <a:p>
-            <a:pPr algn="ctr"/>
-            <a:r>
-              <a:rPr lang="it-IT" dirty="0">
-                <a:solidFill>
-                  <a:schemeClr val="tx1"/>
-                </a:solidFill>
-              </a:rPr>
-              <a:t>pricing environment</a:t>
-            </a:r>
-          </a:p>
-        </p:txBody>
-      </p:sp>
-      <p:sp>
-        <p:nvSpPr>
-          <p:cNvPr id="20" name="Ovale 19">
-            <a:extLst>
-              <a:ext uri="{FF2B5EF4-FFF2-40B4-BE49-F238E27FC236}">
-                <a16:creationId xmlns:a16="http://schemas.microsoft.com/office/drawing/2014/main" id="{D7E47BB5-9122-C640-21FD-CBDEC25D928F}"/>
-              </a:ext>
-            </a:extLst>
-          </p:cNvPr>
-          <p:cNvSpPr/>
-          <p:nvPr/>
-        </p:nvSpPr>
-        <p:spPr>
-          <a:xfrm>
-            <a:off x="8376560" y="1701830"/>
-            <a:ext cx="2188025" cy="1429594"/>
-          </a:xfrm>
-          <a:prstGeom prst="ellipse">
-            <a:avLst/>
-          </a:prstGeom>
-          <a:solidFill>
-            <a:schemeClr val="accent2">
-              <a:lumMod val="60000"/>
-              <a:lumOff val="40000"/>
-            </a:schemeClr>
-          </a:solidFill>
-        </p:spPr>
-        <p:style>
-          <a:lnRef idx="2">
-            <a:schemeClr val="accent1">
-              <a:shade val="15000"/>
-            </a:schemeClr>
-          </a:lnRef>
-          <a:fillRef idx="1">
-            <a:schemeClr val="accent1"/>
-          </a:fillRef>
-          <a:effectRef idx="0">
-            <a:schemeClr val="accent1"/>
-          </a:effectRef>
-          <a:fontRef idx="minor">
-            <a:schemeClr val="lt1"/>
-          </a:fontRef>
-        </p:style>
-        <p:txBody>
-          <a:bodyPr rtlCol="0" anchor="ctr"/>
-          <a:lstStyle/>
-          <a:p>
-            <a:pPr algn="ctr"/>
-            <a:r>
-              <a:rPr lang="it-IT" dirty="0">
-                <a:solidFill>
-                  <a:schemeClr val="tx1"/>
-                </a:solidFill>
-              </a:rPr>
-              <a:t>bidding environment</a:t>
-            </a:r>
-          </a:p>
-          <a:p>
-            <a:pPr algn="ctr"/>
-            <a:r>
-              <a:rPr lang="it-IT" dirty="0">
-                <a:solidFill>
-                  <a:schemeClr val="tx1"/>
-                </a:solidFill>
-              </a:rPr>
-              <a:t>(competitors)</a:t>
-            </a:r>
-          </a:p>
-        </p:txBody>
-      </p:sp>
-      <p:sp>
-        <p:nvSpPr>
-          <p:cNvPr id="23" name="Freccia bidirezionale orizzontale 22">
-            <a:extLst>
-              <a:ext uri="{FF2B5EF4-FFF2-40B4-BE49-F238E27FC236}">
-                <a16:creationId xmlns:a16="http://schemas.microsoft.com/office/drawing/2014/main" id="{B17BA574-17AE-9F91-1D07-9764E0744447}"/>
-              </a:ext>
-            </a:extLst>
-          </p:cNvPr>
-          <p:cNvSpPr/>
-          <p:nvPr/>
-        </p:nvSpPr>
-        <p:spPr>
-          <a:xfrm rot="15575544">
-            <a:off x="2313654" y="3664589"/>
-            <a:ext cx="1528563" cy="167493"/>
-          </a:xfrm>
-          <a:prstGeom prst="leftRightArrow">
-            <a:avLst/>
-          </a:prstGeom>
-          <a:solidFill>
-            <a:schemeClr val="accent2">
-              <a:lumMod val="75000"/>
-            </a:schemeClr>
-          </a:solidFill>
-          <a:ln>
-            <a:noFill/>
-          </a:ln>
-        </p:spPr>
-        <p:style>
-          <a:lnRef idx="2">
-            <a:schemeClr val="accent1">
-              <a:shade val="15000"/>
-            </a:schemeClr>
-          </a:lnRef>
-          <a:fillRef idx="1">
-            <a:schemeClr val="accent1"/>
-          </a:fillRef>
-          <a:effectRef idx="0">
-            <a:schemeClr val="accent1"/>
-          </a:effectRef>
-          <a:fontRef idx="minor">
-            <a:schemeClr val="lt1"/>
-          </a:fontRef>
-        </p:style>
-        <p:txBody>
-          <a:bodyPr rtlCol="0" anchor="ctr"/>
-          <a:lstStyle/>
-          <a:p>
-            <a:pPr algn="ctr"/>
-            <a:endParaRPr lang="it-IT"/>
-          </a:p>
-        </p:txBody>
-      </p:sp>
-      <p:sp>
-        <p:nvSpPr>
-          <p:cNvPr id="24" name="Freccia bidirezionale orizzontale 23">
-            <a:extLst>
-              <a:ext uri="{FF2B5EF4-FFF2-40B4-BE49-F238E27FC236}">
-                <a16:creationId xmlns:a16="http://schemas.microsoft.com/office/drawing/2014/main" id="{F474D4BD-AE5E-E54E-6882-1ABFB706CB37}"/>
-              </a:ext>
-            </a:extLst>
-          </p:cNvPr>
-          <p:cNvSpPr/>
-          <p:nvPr/>
-        </p:nvSpPr>
-        <p:spPr>
-          <a:xfrm rot="13581977">
-            <a:off x="3967572" y="3692242"/>
-            <a:ext cx="2199281" cy="174519"/>
-          </a:xfrm>
-          <a:prstGeom prst="leftRightArrow">
-            <a:avLst/>
-          </a:prstGeom>
-          <a:solidFill>
-            <a:schemeClr val="accent2">
-              <a:lumMod val="75000"/>
-            </a:schemeClr>
-          </a:solidFill>
-          <a:ln>
-            <a:noFill/>
-          </a:ln>
-        </p:spPr>
-        <p:style>
-          <a:lnRef idx="2">
-            <a:schemeClr val="accent1">
-              <a:shade val="15000"/>
-            </a:schemeClr>
-          </a:lnRef>
-          <a:fillRef idx="1">
-            <a:schemeClr val="accent1"/>
-          </a:fillRef>
-          <a:effectRef idx="0">
-            <a:schemeClr val="accent1"/>
-          </a:effectRef>
-          <a:fontRef idx="minor">
-            <a:schemeClr val="lt1"/>
-          </a:fontRef>
-        </p:style>
-        <p:txBody>
-          <a:bodyPr rtlCol="0" anchor="ctr"/>
-          <a:lstStyle/>
-          <a:p>
-            <a:pPr algn="ctr"/>
-            <a:endParaRPr lang="it-IT"/>
-          </a:p>
-        </p:txBody>
-      </p:sp>
-      <p:sp>
-        <p:nvSpPr>
-          <p:cNvPr id="26" name="Freccia su 25">
-            <a:extLst>
-              <a:ext uri="{FF2B5EF4-FFF2-40B4-BE49-F238E27FC236}">
-                <a16:creationId xmlns:a16="http://schemas.microsoft.com/office/drawing/2014/main" id="{93760571-4838-467E-2E10-2715CB577388}"/>
-              </a:ext>
-            </a:extLst>
-          </p:cNvPr>
-          <p:cNvSpPr/>
-          <p:nvPr/>
-        </p:nvSpPr>
-        <p:spPr>
-          <a:xfrm rot="13193897">
-            <a:off x="8091878" y="2888758"/>
-            <a:ext cx="166593" cy="1629728"/>
-          </a:xfrm>
-          <a:prstGeom prst="upArrow">
-            <a:avLst/>
-          </a:prstGeom>
-          <a:solidFill>
-            <a:schemeClr val="accent2">
-              <a:lumMod val="75000"/>
-            </a:schemeClr>
-          </a:solidFill>
-          <a:ln>
-            <a:noFill/>
-          </a:ln>
-        </p:spPr>
-        <p:style>
-          <a:lnRef idx="2">
-            <a:schemeClr val="accent1">
-              <a:shade val="15000"/>
-            </a:schemeClr>
-          </a:lnRef>
-          <a:fillRef idx="1">
-            <a:schemeClr val="accent1"/>
-          </a:fillRef>
-          <a:effectRef idx="0">
-            <a:schemeClr val="accent1"/>
-          </a:effectRef>
-          <a:fontRef idx="minor">
-            <a:schemeClr val="lt1"/>
-          </a:fontRef>
-        </p:style>
-        <p:txBody>
-          <a:bodyPr rtlCol="0" anchor="ctr"/>
-          <a:lstStyle/>
-          <a:p>
-            <a:pPr algn="ctr"/>
-            <a:endParaRPr lang="it-IT"/>
-          </a:p>
-        </p:txBody>
-      </p:sp>
-      <p:sp>
-        <p:nvSpPr>
-          <p:cNvPr id="27" name="Titolo 1">
-            <a:extLst>
-              <a:ext uri="{FF2B5EF4-FFF2-40B4-BE49-F238E27FC236}">
-                <a16:creationId xmlns:a16="http://schemas.microsoft.com/office/drawing/2014/main" id="{8B171363-6B38-AB60-B57E-BC101B9E8A32}"/>
-              </a:ext>
-            </a:extLst>
-          </p:cNvPr>
-          <p:cNvSpPr>
-            <a:spLocks noGrp="1"/>
-          </p:cNvSpPr>
-          <p:nvPr>
-            <p:ph type="title"/>
-          </p:nvPr>
-        </p:nvSpPr>
-        <p:spPr>
-          <a:xfrm>
-            <a:off x="2465220" y="182499"/>
-            <a:ext cx="7566007" cy="876178"/>
+            <a:off x="2198696" y="289778"/>
+            <a:ext cx="7794607" cy="722594"/>
           </a:xfrm>
           <a:solidFill>
             <a:schemeClr val="accent2">
@@ -7985,14 +8685,433 @@
           </a:solidFill>
         </p:spPr>
         <p:txBody>
-          <a:bodyPr/>
-          <a:lstStyle/>
-          <a:p>
+          <a:bodyPr>
+            <a:normAutofit fontScale="90000"/>
+          </a:bodyPr>
+          <a:lstStyle/>
+          <a:p>
+            <a:r>
+              <a:rPr lang="it-IT" b="1" dirty="0" err="1">
+                <a:latin typeface="ACADEMY ENGRAVED LET PLAIN:1.0" panose="02000000000000000000" pitchFamily="2" charset="0"/>
+              </a:rPr>
+              <a:t>Requirement</a:t>
+            </a:r>
             <a:r>
               <a:rPr lang="it-IT" b="1" dirty="0">
                 <a:latin typeface="ACADEMY ENGRAVED LET PLAIN:1.0" panose="02000000000000000000" pitchFamily="2" charset="0"/>
               </a:rPr>
-              <a:t>interaction</a:t>
+              <a:t> 1</a:t>
+            </a:r>
+          </a:p>
+        </p:txBody>
+      </p:sp>
+      <p:sp>
+        <p:nvSpPr>
+          <p:cNvPr id="5" name="CasellaDiTesto 4">
+            <a:extLst>
+              <a:ext uri="{FF2B5EF4-FFF2-40B4-BE49-F238E27FC236}">
+                <a16:creationId xmlns:a16="http://schemas.microsoft.com/office/drawing/2014/main" id="{C4C1B873-5FA4-8C9C-F47D-CFE380B9EA7F}"/>
+              </a:ext>
+            </a:extLst>
+          </p:cNvPr>
+          <p:cNvSpPr txBox="1"/>
+          <p:nvPr/>
+        </p:nvSpPr>
+        <p:spPr>
+          <a:xfrm>
+            <a:off x="266699" y="1324299"/>
+            <a:ext cx="11658600" cy="338554"/>
+          </a:xfrm>
+          <a:prstGeom prst="rect">
+            <a:avLst/>
+          </a:prstGeom>
+          <a:noFill/>
+        </p:spPr>
+        <p:txBody>
+          <a:bodyPr wrap="square" rtlCol="0">
+            <a:spAutoFit/>
+          </a:bodyPr>
+          <a:lstStyle/>
+          <a:p>
+            <a:r>
+              <a:rPr lang="it-IT" sz="1600" b="1" dirty="0"/>
+              <a:t>BIDDING ENVIRONMENT </a:t>
+            </a:r>
+            <a:r>
+              <a:rPr lang="it-IT" sz="1600" dirty="0"/>
+              <a:t>(COMPETITORS) : </a:t>
+            </a:r>
+            <a:r>
+              <a:rPr lang="it-IT" sz="1600" dirty="0" err="1"/>
+              <a:t>Stochastic</a:t>
+            </a:r>
+            <a:r>
+              <a:rPr lang="it-IT" sz="1600" dirty="0"/>
+              <a:t> with </a:t>
+            </a:r>
+            <a:r>
+              <a:rPr lang="it-IT" sz="1600" dirty="0" err="1"/>
+              <a:t>uniformely</a:t>
+            </a:r>
+            <a:r>
+              <a:rPr lang="it-IT" sz="1600" dirty="0"/>
+              <a:t> </a:t>
+            </a:r>
+            <a:r>
+              <a:rPr lang="it-IT" sz="1600" dirty="0" err="1"/>
+              <a:t>distributed</a:t>
+            </a:r>
+            <a:r>
+              <a:rPr lang="it-IT" sz="1600" dirty="0"/>
+              <a:t> </a:t>
+            </a:r>
+            <a:r>
+              <a:rPr lang="it-IT" sz="1600" dirty="0" err="1"/>
+              <a:t>bids</a:t>
+            </a:r>
+            <a:r>
+              <a:rPr lang="it-IT" sz="1600" dirty="0"/>
+              <a:t> </a:t>
+            </a:r>
+          </a:p>
+        </p:txBody>
+      </p:sp>
+      <p:sp>
+        <p:nvSpPr>
+          <p:cNvPr id="6" name="CasellaDiTesto 5">
+            <a:extLst>
+              <a:ext uri="{FF2B5EF4-FFF2-40B4-BE49-F238E27FC236}">
+                <a16:creationId xmlns:a16="http://schemas.microsoft.com/office/drawing/2014/main" id="{6E07FF96-F0A8-65CB-86FB-5B8A0053D077}"/>
+              </a:ext>
+            </a:extLst>
+          </p:cNvPr>
+          <p:cNvSpPr txBox="1"/>
+          <p:nvPr/>
+        </p:nvSpPr>
+        <p:spPr>
+          <a:xfrm>
+            <a:off x="266700" y="2224368"/>
+            <a:ext cx="9367158" cy="830997"/>
+          </a:xfrm>
+          <a:prstGeom prst="rect">
+            <a:avLst/>
+          </a:prstGeom>
+          <a:noFill/>
+        </p:spPr>
+        <p:txBody>
+          <a:bodyPr wrap="square" rtlCol="0">
+            <a:spAutoFit/>
+          </a:bodyPr>
+          <a:lstStyle/>
+          <a:p>
+            <a:r>
+              <a:rPr lang="it-IT" sz="1600" b="1" dirty="0"/>
+              <a:t>PRICING ENVIRONMENT</a:t>
+            </a:r>
+            <a:r>
+              <a:rPr lang="it-IT" sz="1600" dirty="0"/>
+              <a:t> :   </a:t>
+            </a:r>
+            <a:r>
+              <a:rPr lang="it-IT" sz="1600" dirty="0" err="1"/>
+              <a:t>Stochastic</a:t>
+            </a:r>
+            <a:r>
+              <a:rPr lang="it-IT" sz="1600" dirty="0"/>
+              <a:t> with demands  </a:t>
+            </a:r>
+            <a:r>
+              <a:rPr lang="it-IT" sz="1600" dirty="0" err="1"/>
+              <a:t>sampled</a:t>
+            </a:r>
+            <a:r>
+              <a:rPr lang="it-IT" sz="1600" dirty="0"/>
+              <a:t> from a </a:t>
+            </a:r>
+            <a:r>
+              <a:rPr lang="it-IT" sz="1600" dirty="0" err="1"/>
+              <a:t>binomial</a:t>
+            </a:r>
+            <a:r>
+              <a:rPr lang="it-IT" sz="1600" dirty="0"/>
+              <a:t> </a:t>
+            </a:r>
+            <a:r>
+              <a:rPr lang="it-IT" sz="1600" dirty="0" err="1"/>
+              <a:t>distribution</a:t>
+            </a:r>
+            <a:r>
+              <a:rPr lang="it-IT" sz="1600" dirty="0"/>
+              <a:t> with success 					         </a:t>
+            </a:r>
+            <a:r>
+              <a:rPr lang="it-IT" sz="1600" dirty="0" err="1"/>
+              <a:t>probability</a:t>
+            </a:r>
+            <a:r>
+              <a:rPr lang="it-IT" sz="1600" dirty="0"/>
+              <a:t> </a:t>
+            </a:r>
+            <a:r>
+              <a:rPr lang="it-IT" sz="1600" dirty="0" err="1"/>
+              <a:t>given</a:t>
+            </a:r>
+            <a:r>
+              <a:rPr lang="it-IT" sz="1600" dirty="0"/>
+              <a:t> by the </a:t>
+            </a:r>
+            <a:r>
+              <a:rPr lang="it-IT" sz="1600" dirty="0" err="1"/>
+              <a:t>conversion</a:t>
+            </a:r>
+            <a:r>
+              <a:rPr lang="it-IT" sz="1600" dirty="0"/>
+              <a:t> rate (1-p) and </a:t>
+            </a:r>
+            <a:r>
+              <a:rPr lang="it-IT" sz="1600" dirty="0" err="1"/>
+              <a:t>number</a:t>
+            </a:r>
+            <a:r>
+              <a:rPr lang="it-IT" sz="1600" dirty="0"/>
+              <a:t> of trials </a:t>
+            </a:r>
+            <a:r>
+              <a:rPr lang="it-IT" sz="1600" dirty="0" err="1"/>
+              <a:t>equal</a:t>
+            </a:r>
+            <a:r>
+              <a:rPr lang="it-IT" sz="1600" dirty="0"/>
+              <a:t> to 							 the </a:t>
+            </a:r>
+            <a:r>
+              <a:rPr lang="it-IT" sz="1600" dirty="0" err="1"/>
+              <a:t>number</a:t>
+            </a:r>
+            <a:r>
+              <a:rPr lang="it-IT" sz="1600" dirty="0"/>
+              <a:t> of </a:t>
+            </a:r>
+            <a:r>
+              <a:rPr lang="it-IT" sz="1600" dirty="0" err="1"/>
+              <a:t>visits</a:t>
+            </a:r>
+            <a:r>
+              <a:rPr lang="it-IT" sz="1600" dirty="0"/>
+              <a:t> </a:t>
+            </a:r>
+            <a:r>
+              <a:rPr lang="it-IT" sz="1600" dirty="0" err="1"/>
+              <a:t>obtained</a:t>
+            </a:r>
+            <a:r>
+              <a:rPr lang="it-IT" sz="1600" dirty="0"/>
+              <a:t> in the bidding interaction </a:t>
+            </a:r>
+          </a:p>
+        </p:txBody>
+      </p:sp>
+      <p:sp>
+        <p:nvSpPr>
+          <p:cNvPr id="7" name="CasellaDiTesto 6">
+            <a:extLst>
+              <a:ext uri="{FF2B5EF4-FFF2-40B4-BE49-F238E27FC236}">
+                <a16:creationId xmlns:a16="http://schemas.microsoft.com/office/drawing/2014/main" id="{FB2ACC41-C836-111F-7C3A-7789116239F8}"/>
+              </a:ext>
+            </a:extLst>
+          </p:cNvPr>
+          <p:cNvSpPr txBox="1"/>
+          <p:nvPr/>
+        </p:nvSpPr>
+        <p:spPr>
+          <a:xfrm>
+            <a:off x="266700" y="3536569"/>
+            <a:ext cx="9367158" cy="338554"/>
+          </a:xfrm>
+          <a:prstGeom prst="rect">
+            <a:avLst/>
+          </a:prstGeom>
+          <a:noFill/>
+        </p:spPr>
+        <p:txBody>
+          <a:bodyPr wrap="square" rtlCol="0">
+            <a:spAutoFit/>
+          </a:bodyPr>
+          <a:lstStyle/>
+          <a:p>
+            <a:r>
+              <a:rPr lang="it-IT" sz="1600" b="1" dirty="0"/>
+              <a:t>AUCTION TYPE:  			</a:t>
+            </a:r>
+            <a:r>
+              <a:rPr lang="it-IT" sz="1600" dirty="0"/>
+              <a:t>Second Price (</a:t>
+            </a:r>
+            <a:r>
+              <a:rPr lang="it-IT" sz="1600" dirty="0" err="1"/>
+              <a:t>Truthful</a:t>
+            </a:r>
+            <a:r>
+              <a:rPr lang="it-IT" sz="1600" dirty="0"/>
+              <a:t>) </a:t>
+            </a:r>
+          </a:p>
+        </p:txBody>
+      </p:sp>
+      <p:sp>
+        <p:nvSpPr>
+          <p:cNvPr id="8" name="CasellaDiTesto 7">
+            <a:extLst>
+              <a:ext uri="{FF2B5EF4-FFF2-40B4-BE49-F238E27FC236}">
+                <a16:creationId xmlns:a16="http://schemas.microsoft.com/office/drawing/2014/main" id="{F70A50A6-EEFF-7598-F6CD-4BAF488403FE}"/>
+              </a:ext>
+            </a:extLst>
+          </p:cNvPr>
+          <p:cNvSpPr txBox="1"/>
+          <p:nvPr/>
+        </p:nvSpPr>
+        <p:spPr>
+          <a:xfrm>
+            <a:off x="266700" y="4490677"/>
+            <a:ext cx="2106386" cy="338554"/>
+          </a:xfrm>
+          <a:prstGeom prst="rect">
+            <a:avLst/>
+          </a:prstGeom>
+          <a:noFill/>
+        </p:spPr>
+        <p:txBody>
+          <a:bodyPr wrap="square" rtlCol="0">
+            <a:spAutoFit/>
+          </a:bodyPr>
+          <a:lstStyle/>
+          <a:p>
+            <a:r>
+              <a:rPr lang="it-IT" sz="1600" b="1" dirty="0"/>
+              <a:t>BIDDING AGENTS: </a:t>
+            </a:r>
+            <a:endParaRPr lang="it-IT" sz="1600" dirty="0"/>
+          </a:p>
+        </p:txBody>
+      </p:sp>
+      <p:sp>
+        <p:nvSpPr>
+          <p:cNvPr id="9" name="CasellaDiTesto 8">
+            <a:extLst>
+              <a:ext uri="{FF2B5EF4-FFF2-40B4-BE49-F238E27FC236}">
+                <a16:creationId xmlns:a16="http://schemas.microsoft.com/office/drawing/2014/main" id="{89DED369-1ED4-2B9B-385B-68BD1A7959DA}"/>
+              </a:ext>
+            </a:extLst>
+          </p:cNvPr>
+          <p:cNvSpPr txBox="1"/>
+          <p:nvPr/>
+        </p:nvSpPr>
+        <p:spPr>
+          <a:xfrm>
+            <a:off x="2768943" y="4391193"/>
+            <a:ext cx="5078186" cy="584775"/>
+          </a:xfrm>
+          <a:prstGeom prst="rect">
+            <a:avLst/>
+          </a:prstGeom>
+          <a:noFill/>
+        </p:spPr>
+        <p:txBody>
+          <a:bodyPr wrap="square" rtlCol="0">
+            <a:spAutoFit/>
+          </a:bodyPr>
+          <a:lstStyle/>
+          <a:p>
+            <a:pPr marL="342900" indent="-342900">
+              <a:buAutoNum type="arabicPeriod"/>
+            </a:pPr>
+            <a:r>
+              <a:rPr lang="it-IT" sz="1600" dirty="0" err="1"/>
+              <a:t>ucb</a:t>
+            </a:r>
+            <a:r>
+              <a:rPr lang="it-IT" sz="1600" dirty="0"/>
+              <a:t> like</a:t>
+            </a:r>
+          </a:p>
+          <a:p>
+            <a:pPr marL="342900" indent="-342900">
+              <a:buAutoNum type="arabicPeriod"/>
+            </a:pPr>
+            <a:r>
+              <a:rPr lang="it-IT" sz="1600" dirty="0" err="1"/>
+              <a:t>primal</a:t>
+            </a:r>
+            <a:r>
+              <a:rPr lang="it-IT" sz="1600" dirty="0"/>
+              <a:t>-dual (</a:t>
+            </a:r>
+            <a:r>
+              <a:rPr lang="it-IT" sz="1600" dirty="0" err="1"/>
+              <a:t>multiplicative</a:t>
+            </a:r>
+            <a:r>
+              <a:rPr lang="it-IT" sz="1600" dirty="0"/>
+              <a:t> </a:t>
+            </a:r>
+            <a:r>
+              <a:rPr lang="it-IT" sz="1600" dirty="0" err="1"/>
+              <a:t>pacing</a:t>
+            </a:r>
+            <a:r>
+              <a:rPr lang="it-IT" sz="1600" dirty="0"/>
+              <a:t>)</a:t>
+            </a:r>
+          </a:p>
+        </p:txBody>
+      </p:sp>
+      <p:sp>
+        <p:nvSpPr>
+          <p:cNvPr id="10" name="CasellaDiTesto 9">
+            <a:extLst>
+              <a:ext uri="{FF2B5EF4-FFF2-40B4-BE49-F238E27FC236}">
+                <a16:creationId xmlns:a16="http://schemas.microsoft.com/office/drawing/2014/main" id="{73880002-A4CD-378F-E229-10996261CF0D}"/>
+              </a:ext>
+            </a:extLst>
+          </p:cNvPr>
+          <p:cNvSpPr txBox="1"/>
+          <p:nvPr/>
+        </p:nvSpPr>
+        <p:spPr>
+          <a:xfrm>
+            <a:off x="266700" y="5492038"/>
+            <a:ext cx="5524500" cy="338554"/>
+          </a:xfrm>
+          <a:prstGeom prst="rect">
+            <a:avLst/>
+          </a:prstGeom>
+          <a:noFill/>
+        </p:spPr>
+        <p:txBody>
+          <a:bodyPr wrap="square" rtlCol="0">
+            <a:spAutoFit/>
+          </a:bodyPr>
+          <a:lstStyle/>
+          <a:p>
+            <a:r>
+              <a:rPr lang="it-IT" sz="1600" b="1" dirty="0"/>
+              <a:t>PRICING AGENT: 	             </a:t>
+            </a:r>
+            <a:r>
+              <a:rPr lang="it-IT" sz="1600" dirty="0" err="1"/>
+              <a:t>gaussian</a:t>
+            </a:r>
+            <a:r>
+              <a:rPr lang="it-IT" sz="1600" dirty="0"/>
+              <a:t> </a:t>
+            </a:r>
+            <a:r>
+              <a:rPr lang="it-IT" sz="1600" dirty="0" err="1"/>
+              <a:t>processes</a:t>
+            </a:r>
+            <a:r>
+              <a:rPr lang="it-IT" sz="1600" dirty="0"/>
+              <a:t> </a:t>
             </a:r>
           </a:p>
         </p:txBody>
@@ -8000,7 +9119,627 @@
     </p:spTree>
     <p:extLst>
       <p:ext uri="{BB962C8B-B14F-4D97-AF65-F5344CB8AC3E}">
-        <p14:creationId xmlns:p14="http://schemas.microsoft.com/office/powerpoint/2010/main" val="2630454284"/>
+        <p14:creationId xmlns:p14="http://schemas.microsoft.com/office/powerpoint/2010/main" val="2640318550"/>
+      </p:ext>
+    </p:extLst>
+  </p:cSld>
+  <p:clrMapOvr>
+    <a:masterClrMapping/>
+  </p:clrMapOvr>
+</p:sld>
+</file>
+
+<file path=ppt/slides/slide20.xml><?xml version="1.0" encoding="utf-8"?>
+<p:sld xmlns:a="http://schemas.openxmlformats.org/drawingml/2006/main" xmlns:r="http://schemas.openxmlformats.org/officeDocument/2006/relationships" xmlns:p="http://schemas.openxmlformats.org/presentationml/2006/main">
+  <p:cSld>
+    <p:spTree>
+      <p:nvGrpSpPr>
+        <p:cNvPr id="1" name=""/>
+        <p:cNvGrpSpPr/>
+        <p:nvPr/>
+      </p:nvGrpSpPr>
+      <p:grpSpPr>
+        <a:xfrm>
+          <a:off x="0" y="0"/>
+          <a:ext cx="0" cy="0"/>
+          <a:chOff x="0" y="0"/>
+          <a:chExt cx="0" cy="0"/>
+        </a:xfrm>
+      </p:grpSpPr>
+      <p:sp>
+        <p:nvSpPr>
+          <p:cNvPr id="2" name="Titolo 1">
+            <a:extLst>
+              <a:ext uri="{FF2B5EF4-FFF2-40B4-BE49-F238E27FC236}">
+                <a16:creationId xmlns:a16="http://schemas.microsoft.com/office/drawing/2014/main" id="{3D70F780-9E2F-64BB-5AAC-2FA2D1417F89}"/>
+              </a:ext>
+            </a:extLst>
+          </p:cNvPr>
+          <p:cNvSpPr>
+            <a:spLocks noGrp="1"/>
+          </p:cNvSpPr>
+          <p:nvPr>
+            <p:ph type="title"/>
+          </p:nvPr>
+        </p:nvSpPr>
+        <p:spPr>
+          <a:xfrm>
+            <a:off x="2198696" y="289778"/>
+            <a:ext cx="7794607" cy="722594"/>
+          </a:xfrm>
+          <a:solidFill>
+            <a:schemeClr val="accent2">
+              <a:lumMod val="20000"/>
+              <a:lumOff val="80000"/>
+            </a:schemeClr>
+          </a:solidFill>
+        </p:spPr>
+        <p:txBody>
+          <a:bodyPr>
+            <a:normAutofit fontScale="90000"/>
+          </a:bodyPr>
+          <a:lstStyle/>
+          <a:p>
+            <a:r>
+              <a:rPr lang="it-IT" b="1" dirty="0">
+                <a:latin typeface="ACADEMY ENGRAVED LET PLAIN:1.0" panose="02000000000000000000" pitchFamily="2" charset="0"/>
+              </a:rPr>
+              <a:t>STANDARD CASE</a:t>
+            </a:r>
+          </a:p>
+        </p:txBody>
+      </p:sp>
+      <p:sp>
+        <p:nvSpPr>
+          <p:cNvPr id="3" name="CasellaDiTesto 2">
+            <a:extLst>
+              <a:ext uri="{FF2B5EF4-FFF2-40B4-BE49-F238E27FC236}">
+                <a16:creationId xmlns:a16="http://schemas.microsoft.com/office/drawing/2014/main" id="{EA4F199A-B874-EBCB-40CC-98A2A2031258}"/>
+              </a:ext>
+            </a:extLst>
+          </p:cNvPr>
+          <p:cNvSpPr txBox="1"/>
+          <p:nvPr/>
+        </p:nvSpPr>
+        <p:spPr>
+          <a:xfrm>
+            <a:off x="709056" y="1582284"/>
+            <a:ext cx="6912022" cy="1077218"/>
+          </a:xfrm>
+          <a:prstGeom prst="rect">
+            <a:avLst/>
+          </a:prstGeom>
+          <a:noFill/>
+        </p:spPr>
+        <p:txBody>
+          <a:bodyPr wrap="square" rtlCol="0">
+            <a:spAutoFit/>
+          </a:bodyPr>
+          <a:lstStyle/>
+          <a:p>
+            <a:r>
+              <a:rPr lang="it-IT" sz="1600" b="1" dirty="0"/>
+              <a:t>SETUP</a:t>
+            </a:r>
+            <a:r>
+              <a:rPr lang="it-IT" sz="1600" dirty="0"/>
+              <a:t>:   </a:t>
+            </a:r>
+          </a:p>
+          <a:p>
+            <a:pPr marL="285750" indent="-285750">
+              <a:buFont typeface="Arial" panose="020B0604020202020204" pitchFamily="34" charset="0"/>
+              <a:buChar char="•"/>
+            </a:pPr>
+            <a:r>
+              <a:rPr lang="it-IT" sz="1600" dirty="0"/>
+              <a:t>3 </a:t>
+            </a:r>
+            <a:r>
+              <a:rPr lang="it-IT" sz="1600" dirty="0" err="1"/>
+              <a:t>Bidders</a:t>
+            </a:r>
+            <a:r>
+              <a:rPr lang="it-IT" sz="1600" dirty="0"/>
+              <a:t> per </a:t>
+            </a:r>
+            <a:r>
+              <a:rPr lang="it-IT" sz="1600" dirty="0" err="1"/>
+              <a:t>type</a:t>
+            </a:r>
+            <a:endParaRPr lang="it-IT" sz="1600" dirty="0"/>
+          </a:p>
+          <a:p>
+            <a:pPr marL="285750" indent="-285750">
+              <a:buFont typeface="Arial" panose="020B0604020202020204" pitchFamily="34" charset="0"/>
+              <a:buChar char="•"/>
+            </a:pPr>
+            <a:r>
+              <a:rPr lang="it-IT" sz="1600" dirty="0"/>
+              <a:t>3 Slots</a:t>
+            </a:r>
+          </a:p>
+          <a:p>
+            <a:pPr marL="285750" indent="-285750">
+              <a:buFont typeface="Arial" panose="020B0604020202020204" pitchFamily="34" charset="0"/>
+              <a:buChar char="•"/>
+            </a:pPr>
+            <a:r>
+              <a:rPr lang="it-IT" sz="1600" dirty="0"/>
+              <a:t>Budget:    B = 250</a:t>
+            </a:r>
+          </a:p>
+        </p:txBody>
+      </p:sp>
+    </p:spTree>
+    <p:extLst>
+      <p:ext uri="{BB962C8B-B14F-4D97-AF65-F5344CB8AC3E}">
+        <p14:creationId xmlns:p14="http://schemas.microsoft.com/office/powerpoint/2010/main" val="2158785671"/>
+      </p:ext>
+    </p:extLst>
+  </p:cSld>
+  <p:clrMapOvr>
+    <a:masterClrMapping/>
+  </p:clrMapOvr>
+</p:sld>
+</file>
+
+<file path=ppt/slides/slide21.xml><?xml version="1.0" encoding="utf-8"?>
+<p:sld xmlns:a="http://schemas.openxmlformats.org/drawingml/2006/main" xmlns:r="http://schemas.openxmlformats.org/officeDocument/2006/relationships" xmlns:p="http://schemas.openxmlformats.org/presentationml/2006/main">
+  <p:cSld>
+    <p:spTree>
+      <p:nvGrpSpPr>
+        <p:cNvPr id="1" name=""/>
+        <p:cNvGrpSpPr/>
+        <p:nvPr/>
+      </p:nvGrpSpPr>
+      <p:grpSpPr>
+        <a:xfrm>
+          <a:off x="0" y="0"/>
+          <a:ext cx="0" cy="0"/>
+          <a:chOff x="0" y="0"/>
+          <a:chExt cx="0" cy="0"/>
+        </a:xfrm>
+      </p:grpSpPr>
+      <p:sp>
+        <p:nvSpPr>
+          <p:cNvPr id="2" name="Titolo 1">
+            <a:extLst>
+              <a:ext uri="{FF2B5EF4-FFF2-40B4-BE49-F238E27FC236}">
+                <a16:creationId xmlns:a16="http://schemas.microsoft.com/office/drawing/2014/main" id="{3D70F780-9E2F-64BB-5AAC-2FA2D1417F89}"/>
+              </a:ext>
+            </a:extLst>
+          </p:cNvPr>
+          <p:cNvSpPr>
+            <a:spLocks noGrp="1"/>
+          </p:cNvSpPr>
+          <p:nvPr>
+            <p:ph type="title"/>
+          </p:nvPr>
+        </p:nvSpPr>
+        <p:spPr>
+          <a:xfrm>
+            <a:off x="2198696" y="289778"/>
+            <a:ext cx="7794607" cy="722594"/>
+          </a:xfrm>
+          <a:solidFill>
+            <a:schemeClr val="accent2">
+              <a:lumMod val="20000"/>
+              <a:lumOff val="80000"/>
+            </a:schemeClr>
+          </a:solidFill>
+        </p:spPr>
+        <p:txBody>
+          <a:bodyPr>
+            <a:normAutofit fontScale="90000"/>
+          </a:bodyPr>
+          <a:lstStyle/>
+          <a:p>
+            <a:r>
+              <a:rPr lang="it-IT" b="1" dirty="0">
+                <a:latin typeface="ACADEMY ENGRAVED LET PLAIN:1.0" panose="02000000000000000000" pitchFamily="2" charset="0"/>
+              </a:rPr>
+              <a:t>HIGH BUDGET CASE</a:t>
+            </a:r>
+          </a:p>
+        </p:txBody>
+      </p:sp>
+      <p:sp>
+        <p:nvSpPr>
+          <p:cNvPr id="3" name="CasellaDiTesto 2">
+            <a:extLst>
+              <a:ext uri="{FF2B5EF4-FFF2-40B4-BE49-F238E27FC236}">
+                <a16:creationId xmlns:a16="http://schemas.microsoft.com/office/drawing/2014/main" id="{EA4F199A-B874-EBCB-40CC-98A2A2031258}"/>
+              </a:ext>
+            </a:extLst>
+          </p:cNvPr>
+          <p:cNvSpPr txBox="1"/>
+          <p:nvPr/>
+        </p:nvSpPr>
+        <p:spPr>
+          <a:xfrm>
+            <a:off x="709056" y="1582284"/>
+            <a:ext cx="6912022" cy="1077218"/>
+          </a:xfrm>
+          <a:prstGeom prst="rect">
+            <a:avLst/>
+          </a:prstGeom>
+          <a:noFill/>
+        </p:spPr>
+        <p:txBody>
+          <a:bodyPr wrap="square" rtlCol="0">
+            <a:spAutoFit/>
+          </a:bodyPr>
+          <a:lstStyle/>
+          <a:p>
+            <a:r>
+              <a:rPr lang="it-IT" sz="1600" b="1" dirty="0"/>
+              <a:t>SETUP</a:t>
+            </a:r>
+            <a:r>
+              <a:rPr lang="it-IT" sz="1600" dirty="0"/>
+              <a:t>:   </a:t>
+            </a:r>
+          </a:p>
+          <a:p>
+            <a:pPr marL="285750" indent="-285750">
+              <a:buFont typeface="Arial" panose="020B0604020202020204" pitchFamily="34" charset="0"/>
+              <a:buChar char="•"/>
+            </a:pPr>
+            <a:r>
+              <a:rPr lang="it-IT" sz="1600" dirty="0"/>
+              <a:t>3 </a:t>
+            </a:r>
+            <a:r>
+              <a:rPr lang="it-IT" sz="1600" dirty="0" err="1"/>
+              <a:t>Bidders</a:t>
+            </a:r>
+            <a:r>
+              <a:rPr lang="it-IT" sz="1600" dirty="0"/>
+              <a:t> per </a:t>
+            </a:r>
+            <a:r>
+              <a:rPr lang="it-IT" sz="1600" dirty="0" err="1"/>
+              <a:t>type</a:t>
+            </a:r>
+            <a:endParaRPr lang="it-IT" sz="1600" dirty="0"/>
+          </a:p>
+          <a:p>
+            <a:pPr marL="285750" indent="-285750">
+              <a:buFont typeface="Arial" panose="020B0604020202020204" pitchFamily="34" charset="0"/>
+              <a:buChar char="•"/>
+            </a:pPr>
+            <a:r>
+              <a:rPr lang="it-IT" sz="1600" dirty="0"/>
+              <a:t>3 Slots</a:t>
+            </a:r>
+          </a:p>
+          <a:p>
+            <a:pPr marL="285750" indent="-285750">
+              <a:buFont typeface="Arial" panose="020B0604020202020204" pitchFamily="34" charset="0"/>
+              <a:buChar char="•"/>
+            </a:pPr>
+            <a:r>
+              <a:rPr lang="it-IT" sz="1600" dirty="0"/>
+              <a:t>Budget:     B = 500</a:t>
+            </a:r>
+          </a:p>
+        </p:txBody>
+      </p:sp>
+    </p:spTree>
+    <p:extLst>
+      <p:ext uri="{BB962C8B-B14F-4D97-AF65-F5344CB8AC3E}">
+        <p14:creationId xmlns:p14="http://schemas.microsoft.com/office/powerpoint/2010/main" val="1663343640"/>
+      </p:ext>
+    </p:extLst>
+  </p:cSld>
+  <p:clrMapOvr>
+    <a:masterClrMapping/>
+  </p:clrMapOvr>
+</p:sld>
+</file>
+
+<file path=ppt/slides/slide22.xml><?xml version="1.0" encoding="utf-8"?>
+<p:sld xmlns:a="http://schemas.openxmlformats.org/drawingml/2006/main" xmlns:r="http://schemas.openxmlformats.org/officeDocument/2006/relationships" xmlns:p="http://schemas.openxmlformats.org/presentationml/2006/main">
+  <p:cSld>
+    <p:spTree>
+      <p:nvGrpSpPr>
+        <p:cNvPr id="1" name=""/>
+        <p:cNvGrpSpPr/>
+        <p:nvPr/>
+      </p:nvGrpSpPr>
+      <p:grpSpPr>
+        <a:xfrm>
+          <a:off x="0" y="0"/>
+          <a:ext cx="0" cy="0"/>
+          <a:chOff x="0" y="0"/>
+          <a:chExt cx="0" cy="0"/>
+        </a:xfrm>
+      </p:grpSpPr>
+      <p:sp>
+        <p:nvSpPr>
+          <p:cNvPr id="2" name="Titolo 1">
+            <a:extLst>
+              <a:ext uri="{FF2B5EF4-FFF2-40B4-BE49-F238E27FC236}">
+                <a16:creationId xmlns:a16="http://schemas.microsoft.com/office/drawing/2014/main" id="{3D70F780-9E2F-64BB-5AAC-2FA2D1417F89}"/>
+              </a:ext>
+            </a:extLst>
+          </p:cNvPr>
+          <p:cNvSpPr>
+            <a:spLocks noGrp="1"/>
+          </p:cNvSpPr>
+          <p:nvPr>
+            <p:ph type="title"/>
+          </p:nvPr>
+        </p:nvSpPr>
+        <p:spPr>
+          <a:xfrm>
+            <a:off x="2198696" y="289778"/>
+            <a:ext cx="7794607" cy="722594"/>
+          </a:xfrm>
+          <a:solidFill>
+            <a:schemeClr val="accent2">
+              <a:lumMod val="20000"/>
+              <a:lumOff val="80000"/>
+            </a:schemeClr>
+          </a:solidFill>
+        </p:spPr>
+        <p:txBody>
+          <a:bodyPr>
+            <a:normAutofit fontScale="90000"/>
+          </a:bodyPr>
+          <a:lstStyle/>
+          <a:p>
+            <a:r>
+              <a:rPr lang="it-IT" b="1" dirty="0">
+                <a:latin typeface="ACADEMY ENGRAVED LET PLAIN:1.0" panose="02000000000000000000" pitchFamily="2" charset="0"/>
+              </a:rPr>
+              <a:t>VERY HIGH BUDGET CASE</a:t>
+            </a:r>
+          </a:p>
+        </p:txBody>
+      </p:sp>
+      <p:sp>
+        <p:nvSpPr>
+          <p:cNvPr id="3" name="CasellaDiTesto 2">
+            <a:extLst>
+              <a:ext uri="{FF2B5EF4-FFF2-40B4-BE49-F238E27FC236}">
+                <a16:creationId xmlns:a16="http://schemas.microsoft.com/office/drawing/2014/main" id="{EA4F199A-B874-EBCB-40CC-98A2A2031258}"/>
+              </a:ext>
+            </a:extLst>
+          </p:cNvPr>
+          <p:cNvSpPr txBox="1"/>
+          <p:nvPr/>
+        </p:nvSpPr>
+        <p:spPr>
+          <a:xfrm>
+            <a:off x="709056" y="1582284"/>
+            <a:ext cx="6912022" cy="1077218"/>
+          </a:xfrm>
+          <a:prstGeom prst="rect">
+            <a:avLst/>
+          </a:prstGeom>
+          <a:noFill/>
+        </p:spPr>
+        <p:txBody>
+          <a:bodyPr wrap="square" rtlCol="0">
+            <a:spAutoFit/>
+          </a:bodyPr>
+          <a:lstStyle/>
+          <a:p>
+            <a:r>
+              <a:rPr lang="it-IT" sz="1600" b="1" dirty="0"/>
+              <a:t>SETUP</a:t>
+            </a:r>
+            <a:r>
+              <a:rPr lang="it-IT" sz="1600" dirty="0"/>
+              <a:t>:   </a:t>
+            </a:r>
+          </a:p>
+          <a:p>
+            <a:pPr marL="285750" indent="-285750">
+              <a:buFont typeface="Arial" panose="020B0604020202020204" pitchFamily="34" charset="0"/>
+              <a:buChar char="•"/>
+            </a:pPr>
+            <a:r>
+              <a:rPr lang="it-IT" sz="1600" dirty="0"/>
+              <a:t>3 </a:t>
+            </a:r>
+            <a:r>
+              <a:rPr lang="it-IT" sz="1600" dirty="0" err="1"/>
+              <a:t>Bidders</a:t>
+            </a:r>
+            <a:r>
+              <a:rPr lang="it-IT" sz="1600" dirty="0"/>
+              <a:t> per </a:t>
+            </a:r>
+            <a:r>
+              <a:rPr lang="it-IT" sz="1600" dirty="0" err="1"/>
+              <a:t>type</a:t>
+            </a:r>
+            <a:endParaRPr lang="it-IT" sz="1600" dirty="0"/>
+          </a:p>
+          <a:p>
+            <a:pPr marL="285750" indent="-285750">
+              <a:buFont typeface="Arial" panose="020B0604020202020204" pitchFamily="34" charset="0"/>
+              <a:buChar char="•"/>
+            </a:pPr>
+            <a:r>
+              <a:rPr lang="it-IT" sz="1600" dirty="0"/>
+              <a:t>3 Slots</a:t>
+            </a:r>
+          </a:p>
+          <a:p>
+            <a:pPr marL="285750" indent="-285750">
+              <a:buFont typeface="Arial" panose="020B0604020202020204" pitchFamily="34" charset="0"/>
+              <a:buChar char="•"/>
+            </a:pPr>
+            <a:r>
+              <a:rPr lang="it-IT" sz="1600" dirty="0"/>
+              <a:t>Budget:     B = 750</a:t>
+            </a:r>
+          </a:p>
+        </p:txBody>
+      </p:sp>
+    </p:spTree>
+    <p:extLst>
+      <p:ext uri="{BB962C8B-B14F-4D97-AF65-F5344CB8AC3E}">
+        <p14:creationId xmlns:p14="http://schemas.microsoft.com/office/powerpoint/2010/main" val="56105611"/>
+      </p:ext>
+    </p:extLst>
+  </p:cSld>
+  <p:clrMapOvr>
+    <a:masterClrMapping/>
+  </p:clrMapOvr>
+</p:sld>
+</file>
+
+<file path=ppt/slides/slide23.xml><?xml version="1.0" encoding="utf-8"?>
+<p:sld xmlns:a="http://schemas.openxmlformats.org/drawingml/2006/main" xmlns:r="http://schemas.openxmlformats.org/officeDocument/2006/relationships" xmlns:p="http://schemas.openxmlformats.org/presentationml/2006/main">
+  <p:cSld>
+    <p:spTree>
+      <p:nvGrpSpPr>
+        <p:cNvPr id="1" name=""/>
+        <p:cNvGrpSpPr/>
+        <p:nvPr/>
+      </p:nvGrpSpPr>
+      <p:grpSpPr>
+        <a:xfrm>
+          <a:off x="0" y="0"/>
+          <a:ext cx="0" cy="0"/>
+          <a:chOff x="0" y="0"/>
+          <a:chExt cx="0" cy="0"/>
+        </a:xfrm>
+      </p:grpSpPr>
+      <p:sp>
+        <p:nvSpPr>
+          <p:cNvPr id="2" name="Titolo 1">
+            <a:extLst>
+              <a:ext uri="{FF2B5EF4-FFF2-40B4-BE49-F238E27FC236}">
+                <a16:creationId xmlns:a16="http://schemas.microsoft.com/office/drawing/2014/main" id="{3D70F780-9E2F-64BB-5AAC-2FA2D1417F89}"/>
+              </a:ext>
+            </a:extLst>
+          </p:cNvPr>
+          <p:cNvSpPr>
+            <a:spLocks noGrp="1"/>
+          </p:cNvSpPr>
+          <p:nvPr>
+            <p:ph type="title"/>
+          </p:nvPr>
+        </p:nvSpPr>
+        <p:spPr>
+          <a:xfrm>
+            <a:off x="2198696" y="289778"/>
+            <a:ext cx="7794607" cy="722594"/>
+          </a:xfrm>
+          <a:solidFill>
+            <a:schemeClr val="accent2">
+              <a:lumMod val="20000"/>
+              <a:lumOff val="80000"/>
+            </a:schemeClr>
+          </a:solidFill>
+        </p:spPr>
+        <p:txBody>
+          <a:bodyPr>
+            <a:normAutofit fontScale="90000"/>
+          </a:bodyPr>
+          <a:lstStyle/>
+          <a:p>
+            <a:r>
+              <a:rPr lang="it-IT" b="1" dirty="0">
+                <a:latin typeface="ACADEMY ENGRAVED LET PLAIN:1.0" panose="02000000000000000000" pitchFamily="2" charset="0"/>
+              </a:rPr>
+              <a:t>MORE SLOTS CASE</a:t>
+            </a:r>
+          </a:p>
+        </p:txBody>
+      </p:sp>
+      <p:sp>
+        <p:nvSpPr>
+          <p:cNvPr id="3" name="CasellaDiTesto 2">
+            <a:extLst>
+              <a:ext uri="{FF2B5EF4-FFF2-40B4-BE49-F238E27FC236}">
+                <a16:creationId xmlns:a16="http://schemas.microsoft.com/office/drawing/2014/main" id="{EA4F199A-B874-EBCB-40CC-98A2A2031258}"/>
+              </a:ext>
+            </a:extLst>
+          </p:cNvPr>
+          <p:cNvSpPr txBox="1"/>
+          <p:nvPr/>
+        </p:nvSpPr>
+        <p:spPr>
+          <a:xfrm>
+            <a:off x="709056" y="1582284"/>
+            <a:ext cx="6912022" cy="1077218"/>
+          </a:xfrm>
+          <a:prstGeom prst="rect">
+            <a:avLst/>
+          </a:prstGeom>
+          <a:noFill/>
+        </p:spPr>
+        <p:txBody>
+          <a:bodyPr wrap="square" rtlCol="0">
+            <a:spAutoFit/>
+          </a:bodyPr>
+          <a:lstStyle/>
+          <a:p>
+            <a:r>
+              <a:rPr lang="it-IT" sz="1600" b="1" dirty="0"/>
+              <a:t>SETUP</a:t>
+            </a:r>
+            <a:r>
+              <a:rPr lang="it-IT" sz="1600" dirty="0"/>
+              <a:t>:   </a:t>
+            </a:r>
+          </a:p>
+          <a:p>
+            <a:pPr marL="285750" indent="-285750">
+              <a:buFont typeface="Arial" panose="020B0604020202020204" pitchFamily="34" charset="0"/>
+              <a:buChar char="•"/>
+            </a:pPr>
+            <a:r>
+              <a:rPr lang="it-IT" sz="1600" dirty="0"/>
+              <a:t>3 </a:t>
+            </a:r>
+            <a:r>
+              <a:rPr lang="it-IT" sz="1600" dirty="0" err="1"/>
+              <a:t>Bidders</a:t>
+            </a:r>
+            <a:r>
+              <a:rPr lang="it-IT" sz="1600" dirty="0"/>
+              <a:t> per </a:t>
+            </a:r>
+            <a:r>
+              <a:rPr lang="it-IT" sz="1600" dirty="0" err="1"/>
+              <a:t>type</a:t>
+            </a:r>
+            <a:endParaRPr lang="it-IT" sz="1600" dirty="0"/>
+          </a:p>
+          <a:p>
+            <a:pPr marL="285750" indent="-285750">
+              <a:buFont typeface="Arial" panose="020B0604020202020204" pitchFamily="34" charset="0"/>
+              <a:buChar char="•"/>
+            </a:pPr>
+            <a:r>
+              <a:rPr lang="it-IT" sz="1600" dirty="0"/>
+              <a:t>10 Slots</a:t>
+            </a:r>
+          </a:p>
+          <a:p>
+            <a:pPr marL="285750" indent="-285750">
+              <a:buFont typeface="Arial" panose="020B0604020202020204" pitchFamily="34" charset="0"/>
+              <a:buChar char="•"/>
+            </a:pPr>
+            <a:r>
+              <a:rPr lang="it-IT" sz="1600" dirty="0"/>
+              <a:t>Budget:     B = 250</a:t>
+            </a:r>
+          </a:p>
+        </p:txBody>
+      </p:sp>
+    </p:spTree>
+    <p:extLst>
+      <p:ext uri="{BB962C8B-B14F-4D97-AF65-F5344CB8AC3E}">
+        <p14:creationId xmlns:p14="http://schemas.microsoft.com/office/powerpoint/2010/main" val="677865895"/>
       </p:ext>
     </p:extLst>
   </p:cSld>
@@ -8040,24 +9779,740 @@
       </p:grpSpPr>
       <p:sp>
         <p:nvSpPr>
-          <p:cNvPr id="2" name="Titolo 1">
+          <p:cNvPr id="6" name="Rettangolo 5">
             <a:extLst>
               <a:ext uri="{FF2B5EF4-FFF2-40B4-BE49-F238E27FC236}">
-                <a16:creationId xmlns:a16="http://schemas.microsoft.com/office/drawing/2014/main" id="{3D70F780-9E2F-64BB-5AAC-2FA2D1417F89}"/>
+                <a16:creationId xmlns:a16="http://schemas.microsoft.com/office/drawing/2014/main" id="{AA219B29-59DF-DB9A-72BA-9CF3DA4BE034}"/>
               </a:ext>
             </a:extLst>
           </p:cNvPr>
-          <p:cNvSpPr>
-            <a:spLocks noGrp="1"/>
-          </p:cNvSpPr>
-          <p:nvPr>
-            <p:ph type="title"/>
-          </p:nvPr>
+          <p:cNvSpPr/>
+          <p:nvPr/>
         </p:nvSpPr>
         <p:spPr>
           <a:xfrm>
-            <a:off x="2198696" y="289778"/>
-            <a:ext cx="7794607" cy="722594"/>
+            <a:off x="2285998" y="1807027"/>
+            <a:ext cx="2318659" cy="1415145"/>
+          </a:xfrm>
+          <a:prstGeom prst="rect">
+            <a:avLst/>
+          </a:prstGeom>
+          <a:solidFill>
+            <a:schemeClr val="accent2">
+              <a:lumMod val="60000"/>
+              <a:lumOff val="40000"/>
+            </a:schemeClr>
+          </a:solidFill>
+        </p:spPr>
+        <p:style>
+          <a:lnRef idx="2">
+            <a:schemeClr val="accent1">
+              <a:shade val="15000"/>
+            </a:schemeClr>
+          </a:lnRef>
+          <a:fillRef idx="1">
+            <a:schemeClr val="accent1"/>
+          </a:fillRef>
+          <a:effectRef idx="0">
+            <a:schemeClr val="accent1"/>
+          </a:effectRef>
+          <a:fontRef idx="minor">
+            <a:schemeClr val="lt1"/>
+          </a:fontRef>
+        </p:style>
+        <p:txBody>
+          <a:bodyPr rtlCol="0" anchor="ctr"/>
+          <a:lstStyle/>
+          <a:p>
+            <a:pPr algn="ctr"/>
+            <a:endParaRPr lang="it-IT" dirty="0"/>
+          </a:p>
+        </p:txBody>
+      </p:sp>
+      <p:sp>
+        <p:nvSpPr>
+          <p:cNvPr id="7" name="Rettangolo 6">
+            <a:extLst>
+              <a:ext uri="{FF2B5EF4-FFF2-40B4-BE49-F238E27FC236}">
+                <a16:creationId xmlns:a16="http://schemas.microsoft.com/office/drawing/2014/main" id="{4BE1844D-47F4-168C-95DA-3A5815B5ED14}"/>
+              </a:ext>
+            </a:extLst>
+          </p:cNvPr>
+          <p:cNvSpPr/>
+          <p:nvPr/>
+        </p:nvSpPr>
+        <p:spPr>
+          <a:xfrm>
+            <a:off x="5350155" y="4375630"/>
+            <a:ext cx="2188026" cy="1533491"/>
+          </a:xfrm>
+          <a:prstGeom prst="rect">
+            <a:avLst/>
+          </a:prstGeom>
+          <a:solidFill>
+            <a:schemeClr val="accent2">
+              <a:lumMod val="60000"/>
+              <a:lumOff val="40000"/>
+            </a:schemeClr>
+          </a:solidFill>
+        </p:spPr>
+        <p:style>
+          <a:lnRef idx="2">
+            <a:schemeClr val="accent1">
+              <a:shade val="15000"/>
+            </a:schemeClr>
+          </a:lnRef>
+          <a:fillRef idx="1">
+            <a:schemeClr val="accent1"/>
+          </a:fillRef>
+          <a:effectRef idx="0">
+            <a:schemeClr val="accent1"/>
+          </a:effectRef>
+          <a:fontRef idx="minor">
+            <a:schemeClr val="lt1"/>
+          </a:fontRef>
+        </p:style>
+        <p:txBody>
+          <a:bodyPr rtlCol="0" anchor="ctr"/>
+          <a:lstStyle/>
+          <a:p>
+            <a:pPr algn="ctr"/>
+            <a:endParaRPr lang="it-IT" dirty="0"/>
+          </a:p>
+        </p:txBody>
+      </p:sp>
+      <p:sp>
+        <p:nvSpPr>
+          <p:cNvPr id="8" name="Rettangolo 7">
+            <a:extLst>
+              <a:ext uri="{FF2B5EF4-FFF2-40B4-BE49-F238E27FC236}">
+                <a16:creationId xmlns:a16="http://schemas.microsoft.com/office/drawing/2014/main" id="{4ACFB1BB-D48E-AD9D-7EBA-FB1CCCC7D8C4}"/>
+              </a:ext>
+            </a:extLst>
+          </p:cNvPr>
+          <p:cNvSpPr/>
+          <p:nvPr/>
+        </p:nvSpPr>
+        <p:spPr>
+          <a:xfrm>
+            <a:off x="2416629" y="2416628"/>
+            <a:ext cx="881743" cy="511629"/>
+          </a:xfrm>
+          <a:prstGeom prst="rect">
+            <a:avLst/>
+          </a:prstGeom>
+          <a:solidFill>
+            <a:schemeClr val="accent2">
+              <a:lumMod val="40000"/>
+              <a:lumOff val="60000"/>
+            </a:schemeClr>
+          </a:solidFill>
+          <a:ln>
+            <a:noFill/>
+          </a:ln>
+        </p:spPr>
+        <p:style>
+          <a:lnRef idx="2">
+            <a:schemeClr val="accent1">
+              <a:shade val="15000"/>
+            </a:schemeClr>
+          </a:lnRef>
+          <a:fillRef idx="1">
+            <a:schemeClr val="accent1"/>
+          </a:fillRef>
+          <a:effectRef idx="0">
+            <a:schemeClr val="accent1"/>
+          </a:effectRef>
+          <a:fontRef idx="minor">
+            <a:schemeClr val="lt1"/>
+          </a:fontRef>
+        </p:style>
+        <p:txBody>
+          <a:bodyPr rtlCol="0" anchor="ctr"/>
+          <a:lstStyle/>
+          <a:p>
+            <a:pPr algn="ctr"/>
+            <a:r>
+              <a:rPr lang="it-IT" i="1" dirty="0">
+                <a:solidFill>
+                  <a:schemeClr val="tx1"/>
+                </a:solidFill>
+              </a:rPr>
+              <a:t>pricing</a:t>
+            </a:r>
+          </a:p>
+          <a:p>
+            <a:pPr algn="ctr"/>
+            <a:r>
+              <a:rPr lang="it-IT" i="1" dirty="0">
+                <a:solidFill>
+                  <a:schemeClr val="tx1"/>
+                </a:solidFill>
+              </a:rPr>
+              <a:t>agent</a:t>
+            </a:r>
+          </a:p>
+        </p:txBody>
+      </p:sp>
+      <p:sp>
+        <p:nvSpPr>
+          <p:cNvPr id="9" name="Rettangolo 8">
+            <a:extLst>
+              <a:ext uri="{FF2B5EF4-FFF2-40B4-BE49-F238E27FC236}">
+                <a16:creationId xmlns:a16="http://schemas.microsoft.com/office/drawing/2014/main" id="{F2E65424-F607-A670-1172-B9A08B899FC1}"/>
+              </a:ext>
+            </a:extLst>
+          </p:cNvPr>
+          <p:cNvSpPr/>
+          <p:nvPr/>
+        </p:nvSpPr>
+        <p:spPr>
+          <a:xfrm>
+            <a:off x="3526971" y="2416627"/>
+            <a:ext cx="881743" cy="511629"/>
+          </a:xfrm>
+          <a:prstGeom prst="rect">
+            <a:avLst/>
+          </a:prstGeom>
+          <a:solidFill>
+            <a:schemeClr val="accent2">
+              <a:lumMod val="40000"/>
+              <a:lumOff val="60000"/>
+            </a:schemeClr>
+          </a:solidFill>
+          <a:ln>
+            <a:noFill/>
+          </a:ln>
+        </p:spPr>
+        <p:style>
+          <a:lnRef idx="2">
+            <a:schemeClr val="accent1">
+              <a:shade val="15000"/>
+            </a:schemeClr>
+          </a:lnRef>
+          <a:fillRef idx="1">
+            <a:schemeClr val="accent1"/>
+          </a:fillRef>
+          <a:effectRef idx="0">
+            <a:schemeClr val="accent1"/>
+          </a:effectRef>
+          <a:fontRef idx="minor">
+            <a:schemeClr val="lt1"/>
+          </a:fontRef>
+        </p:style>
+        <p:txBody>
+          <a:bodyPr rtlCol="0" anchor="ctr"/>
+          <a:lstStyle/>
+          <a:p>
+            <a:pPr algn="ctr"/>
+            <a:r>
+              <a:rPr lang="it-IT" i="1" dirty="0">
+                <a:solidFill>
+                  <a:schemeClr val="tx1"/>
+                </a:solidFill>
+              </a:rPr>
+              <a:t>bidding agent</a:t>
+            </a:r>
+          </a:p>
+        </p:txBody>
+      </p:sp>
+      <p:sp>
+        <p:nvSpPr>
+          <p:cNvPr id="10" name="Rettangolo 9">
+            <a:extLst>
+              <a:ext uri="{FF2B5EF4-FFF2-40B4-BE49-F238E27FC236}">
+                <a16:creationId xmlns:a16="http://schemas.microsoft.com/office/drawing/2014/main" id="{455591E2-B2F3-F946-5B1C-46770BF9CCFA}"/>
+              </a:ext>
+            </a:extLst>
+          </p:cNvPr>
+          <p:cNvSpPr/>
+          <p:nvPr/>
+        </p:nvSpPr>
+        <p:spPr>
+          <a:xfrm>
+            <a:off x="2416629" y="1926772"/>
+            <a:ext cx="2100942" cy="250371"/>
+          </a:xfrm>
+          <a:prstGeom prst="rect">
+            <a:avLst/>
+          </a:prstGeom>
+          <a:solidFill>
+            <a:schemeClr val="accent2">
+              <a:lumMod val="60000"/>
+              <a:lumOff val="40000"/>
+            </a:schemeClr>
+          </a:solidFill>
+          <a:ln>
+            <a:noFill/>
+          </a:ln>
+        </p:spPr>
+        <p:style>
+          <a:lnRef idx="2">
+            <a:schemeClr val="accent1">
+              <a:shade val="15000"/>
+            </a:schemeClr>
+          </a:lnRef>
+          <a:fillRef idx="1">
+            <a:schemeClr val="accent1"/>
+          </a:fillRef>
+          <a:effectRef idx="0">
+            <a:schemeClr val="accent1"/>
+          </a:effectRef>
+          <a:fontRef idx="minor">
+            <a:schemeClr val="lt1"/>
+          </a:fontRef>
+        </p:style>
+        <p:txBody>
+          <a:bodyPr rtlCol="0" anchor="ctr"/>
+          <a:lstStyle/>
+          <a:p>
+            <a:pPr algn="ctr"/>
+            <a:r>
+              <a:rPr lang="it-IT" dirty="0">
+                <a:solidFill>
+                  <a:schemeClr val="tx1"/>
+                </a:solidFill>
+              </a:rPr>
+              <a:t>COMPANY</a:t>
+            </a:r>
+          </a:p>
+        </p:txBody>
+      </p:sp>
+      <p:sp>
+        <p:nvSpPr>
+          <p:cNvPr id="17" name="Rettangolo 16">
+            <a:extLst>
+              <a:ext uri="{FF2B5EF4-FFF2-40B4-BE49-F238E27FC236}">
+                <a16:creationId xmlns:a16="http://schemas.microsoft.com/office/drawing/2014/main" id="{8D6E882F-4628-EBA7-826D-2CD48792C435}"/>
+              </a:ext>
+            </a:extLst>
+          </p:cNvPr>
+          <p:cNvSpPr/>
+          <p:nvPr/>
+        </p:nvSpPr>
+        <p:spPr>
+          <a:xfrm>
+            <a:off x="5633183" y="4599236"/>
+            <a:ext cx="1621971" cy="333995"/>
+          </a:xfrm>
+          <a:prstGeom prst="rect">
+            <a:avLst/>
+          </a:prstGeom>
+          <a:solidFill>
+            <a:schemeClr val="accent2">
+              <a:lumMod val="60000"/>
+              <a:lumOff val="40000"/>
+            </a:schemeClr>
+          </a:solidFill>
+          <a:ln>
+            <a:noFill/>
+          </a:ln>
+        </p:spPr>
+        <p:style>
+          <a:lnRef idx="2">
+            <a:schemeClr val="accent1">
+              <a:shade val="15000"/>
+            </a:schemeClr>
+          </a:lnRef>
+          <a:fillRef idx="1">
+            <a:schemeClr val="accent1"/>
+          </a:fillRef>
+          <a:effectRef idx="0">
+            <a:schemeClr val="accent1"/>
+          </a:effectRef>
+          <a:fontRef idx="minor">
+            <a:schemeClr val="lt1"/>
+          </a:fontRef>
+        </p:style>
+        <p:txBody>
+          <a:bodyPr rtlCol="0" anchor="ctr"/>
+          <a:lstStyle/>
+          <a:p>
+            <a:pPr algn="ctr"/>
+            <a:r>
+              <a:rPr lang="it-IT" dirty="0">
+                <a:solidFill>
+                  <a:schemeClr val="tx1"/>
+                </a:solidFill>
+              </a:rPr>
+              <a:t>PUBLISHER</a:t>
+            </a:r>
+          </a:p>
+        </p:txBody>
+      </p:sp>
+      <p:sp>
+        <p:nvSpPr>
+          <p:cNvPr id="18" name="Rettangolo 17">
+            <a:extLst>
+              <a:ext uri="{FF2B5EF4-FFF2-40B4-BE49-F238E27FC236}">
+                <a16:creationId xmlns:a16="http://schemas.microsoft.com/office/drawing/2014/main" id="{E03FB275-C57F-17F3-E835-D21432989A78}"/>
+              </a:ext>
+            </a:extLst>
+          </p:cNvPr>
+          <p:cNvSpPr/>
+          <p:nvPr/>
+        </p:nvSpPr>
+        <p:spPr>
+          <a:xfrm>
+            <a:off x="5714825" y="5142375"/>
+            <a:ext cx="1458685" cy="522514"/>
+          </a:xfrm>
+          <a:prstGeom prst="rect">
+            <a:avLst/>
+          </a:prstGeom>
+          <a:solidFill>
+            <a:schemeClr val="accent2">
+              <a:lumMod val="40000"/>
+              <a:lumOff val="60000"/>
+            </a:schemeClr>
+          </a:solidFill>
+          <a:ln>
+            <a:noFill/>
+          </a:ln>
+        </p:spPr>
+        <p:style>
+          <a:lnRef idx="2">
+            <a:schemeClr val="accent1">
+              <a:shade val="15000"/>
+            </a:schemeClr>
+          </a:lnRef>
+          <a:fillRef idx="1">
+            <a:schemeClr val="accent1"/>
+          </a:fillRef>
+          <a:effectRef idx="0">
+            <a:schemeClr val="accent1"/>
+          </a:effectRef>
+          <a:fontRef idx="minor">
+            <a:schemeClr val="lt1"/>
+          </a:fontRef>
+        </p:style>
+        <p:txBody>
+          <a:bodyPr rtlCol="0" anchor="ctr"/>
+          <a:lstStyle/>
+          <a:p>
+            <a:pPr algn="ctr"/>
+            <a:r>
+              <a:rPr lang="it-IT" i="1" dirty="0">
+                <a:solidFill>
+                  <a:schemeClr val="tx1"/>
+                </a:solidFill>
+              </a:rPr>
+              <a:t>auction</a:t>
+            </a:r>
+          </a:p>
+        </p:txBody>
+      </p:sp>
+      <p:sp>
+        <p:nvSpPr>
+          <p:cNvPr id="19" name="Ovale 18">
+            <a:extLst>
+              <a:ext uri="{FF2B5EF4-FFF2-40B4-BE49-F238E27FC236}">
+                <a16:creationId xmlns:a16="http://schemas.microsoft.com/office/drawing/2014/main" id="{06C03A86-7F3A-6FB8-F298-A8A860B9FBDB}"/>
+              </a:ext>
+            </a:extLst>
+          </p:cNvPr>
+          <p:cNvSpPr/>
+          <p:nvPr/>
+        </p:nvSpPr>
+        <p:spPr>
+          <a:xfrm>
+            <a:off x="2383973" y="4319199"/>
+            <a:ext cx="2019300" cy="1387927"/>
+          </a:xfrm>
+          <a:prstGeom prst="ellipse">
+            <a:avLst/>
+          </a:prstGeom>
+          <a:solidFill>
+            <a:schemeClr val="accent2">
+              <a:lumMod val="60000"/>
+              <a:lumOff val="40000"/>
+            </a:schemeClr>
+          </a:solidFill>
+        </p:spPr>
+        <p:style>
+          <a:lnRef idx="2">
+            <a:schemeClr val="accent1">
+              <a:shade val="15000"/>
+            </a:schemeClr>
+          </a:lnRef>
+          <a:fillRef idx="1">
+            <a:schemeClr val="accent1"/>
+          </a:fillRef>
+          <a:effectRef idx="0">
+            <a:schemeClr val="accent1"/>
+          </a:effectRef>
+          <a:fontRef idx="minor">
+            <a:schemeClr val="lt1"/>
+          </a:fontRef>
+        </p:style>
+        <p:txBody>
+          <a:bodyPr rtlCol="0" anchor="ctr"/>
+          <a:lstStyle/>
+          <a:p>
+            <a:pPr algn="ctr"/>
+            <a:r>
+              <a:rPr lang="it-IT" dirty="0">
+                <a:solidFill>
+                  <a:schemeClr val="tx1"/>
+                </a:solidFill>
+              </a:rPr>
+              <a:t>pricing environment</a:t>
+            </a:r>
+          </a:p>
+        </p:txBody>
+      </p:sp>
+      <p:sp>
+        <p:nvSpPr>
+          <p:cNvPr id="20" name="Ovale 19">
+            <a:extLst>
+              <a:ext uri="{FF2B5EF4-FFF2-40B4-BE49-F238E27FC236}">
+                <a16:creationId xmlns:a16="http://schemas.microsoft.com/office/drawing/2014/main" id="{D7E47BB5-9122-C640-21FD-CBDEC25D928F}"/>
+              </a:ext>
+            </a:extLst>
+          </p:cNvPr>
+          <p:cNvSpPr/>
+          <p:nvPr/>
+        </p:nvSpPr>
+        <p:spPr>
+          <a:xfrm>
+            <a:off x="8376560" y="1701830"/>
+            <a:ext cx="2188025" cy="1429594"/>
+          </a:xfrm>
+          <a:prstGeom prst="ellipse">
+            <a:avLst/>
+          </a:prstGeom>
+          <a:solidFill>
+            <a:schemeClr val="accent2">
+              <a:lumMod val="60000"/>
+              <a:lumOff val="40000"/>
+            </a:schemeClr>
+          </a:solidFill>
+        </p:spPr>
+        <p:style>
+          <a:lnRef idx="2">
+            <a:schemeClr val="accent1">
+              <a:shade val="15000"/>
+            </a:schemeClr>
+          </a:lnRef>
+          <a:fillRef idx="1">
+            <a:schemeClr val="accent1"/>
+          </a:fillRef>
+          <a:effectRef idx="0">
+            <a:schemeClr val="accent1"/>
+          </a:effectRef>
+          <a:fontRef idx="minor">
+            <a:schemeClr val="lt1"/>
+          </a:fontRef>
+        </p:style>
+        <p:txBody>
+          <a:bodyPr rtlCol="0" anchor="ctr"/>
+          <a:lstStyle/>
+          <a:p>
+            <a:pPr algn="ctr"/>
+            <a:r>
+              <a:rPr lang="it-IT" dirty="0">
+                <a:solidFill>
+                  <a:schemeClr val="tx1"/>
+                </a:solidFill>
+              </a:rPr>
+              <a:t>bidding environment</a:t>
+            </a:r>
+          </a:p>
+          <a:p>
+            <a:pPr algn="ctr"/>
+            <a:r>
+              <a:rPr lang="it-IT" dirty="0">
+                <a:solidFill>
+                  <a:schemeClr val="tx1"/>
+                </a:solidFill>
+              </a:rPr>
+              <a:t>(competitors)</a:t>
+            </a:r>
+          </a:p>
+        </p:txBody>
+      </p:sp>
+      <p:sp>
+        <p:nvSpPr>
+          <p:cNvPr id="23" name="Freccia bidirezionale orizzontale 22">
+            <a:extLst>
+              <a:ext uri="{FF2B5EF4-FFF2-40B4-BE49-F238E27FC236}">
+                <a16:creationId xmlns:a16="http://schemas.microsoft.com/office/drawing/2014/main" id="{B17BA574-17AE-9F91-1D07-9764E0744447}"/>
+              </a:ext>
+            </a:extLst>
+          </p:cNvPr>
+          <p:cNvSpPr/>
+          <p:nvPr/>
+        </p:nvSpPr>
+        <p:spPr>
+          <a:xfrm rot="15575544">
+            <a:off x="2313654" y="3664589"/>
+            <a:ext cx="1528563" cy="167493"/>
+          </a:xfrm>
+          <a:prstGeom prst="leftRightArrow">
+            <a:avLst/>
+          </a:prstGeom>
+          <a:solidFill>
+            <a:schemeClr val="accent2">
+              <a:lumMod val="75000"/>
+            </a:schemeClr>
+          </a:solidFill>
+          <a:ln>
+            <a:noFill/>
+          </a:ln>
+        </p:spPr>
+        <p:style>
+          <a:lnRef idx="2">
+            <a:schemeClr val="accent1">
+              <a:shade val="15000"/>
+            </a:schemeClr>
+          </a:lnRef>
+          <a:fillRef idx="1">
+            <a:schemeClr val="accent1"/>
+          </a:fillRef>
+          <a:effectRef idx="0">
+            <a:schemeClr val="accent1"/>
+          </a:effectRef>
+          <a:fontRef idx="minor">
+            <a:schemeClr val="lt1"/>
+          </a:fontRef>
+        </p:style>
+        <p:txBody>
+          <a:bodyPr rtlCol="0" anchor="ctr"/>
+          <a:lstStyle/>
+          <a:p>
+            <a:pPr algn="ctr"/>
+            <a:endParaRPr lang="it-IT"/>
+          </a:p>
+        </p:txBody>
+      </p:sp>
+      <p:sp>
+        <p:nvSpPr>
+          <p:cNvPr id="24" name="Freccia bidirezionale orizzontale 23">
+            <a:extLst>
+              <a:ext uri="{FF2B5EF4-FFF2-40B4-BE49-F238E27FC236}">
+                <a16:creationId xmlns:a16="http://schemas.microsoft.com/office/drawing/2014/main" id="{F474D4BD-AE5E-E54E-6882-1ABFB706CB37}"/>
+              </a:ext>
+            </a:extLst>
+          </p:cNvPr>
+          <p:cNvSpPr/>
+          <p:nvPr/>
+        </p:nvSpPr>
+        <p:spPr>
+          <a:xfrm rot="13581977">
+            <a:off x="3967572" y="3692242"/>
+            <a:ext cx="2199281" cy="174519"/>
+          </a:xfrm>
+          <a:prstGeom prst="leftRightArrow">
+            <a:avLst/>
+          </a:prstGeom>
+          <a:solidFill>
+            <a:schemeClr val="accent2">
+              <a:lumMod val="75000"/>
+            </a:schemeClr>
+          </a:solidFill>
+          <a:ln>
+            <a:noFill/>
+          </a:ln>
+        </p:spPr>
+        <p:style>
+          <a:lnRef idx="2">
+            <a:schemeClr val="accent1">
+              <a:shade val="15000"/>
+            </a:schemeClr>
+          </a:lnRef>
+          <a:fillRef idx="1">
+            <a:schemeClr val="accent1"/>
+          </a:fillRef>
+          <a:effectRef idx="0">
+            <a:schemeClr val="accent1"/>
+          </a:effectRef>
+          <a:fontRef idx="minor">
+            <a:schemeClr val="lt1"/>
+          </a:fontRef>
+        </p:style>
+        <p:txBody>
+          <a:bodyPr rtlCol="0" anchor="ctr"/>
+          <a:lstStyle/>
+          <a:p>
+            <a:pPr algn="ctr"/>
+            <a:endParaRPr lang="it-IT"/>
+          </a:p>
+        </p:txBody>
+      </p:sp>
+      <p:sp>
+        <p:nvSpPr>
+          <p:cNvPr id="26" name="Freccia su 25">
+            <a:extLst>
+              <a:ext uri="{FF2B5EF4-FFF2-40B4-BE49-F238E27FC236}">
+                <a16:creationId xmlns:a16="http://schemas.microsoft.com/office/drawing/2014/main" id="{93760571-4838-467E-2E10-2715CB577388}"/>
+              </a:ext>
+            </a:extLst>
+          </p:cNvPr>
+          <p:cNvSpPr/>
+          <p:nvPr/>
+        </p:nvSpPr>
+        <p:spPr>
+          <a:xfrm rot="13193897">
+            <a:off x="8091878" y="2888758"/>
+            <a:ext cx="166593" cy="1629728"/>
+          </a:xfrm>
+          <a:prstGeom prst="upArrow">
+            <a:avLst/>
+          </a:prstGeom>
+          <a:solidFill>
+            <a:schemeClr val="accent2">
+              <a:lumMod val="75000"/>
+            </a:schemeClr>
+          </a:solidFill>
+          <a:ln>
+            <a:noFill/>
+          </a:ln>
+        </p:spPr>
+        <p:style>
+          <a:lnRef idx="2">
+            <a:schemeClr val="accent1">
+              <a:shade val="15000"/>
+            </a:schemeClr>
+          </a:lnRef>
+          <a:fillRef idx="1">
+            <a:schemeClr val="accent1"/>
+          </a:fillRef>
+          <a:effectRef idx="0">
+            <a:schemeClr val="accent1"/>
+          </a:effectRef>
+          <a:fontRef idx="minor">
+            <a:schemeClr val="lt1"/>
+          </a:fontRef>
+        </p:style>
+        <p:txBody>
+          <a:bodyPr rtlCol="0" anchor="ctr"/>
+          <a:lstStyle/>
+          <a:p>
+            <a:pPr algn="ctr"/>
+            <a:endParaRPr lang="it-IT"/>
+          </a:p>
+        </p:txBody>
+      </p:sp>
+      <p:sp>
+        <p:nvSpPr>
+          <p:cNvPr id="27" name="Titolo 1">
+            <a:extLst>
+              <a:ext uri="{FF2B5EF4-FFF2-40B4-BE49-F238E27FC236}">
+                <a16:creationId xmlns:a16="http://schemas.microsoft.com/office/drawing/2014/main" id="{8B171363-6B38-AB60-B57E-BC101B9E8A32}"/>
+              </a:ext>
+            </a:extLst>
+          </p:cNvPr>
+          <p:cNvSpPr>
+            <a:spLocks noGrp="1"/>
+          </p:cNvSpPr>
+          <p:nvPr>
+            <p:ph type="title"/>
+          </p:nvPr>
+        </p:nvSpPr>
+        <p:spPr>
+          <a:xfrm>
+            <a:off x="2465220" y="182499"/>
+            <a:ext cx="7566007" cy="876178"/>
           </a:xfrm>
           <a:solidFill>
             <a:schemeClr val="accent2">
@@ -8067,433 +10522,14 @@
           </a:solidFill>
         </p:spPr>
         <p:txBody>
-          <a:bodyPr>
-            <a:normAutofit fontScale="90000"/>
-          </a:bodyPr>
-          <a:lstStyle/>
-          <a:p>
-            <a:r>
-              <a:rPr lang="it-IT" b="1" dirty="0" err="1">
-                <a:latin typeface="ACADEMY ENGRAVED LET PLAIN:1.0" panose="02000000000000000000" pitchFamily="2" charset="0"/>
-              </a:rPr>
-              <a:t>Requirement</a:t>
-            </a:r>
+          <a:bodyPr/>
+          <a:lstStyle/>
+          <a:p>
             <a:r>
               <a:rPr lang="it-IT" b="1" dirty="0">
                 <a:latin typeface="ACADEMY ENGRAVED LET PLAIN:1.0" panose="02000000000000000000" pitchFamily="2" charset="0"/>
               </a:rPr>
-              <a:t> 1</a:t>
-            </a:r>
-          </a:p>
-        </p:txBody>
-      </p:sp>
-      <p:sp>
-        <p:nvSpPr>
-          <p:cNvPr id="5" name="CasellaDiTesto 4">
-            <a:extLst>
-              <a:ext uri="{FF2B5EF4-FFF2-40B4-BE49-F238E27FC236}">
-                <a16:creationId xmlns:a16="http://schemas.microsoft.com/office/drawing/2014/main" id="{C4C1B873-5FA4-8C9C-F47D-CFE380B9EA7F}"/>
-              </a:ext>
-            </a:extLst>
-          </p:cNvPr>
-          <p:cNvSpPr txBox="1"/>
-          <p:nvPr/>
-        </p:nvSpPr>
-        <p:spPr>
-          <a:xfrm>
-            <a:off x="266699" y="1324299"/>
-            <a:ext cx="11658600" cy="338554"/>
-          </a:xfrm>
-          <a:prstGeom prst="rect">
-            <a:avLst/>
-          </a:prstGeom>
-          <a:noFill/>
-        </p:spPr>
-        <p:txBody>
-          <a:bodyPr wrap="square" rtlCol="0">
-            <a:spAutoFit/>
-          </a:bodyPr>
-          <a:lstStyle/>
-          <a:p>
-            <a:r>
-              <a:rPr lang="it-IT" sz="1600" b="1" dirty="0"/>
-              <a:t>BIDDING ENVIRONMENT </a:t>
-            </a:r>
-            <a:r>
-              <a:rPr lang="it-IT" sz="1600" dirty="0"/>
-              <a:t>(COMPETITORS) : </a:t>
-            </a:r>
-            <a:r>
-              <a:rPr lang="it-IT" sz="1600" dirty="0" err="1"/>
-              <a:t>Stochastic</a:t>
-            </a:r>
-            <a:r>
-              <a:rPr lang="it-IT" sz="1600" dirty="0"/>
-              <a:t> with </a:t>
-            </a:r>
-            <a:r>
-              <a:rPr lang="it-IT" sz="1600" dirty="0" err="1"/>
-              <a:t>uniformely</a:t>
-            </a:r>
-            <a:r>
-              <a:rPr lang="it-IT" sz="1600" dirty="0"/>
-              <a:t> </a:t>
-            </a:r>
-            <a:r>
-              <a:rPr lang="it-IT" sz="1600" dirty="0" err="1"/>
-              <a:t>distributed</a:t>
-            </a:r>
-            <a:r>
-              <a:rPr lang="it-IT" sz="1600" dirty="0"/>
-              <a:t> </a:t>
-            </a:r>
-            <a:r>
-              <a:rPr lang="it-IT" sz="1600" dirty="0" err="1"/>
-              <a:t>bids</a:t>
-            </a:r>
-            <a:r>
-              <a:rPr lang="it-IT" sz="1600" dirty="0"/>
-              <a:t> </a:t>
-            </a:r>
-          </a:p>
-        </p:txBody>
-      </p:sp>
-      <p:sp>
-        <p:nvSpPr>
-          <p:cNvPr id="6" name="CasellaDiTesto 5">
-            <a:extLst>
-              <a:ext uri="{FF2B5EF4-FFF2-40B4-BE49-F238E27FC236}">
-                <a16:creationId xmlns:a16="http://schemas.microsoft.com/office/drawing/2014/main" id="{6E07FF96-F0A8-65CB-86FB-5B8A0053D077}"/>
-              </a:ext>
-            </a:extLst>
-          </p:cNvPr>
-          <p:cNvSpPr txBox="1"/>
-          <p:nvPr/>
-        </p:nvSpPr>
-        <p:spPr>
-          <a:xfrm>
-            <a:off x="266700" y="2224368"/>
-            <a:ext cx="9367158" cy="830997"/>
-          </a:xfrm>
-          <a:prstGeom prst="rect">
-            <a:avLst/>
-          </a:prstGeom>
-          <a:noFill/>
-        </p:spPr>
-        <p:txBody>
-          <a:bodyPr wrap="square" rtlCol="0">
-            <a:spAutoFit/>
-          </a:bodyPr>
-          <a:lstStyle/>
-          <a:p>
-            <a:r>
-              <a:rPr lang="it-IT" sz="1600" b="1" dirty="0"/>
-              <a:t>PRICING ENVIRONMENT</a:t>
-            </a:r>
-            <a:r>
-              <a:rPr lang="it-IT" sz="1600" dirty="0"/>
-              <a:t> :   </a:t>
-            </a:r>
-            <a:r>
-              <a:rPr lang="it-IT" sz="1600" dirty="0" err="1"/>
-              <a:t>Stochastic</a:t>
-            </a:r>
-            <a:r>
-              <a:rPr lang="it-IT" sz="1600" dirty="0"/>
-              <a:t> with demands  </a:t>
-            </a:r>
-            <a:r>
-              <a:rPr lang="it-IT" sz="1600" dirty="0" err="1"/>
-              <a:t>sampled</a:t>
-            </a:r>
-            <a:r>
-              <a:rPr lang="it-IT" sz="1600" dirty="0"/>
-              <a:t> from a </a:t>
-            </a:r>
-            <a:r>
-              <a:rPr lang="it-IT" sz="1600" dirty="0" err="1"/>
-              <a:t>binomial</a:t>
-            </a:r>
-            <a:r>
-              <a:rPr lang="it-IT" sz="1600" dirty="0"/>
-              <a:t> </a:t>
-            </a:r>
-            <a:r>
-              <a:rPr lang="it-IT" sz="1600" dirty="0" err="1"/>
-              <a:t>distribution</a:t>
-            </a:r>
-            <a:r>
-              <a:rPr lang="it-IT" sz="1600" dirty="0"/>
-              <a:t> with success 					         </a:t>
-            </a:r>
-            <a:r>
-              <a:rPr lang="it-IT" sz="1600" dirty="0" err="1"/>
-              <a:t>probability</a:t>
-            </a:r>
-            <a:r>
-              <a:rPr lang="it-IT" sz="1600" dirty="0"/>
-              <a:t> </a:t>
-            </a:r>
-            <a:r>
-              <a:rPr lang="it-IT" sz="1600" dirty="0" err="1"/>
-              <a:t>given</a:t>
-            </a:r>
-            <a:r>
-              <a:rPr lang="it-IT" sz="1600" dirty="0"/>
-              <a:t> by the </a:t>
-            </a:r>
-            <a:r>
-              <a:rPr lang="it-IT" sz="1600" dirty="0" err="1"/>
-              <a:t>conversion</a:t>
-            </a:r>
-            <a:r>
-              <a:rPr lang="it-IT" sz="1600" dirty="0"/>
-              <a:t> rate (1-p) and </a:t>
-            </a:r>
-            <a:r>
-              <a:rPr lang="it-IT" sz="1600" dirty="0" err="1"/>
-              <a:t>number</a:t>
-            </a:r>
-            <a:r>
-              <a:rPr lang="it-IT" sz="1600" dirty="0"/>
-              <a:t> of trials </a:t>
-            </a:r>
-            <a:r>
-              <a:rPr lang="it-IT" sz="1600" dirty="0" err="1"/>
-              <a:t>equal</a:t>
-            </a:r>
-            <a:r>
-              <a:rPr lang="it-IT" sz="1600" dirty="0"/>
-              <a:t> to 							 the </a:t>
-            </a:r>
-            <a:r>
-              <a:rPr lang="it-IT" sz="1600" dirty="0" err="1"/>
-              <a:t>number</a:t>
-            </a:r>
-            <a:r>
-              <a:rPr lang="it-IT" sz="1600" dirty="0"/>
-              <a:t> of </a:t>
-            </a:r>
-            <a:r>
-              <a:rPr lang="it-IT" sz="1600" dirty="0" err="1"/>
-              <a:t>visits</a:t>
-            </a:r>
-            <a:r>
-              <a:rPr lang="it-IT" sz="1600" dirty="0"/>
-              <a:t> </a:t>
-            </a:r>
-            <a:r>
-              <a:rPr lang="it-IT" sz="1600" dirty="0" err="1"/>
-              <a:t>obtained</a:t>
-            </a:r>
-            <a:r>
-              <a:rPr lang="it-IT" sz="1600" dirty="0"/>
-              <a:t> in the bidding interaction </a:t>
-            </a:r>
-          </a:p>
-        </p:txBody>
-      </p:sp>
-      <p:sp>
-        <p:nvSpPr>
-          <p:cNvPr id="7" name="CasellaDiTesto 6">
-            <a:extLst>
-              <a:ext uri="{FF2B5EF4-FFF2-40B4-BE49-F238E27FC236}">
-                <a16:creationId xmlns:a16="http://schemas.microsoft.com/office/drawing/2014/main" id="{FB2ACC41-C836-111F-7C3A-7789116239F8}"/>
-              </a:ext>
-            </a:extLst>
-          </p:cNvPr>
-          <p:cNvSpPr txBox="1"/>
-          <p:nvPr/>
-        </p:nvSpPr>
-        <p:spPr>
-          <a:xfrm>
-            <a:off x="266700" y="3536569"/>
-            <a:ext cx="9367158" cy="338554"/>
-          </a:xfrm>
-          <a:prstGeom prst="rect">
-            <a:avLst/>
-          </a:prstGeom>
-          <a:noFill/>
-        </p:spPr>
-        <p:txBody>
-          <a:bodyPr wrap="square" rtlCol="0">
-            <a:spAutoFit/>
-          </a:bodyPr>
-          <a:lstStyle/>
-          <a:p>
-            <a:r>
-              <a:rPr lang="it-IT" sz="1600" b="1" dirty="0"/>
-              <a:t>AUCTION TYPE:  			</a:t>
-            </a:r>
-            <a:r>
-              <a:rPr lang="it-IT" sz="1600" dirty="0"/>
-              <a:t>Second Price (</a:t>
-            </a:r>
-            <a:r>
-              <a:rPr lang="it-IT" sz="1600" dirty="0" err="1"/>
-              <a:t>Truthful</a:t>
-            </a:r>
-            <a:r>
-              <a:rPr lang="it-IT" sz="1600" dirty="0"/>
-              <a:t>) </a:t>
-            </a:r>
-          </a:p>
-        </p:txBody>
-      </p:sp>
-      <p:sp>
-        <p:nvSpPr>
-          <p:cNvPr id="8" name="CasellaDiTesto 7">
-            <a:extLst>
-              <a:ext uri="{FF2B5EF4-FFF2-40B4-BE49-F238E27FC236}">
-                <a16:creationId xmlns:a16="http://schemas.microsoft.com/office/drawing/2014/main" id="{F70A50A6-EEFF-7598-F6CD-4BAF488403FE}"/>
-              </a:ext>
-            </a:extLst>
-          </p:cNvPr>
-          <p:cNvSpPr txBox="1"/>
-          <p:nvPr/>
-        </p:nvSpPr>
-        <p:spPr>
-          <a:xfrm>
-            <a:off x="266700" y="4490677"/>
-            <a:ext cx="2106386" cy="338554"/>
-          </a:xfrm>
-          <a:prstGeom prst="rect">
-            <a:avLst/>
-          </a:prstGeom>
-          <a:noFill/>
-        </p:spPr>
-        <p:txBody>
-          <a:bodyPr wrap="square" rtlCol="0">
-            <a:spAutoFit/>
-          </a:bodyPr>
-          <a:lstStyle/>
-          <a:p>
-            <a:r>
-              <a:rPr lang="it-IT" sz="1600" b="1" dirty="0"/>
-              <a:t>BIDDING AGENTS: </a:t>
-            </a:r>
-            <a:endParaRPr lang="it-IT" sz="1600" dirty="0"/>
-          </a:p>
-        </p:txBody>
-      </p:sp>
-      <p:sp>
-        <p:nvSpPr>
-          <p:cNvPr id="9" name="CasellaDiTesto 8">
-            <a:extLst>
-              <a:ext uri="{FF2B5EF4-FFF2-40B4-BE49-F238E27FC236}">
-                <a16:creationId xmlns:a16="http://schemas.microsoft.com/office/drawing/2014/main" id="{89DED369-1ED4-2B9B-385B-68BD1A7959DA}"/>
-              </a:ext>
-            </a:extLst>
-          </p:cNvPr>
-          <p:cNvSpPr txBox="1"/>
-          <p:nvPr/>
-        </p:nvSpPr>
-        <p:spPr>
-          <a:xfrm>
-            <a:off x="2768943" y="4391193"/>
-            <a:ext cx="5078186" cy="584775"/>
-          </a:xfrm>
-          <a:prstGeom prst="rect">
-            <a:avLst/>
-          </a:prstGeom>
-          <a:noFill/>
-        </p:spPr>
-        <p:txBody>
-          <a:bodyPr wrap="square" rtlCol="0">
-            <a:spAutoFit/>
-          </a:bodyPr>
-          <a:lstStyle/>
-          <a:p>
-            <a:pPr marL="342900" indent="-342900">
-              <a:buAutoNum type="arabicPeriod"/>
-            </a:pPr>
-            <a:r>
-              <a:rPr lang="it-IT" sz="1600" dirty="0" err="1"/>
-              <a:t>ucb</a:t>
-            </a:r>
-            <a:r>
-              <a:rPr lang="it-IT" sz="1600" dirty="0"/>
-              <a:t> like</a:t>
-            </a:r>
-          </a:p>
-          <a:p>
-            <a:pPr marL="342900" indent="-342900">
-              <a:buAutoNum type="arabicPeriod"/>
-            </a:pPr>
-            <a:r>
-              <a:rPr lang="it-IT" sz="1600" dirty="0" err="1"/>
-              <a:t>primal</a:t>
-            </a:r>
-            <a:r>
-              <a:rPr lang="it-IT" sz="1600" dirty="0"/>
-              <a:t>-dual (</a:t>
-            </a:r>
-            <a:r>
-              <a:rPr lang="it-IT" sz="1600" dirty="0" err="1"/>
-              <a:t>multiplicative</a:t>
-            </a:r>
-            <a:r>
-              <a:rPr lang="it-IT" sz="1600" dirty="0"/>
-              <a:t> </a:t>
-            </a:r>
-            <a:r>
-              <a:rPr lang="it-IT" sz="1600" dirty="0" err="1"/>
-              <a:t>pacing</a:t>
-            </a:r>
-            <a:r>
-              <a:rPr lang="it-IT" sz="1600" dirty="0"/>
-              <a:t>)</a:t>
-            </a:r>
-          </a:p>
-        </p:txBody>
-      </p:sp>
-      <p:sp>
-        <p:nvSpPr>
-          <p:cNvPr id="10" name="CasellaDiTesto 9">
-            <a:extLst>
-              <a:ext uri="{FF2B5EF4-FFF2-40B4-BE49-F238E27FC236}">
-                <a16:creationId xmlns:a16="http://schemas.microsoft.com/office/drawing/2014/main" id="{73880002-A4CD-378F-E229-10996261CF0D}"/>
-              </a:ext>
-            </a:extLst>
-          </p:cNvPr>
-          <p:cNvSpPr txBox="1"/>
-          <p:nvPr/>
-        </p:nvSpPr>
-        <p:spPr>
-          <a:xfrm>
-            <a:off x="266700" y="5492038"/>
-            <a:ext cx="5524500" cy="338554"/>
-          </a:xfrm>
-          <a:prstGeom prst="rect">
-            <a:avLst/>
-          </a:prstGeom>
-          <a:noFill/>
-        </p:spPr>
-        <p:txBody>
-          <a:bodyPr wrap="square" rtlCol="0">
-            <a:spAutoFit/>
-          </a:bodyPr>
-          <a:lstStyle/>
-          <a:p>
-            <a:r>
-              <a:rPr lang="it-IT" sz="1600" b="1" dirty="0"/>
-              <a:t>PRICING AGENT: 	             </a:t>
-            </a:r>
-            <a:r>
-              <a:rPr lang="it-IT" sz="1600" dirty="0" err="1"/>
-              <a:t>gaussian</a:t>
-            </a:r>
-            <a:r>
-              <a:rPr lang="it-IT" sz="1600" dirty="0"/>
-              <a:t> </a:t>
-            </a:r>
-            <a:r>
-              <a:rPr lang="it-IT" sz="1600" dirty="0" err="1"/>
-              <a:t>processes</a:t>
-            </a:r>
-            <a:r>
-              <a:rPr lang="it-IT" sz="1600" dirty="0"/>
-              <a:t> </a:t>
+              <a:t>interaction</a:t>
             </a:r>
           </a:p>
         </p:txBody>
@@ -8501,7 +10537,7 @@
     </p:spTree>
     <p:extLst>
       <p:ext uri="{BB962C8B-B14F-4D97-AF65-F5344CB8AC3E}">
-        <p14:creationId xmlns:p14="http://schemas.microsoft.com/office/powerpoint/2010/main" val="2640318550"/>
+        <p14:creationId xmlns:p14="http://schemas.microsoft.com/office/powerpoint/2010/main" val="2630454284"/>
       </p:ext>
     </p:extLst>
   </p:cSld>

</xml_diff>